<commit_message>
add implement decision for State pattern
</commit_message>
<xml_diff>
--- a/WMCS/docs/OODP_CA_PT03.pptx
+++ b/WMCS/docs/OODP_CA_PT03.pptx
@@ -20,92 +20,122 @@
     <a:defPPr>
       <a:defRPr lang="en-US"/>
     </a:defPPr>
-    <a:lvl1pPr marL="0" algn="l" defTabSz="914400" rtl="0" eaLnBrk="1" latinLnBrk="0" hangingPunct="1">
-      <a:defRPr sz="1800" kern="1200">
+    <a:lvl1pPr algn="l" rtl="0" fontAlgn="base">
+      <a:spcBef>
+        <a:spcPct val="0"/>
+      </a:spcBef>
+      <a:spcAft>
+        <a:spcPct val="0"/>
+      </a:spcAft>
+      <a:defRPr kern="1200">
         <a:solidFill>
           <a:schemeClr val="tx1"/>
         </a:solidFill>
-        <a:latin typeface="+mn-lt"/>
+        <a:latin typeface="Arial" charset="0"/>
         <a:ea typeface="+mn-ea"/>
         <a:cs typeface="+mn-cs"/>
       </a:defRPr>
     </a:lvl1pPr>
-    <a:lvl2pPr marL="457200" algn="l" defTabSz="914400" rtl="0" eaLnBrk="1" latinLnBrk="0" hangingPunct="1">
-      <a:defRPr sz="1800" kern="1200">
+    <a:lvl2pPr marL="457200" algn="l" rtl="0" fontAlgn="base">
+      <a:spcBef>
+        <a:spcPct val="0"/>
+      </a:spcBef>
+      <a:spcAft>
+        <a:spcPct val="0"/>
+      </a:spcAft>
+      <a:defRPr kern="1200">
         <a:solidFill>
           <a:schemeClr val="tx1"/>
         </a:solidFill>
-        <a:latin typeface="+mn-lt"/>
+        <a:latin typeface="Arial" charset="0"/>
         <a:ea typeface="+mn-ea"/>
         <a:cs typeface="+mn-cs"/>
       </a:defRPr>
     </a:lvl2pPr>
-    <a:lvl3pPr marL="914400" algn="l" defTabSz="914400" rtl="0" eaLnBrk="1" latinLnBrk="0" hangingPunct="1">
-      <a:defRPr sz="1800" kern="1200">
+    <a:lvl3pPr marL="914400" algn="l" rtl="0" fontAlgn="base">
+      <a:spcBef>
+        <a:spcPct val="0"/>
+      </a:spcBef>
+      <a:spcAft>
+        <a:spcPct val="0"/>
+      </a:spcAft>
+      <a:defRPr kern="1200">
         <a:solidFill>
           <a:schemeClr val="tx1"/>
         </a:solidFill>
-        <a:latin typeface="+mn-lt"/>
+        <a:latin typeface="Arial" charset="0"/>
         <a:ea typeface="+mn-ea"/>
         <a:cs typeface="+mn-cs"/>
       </a:defRPr>
     </a:lvl3pPr>
-    <a:lvl4pPr marL="1371600" algn="l" defTabSz="914400" rtl="0" eaLnBrk="1" latinLnBrk="0" hangingPunct="1">
-      <a:defRPr sz="1800" kern="1200">
+    <a:lvl4pPr marL="1371600" algn="l" rtl="0" fontAlgn="base">
+      <a:spcBef>
+        <a:spcPct val="0"/>
+      </a:spcBef>
+      <a:spcAft>
+        <a:spcPct val="0"/>
+      </a:spcAft>
+      <a:defRPr kern="1200">
         <a:solidFill>
           <a:schemeClr val="tx1"/>
         </a:solidFill>
-        <a:latin typeface="+mn-lt"/>
+        <a:latin typeface="Arial" charset="0"/>
         <a:ea typeface="+mn-ea"/>
         <a:cs typeface="+mn-cs"/>
       </a:defRPr>
     </a:lvl4pPr>
-    <a:lvl5pPr marL="1828800" algn="l" defTabSz="914400" rtl="0" eaLnBrk="1" latinLnBrk="0" hangingPunct="1">
-      <a:defRPr sz="1800" kern="1200">
+    <a:lvl5pPr marL="1828800" algn="l" rtl="0" fontAlgn="base">
+      <a:spcBef>
+        <a:spcPct val="0"/>
+      </a:spcBef>
+      <a:spcAft>
+        <a:spcPct val="0"/>
+      </a:spcAft>
+      <a:defRPr kern="1200">
         <a:solidFill>
           <a:schemeClr val="tx1"/>
         </a:solidFill>
-        <a:latin typeface="+mn-lt"/>
+        <a:latin typeface="Arial" charset="0"/>
         <a:ea typeface="+mn-ea"/>
         <a:cs typeface="+mn-cs"/>
       </a:defRPr>
     </a:lvl5pPr>
     <a:lvl6pPr marL="2286000" algn="l" defTabSz="914400" rtl="0" eaLnBrk="1" latinLnBrk="0" hangingPunct="1">
-      <a:defRPr sz="1800" kern="1200">
+      <a:defRPr kern="1200">
         <a:solidFill>
           <a:schemeClr val="tx1"/>
         </a:solidFill>
-        <a:latin typeface="+mn-lt"/>
+        <a:latin typeface="Arial" charset="0"/>
         <a:ea typeface="+mn-ea"/>
         <a:cs typeface="+mn-cs"/>
       </a:defRPr>
     </a:lvl6pPr>
     <a:lvl7pPr marL="2743200" algn="l" defTabSz="914400" rtl="0" eaLnBrk="1" latinLnBrk="0" hangingPunct="1">
-      <a:defRPr sz="1800" kern="1200">
+      <a:defRPr kern="1200">
         <a:solidFill>
           <a:schemeClr val="tx1"/>
         </a:solidFill>
-        <a:latin typeface="+mn-lt"/>
+        <a:latin typeface="Arial" charset="0"/>
         <a:ea typeface="+mn-ea"/>
         <a:cs typeface="+mn-cs"/>
       </a:defRPr>
     </a:lvl7pPr>
     <a:lvl8pPr marL="3200400" algn="l" defTabSz="914400" rtl="0" eaLnBrk="1" latinLnBrk="0" hangingPunct="1">
-      <a:defRPr sz="1800" kern="1200">
+      <a:defRPr kern="1200">
         <a:solidFill>
           <a:schemeClr val="tx1"/>
         </a:solidFill>
-        <a:latin typeface="+mn-lt"/>
+        <a:latin typeface="Arial" charset="0"/>
         <a:ea typeface="+mn-ea"/>
         <a:cs typeface="+mn-cs"/>
       </a:defRPr>
     </a:lvl8pPr>
     <a:lvl9pPr marL="3657600" algn="l" defTabSz="914400" rtl="0" eaLnBrk="1" latinLnBrk="0" hangingPunct="1">
-      <a:defRPr sz="1800" kern="1200">
+      <a:defRPr kern="1200">
         <a:solidFill>
           <a:schemeClr val="tx1"/>
         </a:solidFill>
-        <a:latin typeface="+mn-lt"/>
+        <a:latin typeface="Arial" charset="0"/>
         <a:ea typeface="+mn-ea"/>
         <a:cs typeface="+mn-cs"/>
       </a:defRPr>
@@ -133,178 +163,7 @@
       </p:grpSpPr>
       <p:sp>
         <p:nvSpPr>
-          <p:cNvPr id="14" name="Title 13"/>
-          <p:cNvSpPr>
-            <a:spLocks noGrp="1"/>
-          </p:cNvSpPr>
-          <p:nvPr>
-            <p:ph type="ctrTitle"/>
-          </p:nvPr>
-        </p:nvSpPr>
-        <p:spPr>
-          <a:xfrm>
-            <a:off x="1432560" y="359898"/>
-            <a:ext cx="7406640" cy="1472184"/>
-          </a:xfrm>
-        </p:spPr>
-        <p:txBody>
-          <a:bodyPr anchor="b"/>
-          <a:lstStyle>
-            <a:lvl1pPr algn="l">
-              <a:defRPr/>
-            </a:lvl1pPr>
-            <a:extLst/>
-          </a:lstStyle>
-          <a:p>
-            <a:r>
-              <a:rPr kumimoji="0" lang="en-US" smtClean="0"/>
-              <a:t>Click to edit Master title style</a:t>
-            </a:r>
-            <a:endParaRPr kumimoji="0" lang="en-US"/>
-          </a:p>
-        </p:txBody>
-      </p:sp>
-      <p:sp>
-        <p:nvSpPr>
-          <p:cNvPr id="22" name="Subtitle 21"/>
-          <p:cNvSpPr>
-            <a:spLocks noGrp="1"/>
-          </p:cNvSpPr>
-          <p:nvPr>
-            <p:ph type="subTitle" idx="1"/>
-          </p:nvPr>
-        </p:nvSpPr>
-        <p:spPr>
-          <a:xfrm>
-            <a:off x="1432560" y="1850064"/>
-            <a:ext cx="7406640" cy="1752600"/>
-          </a:xfrm>
-        </p:spPr>
-        <p:txBody>
-          <a:bodyPr tIns="0"/>
-          <a:lstStyle>
-            <a:lvl1pPr marL="27432" indent="0" algn="l">
-              <a:buNone/>
-              <a:defRPr sz="2600">
-                <a:solidFill>
-                  <a:schemeClr val="tx2">
-                    <a:shade val="30000"/>
-                    <a:satMod val="150000"/>
-                  </a:schemeClr>
-                </a:solidFill>
-              </a:defRPr>
-            </a:lvl1pPr>
-            <a:lvl2pPr marL="457200" indent="0" algn="ctr">
-              <a:buNone/>
-            </a:lvl2pPr>
-            <a:lvl3pPr marL="914400" indent="0" algn="ctr">
-              <a:buNone/>
-            </a:lvl3pPr>
-            <a:lvl4pPr marL="1371600" indent="0" algn="ctr">
-              <a:buNone/>
-            </a:lvl4pPr>
-            <a:lvl5pPr marL="1828800" indent="0" algn="ctr">
-              <a:buNone/>
-            </a:lvl5pPr>
-            <a:lvl6pPr marL="2286000" indent="0" algn="ctr">
-              <a:buNone/>
-            </a:lvl6pPr>
-            <a:lvl7pPr marL="2743200" indent="0" algn="ctr">
-              <a:buNone/>
-            </a:lvl7pPr>
-            <a:lvl8pPr marL="3200400" indent="0" algn="ctr">
-              <a:buNone/>
-            </a:lvl8pPr>
-            <a:lvl9pPr marL="3657600" indent="0" algn="ctr">
-              <a:buNone/>
-            </a:lvl9pPr>
-            <a:extLst/>
-          </a:lstStyle>
-          <a:p>
-            <a:r>
-              <a:rPr kumimoji="0" lang="en-US" smtClean="0"/>
-              <a:t>Click to edit Master subtitle style</a:t>
-            </a:r>
-            <a:endParaRPr kumimoji="0" lang="en-US"/>
-          </a:p>
-        </p:txBody>
-      </p:sp>
-      <p:sp>
-        <p:nvSpPr>
-          <p:cNvPr id="7" name="Date Placeholder 6"/>
-          <p:cNvSpPr>
-            <a:spLocks noGrp="1"/>
-          </p:cNvSpPr>
-          <p:nvPr>
-            <p:ph type="dt" sz="half" idx="10"/>
-          </p:nvPr>
-        </p:nvSpPr>
-        <p:spPr/>
-        <p:txBody>
-          <a:bodyPr/>
-          <a:lstStyle>
-            <a:extLst/>
-          </a:lstStyle>
-          <a:p>
-            <a:fld id="{1D8BD707-D9CF-40AE-B4C6-C98DA3205C09}" type="datetimeFigureOut">
-              <a:rPr lang="en-US" smtClean="0"/>
-              <a:pPr/>
-              <a:t>10/29/2013</a:t>
-            </a:fld>
-            <a:endParaRPr lang="en-US"/>
-          </a:p>
-        </p:txBody>
-      </p:sp>
-      <p:sp>
-        <p:nvSpPr>
-          <p:cNvPr id="20" name="Footer Placeholder 19"/>
-          <p:cNvSpPr>
-            <a:spLocks noGrp="1"/>
-          </p:cNvSpPr>
-          <p:nvPr>
-            <p:ph type="ftr" sz="quarter" idx="11"/>
-          </p:nvPr>
-        </p:nvSpPr>
-        <p:spPr/>
-        <p:txBody>
-          <a:bodyPr/>
-          <a:lstStyle>
-            <a:extLst/>
-          </a:lstStyle>
-          <a:p>
-            <a:endParaRPr lang="en-US"/>
-          </a:p>
-        </p:txBody>
-      </p:sp>
-      <p:sp>
-        <p:nvSpPr>
-          <p:cNvPr id="10" name="Slide Number Placeholder 9"/>
-          <p:cNvSpPr>
-            <a:spLocks noGrp="1"/>
-          </p:cNvSpPr>
-          <p:nvPr>
-            <p:ph type="sldNum" sz="quarter" idx="12"/>
-          </p:nvPr>
-        </p:nvSpPr>
-        <p:spPr/>
-        <p:txBody>
-          <a:bodyPr/>
-          <a:lstStyle>
-            <a:extLst/>
-          </a:lstStyle>
-          <a:p>
-            <a:fld id="{B6F15528-21DE-4FAA-801E-634DDDAF4B2B}" type="slidenum">
-              <a:rPr lang="en-US" smtClean="0"/>
-              <a:pPr/>
-              <a:t>‹#›</a:t>
-            </a:fld>
-            <a:endParaRPr lang="en-US"/>
-          </a:p>
-        </p:txBody>
-      </p:sp>
-      <p:sp>
-        <p:nvSpPr>
-          <p:cNvPr id="8" name="Oval 7"/>
+          <p:cNvPr id="4" name="Oval 7"/>
           <p:cNvSpPr/>
           <p:nvPr/>
         </p:nvSpPr>
@@ -384,21 +243,29 @@
             <a:extLst/>
           </a:lstStyle>
           <a:p>
-            <a:pPr algn="ctr" eaLnBrk="1" latinLnBrk="0" hangingPunct="1"/>
-            <a:endParaRPr kumimoji="0" lang="en-US"/>
-          </a:p>
-        </p:txBody>
-      </p:sp>
-      <p:sp>
-        <p:nvSpPr>
-          <p:cNvPr id="9" name="Oval 8"/>
+            <a:pPr algn="ctr" fontAlgn="auto">
+              <a:spcBef>
+                <a:spcPts val="0"/>
+              </a:spcBef>
+              <a:spcAft>
+                <a:spcPts val="0"/>
+              </a:spcAft>
+              <a:defRPr/>
+            </a:pPr>
+            <a:endParaRPr lang="en-US"/>
+          </a:p>
+        </p:txBody>
+      </p:sp>
+      <p:sp>
+        <p:nvSpPr>
+          <p:cNvPr id="5" name="Oval 8"/>
           <p:cNvSpPr/>
           <p:nvPr/>
         </p:nvSpPr>
         <p:spPr>
           <a:xfrm>
-            <a:off x="1157176" y="1345016"/>
-            <a:ext cx="64008" cy="64008"/>
+            <a:off x="1157288" y="1344613"/>
+            <a:ext cx="63500" cy="65087"/>
           </a:xfrm>
           <a:prstGeom prst="ellipse">
             <a:avLst/>
@@ -435,8 +302,209 @@
             <a:extLst/>
           </a:lstStyle>
           <a:p>
-            <a:pPr algn="ctr" eaLnBrk="1" latinLnBrk="0" hangingPunct="1"/>
-            <a:endParaRPr kumimoji="0" lang="en-US"/>
+            <a:pPr algn="ctr" fontAlgn="auto">
+              <a:spcBef>
+                <a:spcPts val="0"/>
+              </a:spcBef>
+              <a:spcAft>
+                <a:spcPts val="0"/>
+              </a:spcAft>
+              <a:defRPr/>
+            </a:pPr>
+            <a:endParaRPr lang="en-US"/>
+          </a:p>
+        </p:txBody>
+      </p:sp>
+      <p:sp>
+        <p:nvSpPr>
+          <p:cNvPr id="14" name="Title 13"/>
+          <p:cNvSpPr>
+            <a:spLocks noGrp="1"/>
+          </p:cNvSpPr>
+          <p:nvPr>
+            <p:ph type="ctrTitle"/>
+          </p:nvPr>
+        </p:nvSpPr>
+        <p:spPr>
+          <a:xfrm>
+            <a:off x="1432560" y="359898"/>
+            <a:ext cx="7406640" cy="1472184"/>
+          </a:xfrm>
+        </p:spPr>
+        <p:txBody>
+          <a:bodyPr anchor="b"/>
+          <a:lstStyle>
+            <a:lvl1pPr algn="l">
+              <a:defRPr/>
+            </a:lvl1pPr>
+            <a:extLst/>
+          </a:lstStyle>
+          <a:p>
+            <a:r>
+              <a:rPr lang="en-US" smtClean="0"/>
+              <a:t>Click to edit Master title style</a:t>
+            </a:r>
+            <a:endParaRPr lang="en-US"/>
+          </a:p>
+        </p:txBody>
+      </p:sp>
+      <p:sp>
+        <p:nvSpPr>
+          <p:cNvPr id="22" name="Subtitle 21"/>
+          <p:cNvSpPr>
+            <a:spLocks noGrp="1"/>
+          </p:cNvSpPr>
+          <p:nvPr>
+            <p:ph type="subTitle" idx="1"/>
+          </p:nvPr>
+        </p:nvSpPr>
+        <p:spPr>
+          <a:xfrm>
+            <a:off x="1432560" y="1850064"/>
+            <a:ext cx="7406640" cy="1752600"/>
+          </a:xfrm>
+        </p:spPr>
+        <p:txBody>
+          <a:bodyPr tIns="0"/>
+          <a:lstStyle>
+            <a:lvl1pPr marL="27432" indent="0" algn="l">
+              <a:buNone/>
+              <a:defRPr sz="2600">
+                <a:solidFill>
+                  <a:schemeClr val="tx2">
+                    <a:shade val="30000"/>
+                    <a:satMod val="150000"/>
+                  </a:schemeClr>
+                </a:solidFill>
+              </a:defRPr>
+            </a:lvl1pPr>
+            <a:lvl2pPr marL="457200" indent="0" algn="ctr">
+              <a:buNone/>
+            </a:lvl2pPr>
+            <a:lvl3pPr marL="914400" indent="0" algn="ctr">
+              <a:buNone/>
+            </a:lvl3pPr>
+            <a:lvl4pPr marL="1371600" indent="0" algn="ctr">
+              <a:buNone/>
+            </a:lvl4pPr>
+            <a:lvl5pPr marL="1828800" indent="0" algn="ctr">
+              <a:buNone/>
+            </a:lvl5pPr>
+            <a:lvl6pPr marL="2286000" indent="0" algn="ctr">
+              <a:buNone/>
+            </a:lvl6pPr>
+            <a:lvl7pPr marL="2743200" indent="0" algn="ctr">
+              <a:buNone/>
+            </a:lvl7pPr>
+            <a:lvl8pPr marL="3200400" indent="0" algn="ctr">
+              <a:buNone/>
+            </a:lvl8pPr>
+            <a:lvl9pPr marL="3657600" indent="0" algn="ctr">
+              <a:buNone/>
+            </a:lvl9pPr>
+            <a:extLst/>
+          </a:lstStyle>
+          <a:p>
+            <a:r>
+              <a:rPr lang="en-US" smtClean="0"/>
+              <a:t>Click to edit Master subtitle style</a:t>
+            </a:r>
+            <a:endParaRPr lang="en-US"/>
+          </a:p>
+        </p:txBody>
+      </p:sp>
+      <p:sp>
+        <p:nvSpPr>
+          <p:cNvPr id="6" name="Date Placeholder 6"/>
+          <p:cNvSpPr>
+            <a:spLocks noGrp="1"/>
+          </p:cNvSpPr>
+          <p:nvPr>
+            <p:ph type="dt" sz="half" idx="10"/>
+          </p:nvPr>
+        </p:nvSpPr>
+        <p:spPr/>
+        <p:txBody>
+          <a:bodyPr/>
+          <a:lstStyle>
+            <a:lvl1pPr>
+              <a:defRPr/>
+            </a:lvl1pPr>
+            <a:extLst/>
+          </a:lstStyle>
+          <a:p>
+            <a:pPr>
+              <a:defRPr/>
+            </a:pPr>
+            <a:fld id="{368459C0-B70C-4CE7-8872-1D61938A9635}" type="datetimeFigureOut">
+              <a:rPr lang="en-US"/>
+              <a:pPr>
+                <a:defRPr/>
+              </a:pPr>
+              <a:t>10/29/2013</a:t>
+            </a:fld>
+            <a:endParaRPr lang="en-US"/>
+          </a:p>
+        </p:txBody>
+      </p:sp>
+      <p:sp>
+        <p:nvSpPr>
+          <p:cNvPr id="7" name="Footer Placeholder 19"/>
+          <p:cNvSpPr>
+            <a:spLocks noGrp="1"/>
+          </p:cNvSpPr>
+          <p:nvPr>
+            <p:ph type="ftr" sz="quarter" idx="11"/>
+          </p:nvPr>
+        </p:nvSpPr>
+        <p:spPr/>
+        <p:txBody>
+          <a:bodyPr/>
+          <a:lstStyle>
+            <a:lvl1pPr>
+              <a:defRPr/>
+            </a:lvl1pPr>
+            <a:extLst/>
+          </a:lstStyle>
+          <a:p>
+            <a:pPr>
+              <a:defRPr/>
+            </a:pPr>
+            <a:endParaRPr lang="en-US"/>
+          </a:p>
+        </p:txBody>
+      </p:sp>
+      <p:sp>
+        <p:nvSpPr>
+          <p:cNvPr id="8" name="Slide Number Placeholder 9"/>
+          <p:cNvSpPr>
+            <a:spLocks noGrp="1"/>
+          </p:cNvSpPr>
+          <p:nvPr>
+            <p:ph type="sldNum" sz="quarter" idx="12"/>
+          </p:nvPr>
+        </p:nvSpPr>
+        <p:spPr/>
+        <p:txBody>
+          <a:bodyPr/>
+          <a:lstStyle>
+            <a:lvl1pPr>
+              <a:defRPr/>
+            </a:lvl1pPr>
+            <a:extLst/>
+          </a:lstStyle>
+          <a:p>
+            <a:pPr>
+              <a:defRPr/>
+            </a:pPr>
+            <a:fld id="{2FC5D985-B5F0-4D86-B0DC-515D507495C5}" type="slidenum">
+              <a:rPr lang="en-US"/>
+              <a:pPr>
+                <a:defRPr/>
+              </a:pPr>
+              <a:t>‹#›</a:t>
+            </a:fld>
+            <a:endParaRPr lang="en-US"/>
           </a:p>
         </p:txBody>
       </p:sp>
@@ -483,10 +551,10 @@
           </a:lstStyle>
           <a:p>
             <a:r>
-              <a:rPr kumimoji="0" lang="en-US" smtClean="0"/>
+              <a:rPr lang="en-US" smtClean="0"/>
               <a:t>Click to edit Master title style</a:t>
             </a:r>
-            <a:endParaRPr kumimoji="0" lang="en-US"/>
+            <a:endParaRPr lang="en-US"/>
           </a:p>
         </p:txBody>
       </p:sp>
@@ -507,46 +575,46 @@
             <a:extLst/>
           </a:lstStyle>
           <a:p>
-            <a:pPr lvl="0" eaLnBrk="1" latinLnBrk="0" hangingPunct="1"/>
+            <a:pPr lvl="0"/>
             <a:r>
               <a:rPr lang="en-US" smtClean="0"/>
               <a:t>Click to edit Master text styles</a:t>
             </a:r>
           </a:p>
           <a:p>
-            <a:pPr lvl="1" eaLnBrk="1" latinLnBrk="0" hangingPunct="1"/>
+            <a:pPr lvl="1"/>
             <a:r>
               <a:rPr lang="en-US" smtClean="0"/>
               <a:t>Second level</a:t>
             </a:r>
           </a:p>
           <a:p>
-            <a:pPr lvl="2" eaLnBrk="1" latinLnBrk="0" hangingPunct="1"/>
+            <a:pPr lvl="2"/>
             <a:r>
               <a:rPr lang="en-US" smtClean="0"/>
               <a:t>Third level</a:t>
             </a:r>
           </a:p>
           <a:p>
-            <a:pPr lvl="3" eaLnBrk="1" latinLnBrk="0" hangingPunct="1"/>
+            <a:pPr lvl="3"/>
             <a:r>
               <a:rPr lang="en-US" smtClean="0"/>
               <a:t>Fourth level</a:t>
             </a:r>
           </a:p>
           <a:p>
-            <a:pPr lvl="4" eaLnBrk="1" latinLnBrk="0" hangingPunct="1"/>
+            <a:pPr lvl="4"/>
             <a:r>
               <a:rPr lang="en-US" smtClean="0"/>
               <a:t>Fifth level</a:t>
             </a:r>
-            <a:endParaRPr kumimoji="0" lang="en-US"/>
-          </a:p>
-        </p:txBody>
-      </p:sp>
-      <p:sp>
-        <p:nvSpPr>
-          <p:cNvPr id="4" name="Date Placeholder 3"/>
+            <a:endParaRPr lang="en-US"/>
+          </a:p>
+        </p:txBody>
+      </p:sp>
+      <p:sp>
+        <p:nvSpPr>
+          <p:cNvPr id="4" name="Date Placeholder 23"/>
           <p:cNvSpPr>
             <a:spLocks noGrp="1"/>
           </p:cNvSpPr>
@@ -558,12 +626,19 @@
         <p:txBody>
           <a:bodyPr/>
           <a:lstStyle>
-            <a:extLst/>
-          </a:lstStyle>
-          <a:p>
-            <a:fld id="{1D8BD707-D9CF-40AE-B4C6-C98DA3205C09}" type="datetimeFigureOut">
-              <a:rPr lang="en-US" smtClean="0"/>
-              <a:pPr/>
+            <a:lvl1pPr>
+              <a:defRPr/>
+            </a:lvl1pPr>
+          </a:lstStyle>
+          <a:p>
+            <a:pPr>
+              <a:defRPr/>
+            </a:pPr>
+            <a:fld id="{B6F5FAE6-BD10-4492-B505-E94B3AACB234}" type="datetimeFigureOut">
+              <a:rPr lang="en-US"/>
+              <a:pPr>
+                <a:defRPr/>
+              </a:pPr>
               <a:t>10/29/2013</a:t>
             </a:fld>
             <a:endParaRPr lang="en-US"/>
@@ -572,7 +647,7 @@
       </p:sp>
       <p:sp>
         <p:nvSpPr>
-          <p:cNvPr id="5" name="Footer Placeholder 4"/>
+          <p:cNvPr id="5" name="Footer Placeholder 9"/>
           <p:cNvSpPr>
             <a:spLocks noGrp="1"/>
           </p:cNvSpPr>
@@ -584,16 +659,21 @@
         <p:txBody>
           <a:bodyPr/>
           <a:lstStyle>
-            <a:extLst/>
-          </a:lstStyle>
-          <a:p>
-            <a:endParaRPr lang="en-US"/>
-          </a:p>
-        </p:txBody>
-      </p:sp>
-      <p:sp>
-        <p:nvSpPr>
-          <p:cNvPr id="6" name="Slide Number Placeholder 5"/>
+            <a:lvl1pPr>
+              <a:defRPr/>
+            </a:lvl1pPr>
+          </a:lstStyle>
+          <a:p>
+            <a:pPr>
+              <a:defRPr/>
+            </a:pPr>
+            <a:endParaRPr lang="en-US"/>
+          </a:p>
+        </p:txBody>
+      </p:sp>
+      <p:sp>
+        <p:nvSpPr>
+          <p:cNvPr id="6" name="Slide Number Placeholder 21"/>
           <p:cNvSpPr>
             <a:spLocks noGrp="1"/>
           </p:cNvSpPr>
@@ -605,12 +685,19 @@
         <p:txBody>
           <a:bodyPr/>
           <a:lstStyle>
-            <a:extLst/>
-          </a:lstStyle>
-          <a:p>
-            <a:fld id="{B6F15528-21DE-4FAA-801E-634DDDAF4B2B}" type="slidenum">
-              <a:rPr lang="en-US" smtClean="0"/>
-              <a:pPr/>
+            <a:lvl1pPr>
+              <a:defRPr/>
+            </a:lvl1pPr>
+          </a:lstStyle>
+          <a:p>
+            <a:pPr>
+              <a:defRPr/>
+            </a:pPr>
+            <a:fld id="{FE006429-978F-4DA8-907E-A6DD0E0FE0A3}" type="slidenum">
+              <a:rPr lang="en-US"/>
+              <a:pPr>
+                <a:defRPr/>
+              </a:pPr>
               <a:t>‹#›</a:t>
             </a:fld>
             <a:endParaRPr lang="en-US"/>
@@ -665,10 +752,10 @@
           </a:lstStyle>
           <a:p>
             <a:r>
-              <a:rPr kumimoji="0" lang="en-US" smtClean="0"/>
+              <a:rPr lang="en-US" smtClean="0"/>
               <a:t>Click to edit Master title style</a:t>
             </a:r>
-            <a:endParaRPr kumimoji="0" lang="en-US"/>
+            <a:endParaRPr lang="en-US"/>
           </a:p>
         </p:txBody>
       </p:sp>
@@ -694,46 +781,46 @@
             <a:extLst/>
           </a:lstStyle>
           <a:p>
-            <a:pPr lvl="0" eaLnBrk="1" latinLnBrk="0" hangingPunct="1"/>
+            <a:pPr lvl="0"/>
             <a:r>
               <a:rPr lang="en-US" smtClean="0"/>
               <a:t>Click to edit Master text styles</a:t>
             </a:r>
           </a:p>
           <a:p>
-            <a:pPr lvl="1" eaLnBrk="1" latinLnBrk="0" hangingPunct="1"/>
+            <a:pPr lvl="1"/>
             <a:r>
               <a:rPr lang="en-US" smtClean="0"/>
               <a:t>Second level</a:t>
             </a:r>
           </a:p>
           <a:p>
-            <a:pPr lvl="2" eaLnBrk="1" latinLnBrk="0" hangingPunct="1"/>
+            <a:pPr lvl="2"/>
             <a:r>
               <a:rPr lang="en-US" smtClean="0"/>
               <a:t>Third level</a:t>
             </a:r>
           </a:p>
           <a:p>
-            <a:pPr lvl="3" eaLnBrk="1" latinLnBrk="0" hangingPunct="1"/>
+            <a:pPr lvl="3"/>
             <a:r>
               <a:rPr lang="en-US" smtClean="0"/>
               <a:t>Fourth level</a:t>
             </a:r>
           </a:p>
           <a:p>
-            <a:pPr lvl="4" eaLnBrk="1" latinLnBrk="0" hangingPunct="1"/>
+            <a:pPr lvl="4"/>
             <a:r>
               <a:rPr lang="en-US" smtClean="0"/>
               <a:t>Fifth level</a:t>
             </a:r>
-            <a:endParaRPr kumimoji="0" lang="en-US"/>
-          </a:p>
-        </p:txBody>
-      </p:sp>
-      <p:sp>
-        <p:nvSpPr>
-          <p:cNvPr id="4" name="Date Placeholder 3"/>
+            <a:endParaRPr lang="en-US"/>
+          </a:p>
+        </p:txBody>
+      </p:sp>
+      <p:sp>
+        <p:nvSpPr>
+          <p:cNvPr id="4" name="Date Placeholder 23"/>
           <p:cNvSpPr>
             <a:spLocks noGrp="1"/>
           </p:cNvSpPr>
@@ -745,12 +832,19 @@
         <p:txBody>
           <a:bodyPr/>
           <a:lstStyle>
-            <a:extLst/>
-          </a:lstStyle>
-          <a:p>
-            <a:fld id="{1D8BD707-D9CF-40AE-B4C6-C98DA3205C09}" type="datetimeFigureOut">
-              <a:rPr lang="en-US" smtClean="0"/>
-              <a:pPr/>
+            <a:lvl1pPr>
+              <a:defRPr/>
+            </a:lvl1pPr>
+          </a:lstStyle>
+          <a:p>
+            <a:pPr>
+              <a:defRPr/>
+            </a:pPr>
+            <a:fld id="{A677ACBB-EEDB-4985-A763-10BA26C55A70}" type="datetimeFigureOut">
+              <a:rPr lang="en-US"/>
+              <a:pPr>
+                <a:defRPr/>
+              </a:pPr>
               <a:t>10/29/2013</a:t>
             </a:fld>
             <a:endParaRPr lang="en-US"/>
@@ -759,7 +853,7 @@
       </p:sp>
       <p:sp>
         <p:nvSpPr>
-          <p:cNvPr id="5" name="Footer Placeholder 4"/>
+          <p:cNvPr id="5" name="Footer Placeholder 9"/>
           <p:cNvSpPr>
             <a:spLocks noGrp="1"/>
           </p:cNvSpPr>
@@ -771,16 +865,21 @@
         <p:txBody>
           <a:bodyPr/>
           <a:lstStyle>
-            <a:extLst/>
-          </a:lstStyle>
-          <a:p>
-            <a:endParaRPr lang="en-US"/>
-          </a:p>
-        </p:txBody>
-      </p:sp>
-      <p:sp>
-        <p:nvSpPr>
-          <p:cNvPr id="6" name="Slide Number Placeholder 5"/>
+            <a:lvl1pPr>
+              <a:defRPr/>
+            </a:lvl1pPr>
+          </a:lstStyle>
+          <a:p>
+            <a:pPr>
+              <a:defRPr/>
+            </a:pPr>
+            <a:endParaRPr lang="en-US"/>
+          </a:p>
+        </p:txBody>
+      </p:sp>
+      <p:sp>
+        <p:nvSpPr>
+          <p:cNvPr id="6" name="Slide Number Placeholder 21"/>
           <p:cNvSpPr>
             <a:spLocks noGrp="1"/>
           </p:cNvSpPr>
@@ -792,12 +891,19 @@
         <p:txBody>
           <a:bodyPr/>
           <a:lstStyle>
-            <a:extLst/>
-          </a:lstStyle>
-          <a:p>
-            <a:fld id="{B6F15528-21DE-4FAA-801E-634DDDAF4B2B}" type="slidenum">
-              <a:rPr lang="en-US" smtClean="0"/>
-              <a:pPr/>
+            <a:lvl1pPr>
+              <a:defRPr/>
+            </a:lvl1pPr>
+          </a:lstStyle>
+          <a:p>
+            <a:pPr>
+              <a:defRPr/>
+            </a:pPr>
+            <a:fld id="{7E192E4D-2BDB-4235-BC09-95330EAEBB70}" type="slidenum">
+              <a:rPr lang="en-US"/>
+              <a:pPr>
+                <a:defRPr/>
+              </a:pPr>
               <a:t>‹#›</a:t>
             </a:fld>
             <a:endParaRPr lang="en-US"/>
@@ -847,10 +953,10 @@
           </a:lstStyle>
           <a:p>
             <a:r>
-              <a:rPr kumimoji="0" lang="en-US" smtClean="0"/>
+              <a:rPr lang="en-US" smtClean="0"/>
               <a:t>Click to edit Master title style</a:t>
             </a:r>
-            <a:endParaRPr kumimoji="0" lang="en-US"/>
+            <a:endParaRPr lang="en-US"/>
           </a:p>
         </p:txBody>
       </p:sp>
@@ -871,46 +977,46 @@
             <a:extLst/>
           </a:lstStyle>
           <a:p>
-            <a:pPr lvl="0" eaLnBrk="1" latinLnBrk="0" hangingPunct="1"/>
+            <a:pPr lvl="0"/>
             <a:r>
               <a:rPr lang="en-US" smtClean="0"/>
               <a:t>Click to edit Master text styles</a:t>
             </a:r>
           </a:p>
           <a:p>
-            <a:pPr lvl="1" eaLnBrk="1" latinLnBrk="0" hangingPunct="1"/>
+            <a:pPr lvl="1"/>
             <a:r>
               <a:rPr lang="en-US" smtClean="0"/>
               <a:t>Second level</a:t>
             </a:r>
           </a:p>
           <a:p>
-            <a:pPr lvl="2" eaLnBrk="1" latinLnBrk="0" hangingPunct="1"/>
+            <a:pPr lvl="2"/>
             <a:r>
               <a:rPr lang="en-US" smtClean="0"/>
               <a:t>Third level</a:t>
             </a:r>
           </a:p>
           <a:p>
-            <a:pPr lvl="3" eaLnBrk="1" latinLnBrk="0" hangingPunct="1"/>
+            <a:pPr lvl="3"/>
             <a:r>
               <a:rPr lang="en-US" smtClean="0"/>
               <a:t>Fourth level</a:t>
             </a:r>
           </a:p>
           <a:p>
-            <a:pPr lvl="4" eaLnBrk="1" latinLnBrk="0" hangingPunct="1"/>
+            <a:pPr lvl="4"/>
             <a:r>
               <a:rPr lang="en-US" smtClean="0"/>
               <a:t>Fifth level</a:t>
             </a:r>
-            <a:endParaRPr kumimoji="0" lang="en-US"/>
-          </a:p>
-        </p:txBody>
-      </p:sp>
-      <p:sp>
-        <p:nvSpPr>
-          <p:cNvPr id="4" name="Date Placeholder 3"/>
+            <a:endParaRPr lang="en-US"/>
+          </a:p>
+        </p:txBody>
+      </p:sp>
+      <p:sp>
+        <p:nvSpPr>
+          <p:cNvPr id="4" name="Date Placeholder 23"/>
           <p:cNvSpPr>
             <a:spLocks noGrp="1"/>
           </p:cNvSpPr>
@@ -922,12 +1028,19 @@
         <p:txBody>
           <a:bodyPr/>
           <a:lstStyle>
-            <a:extLst/>
-          </a:lstStyle>
-          <a:p>
-            <a:fld id="{1D8BD707-D9CF-40AE-B4C6-C98DA3205C09}" type="datetimeFigureOut">
-              <a:rPr lang="en-US" smtClean="0"/>
-              <a:pPr/>
+            <a:lvl1pPr>
+              <a:defRPr/>
+            </a:lvl1pPr>
+          </a:lstStyle>
+          <a:p>
+            <a:pPr>
+              <a:defRPr/>
+            </a:pPr>
+            <a:fld id="{7B8F4166-54A5-42CD-A27F-E8D646E1A1FD}" type="datetimeFigureOut">
+              <a:rPr lang="en-US"/>
+              <a:pPr>
+                <a:defRPr/>
+              </a:pPr>
               <a:t>10/29/2013</a:t>
             </a:fld>
             <a:endParaRPr lang="en-US"/>
@@ -936,7 +1049,7 @@
       </p:sp>
       <p:sp>
         <p:nvSpPr>
-          <p:cNvPr id="5" name="Footer Placeholder 4"/>
+          <p:cNvPr id="5" name="Footer Placeholder 9"/>
           <p:cNvSpPr>
             <a:spLocks noGrp="1"/>
           </p:cNvSpPr>
@@ -948,16 +1061,21 @@
         <p:txBody>
           <a:bodyPr/>
           <a:lstStyle>
-            <a:extLst/>
-          </a:lstStyle>
-          <a:p>
-            <a:endParaRPr lang="en-US"/>
-          </a:p>
-        </p:txBody>
-      </p:sp>
-      <p:sp>
-        <p:nvSpPr>
-          <p:cNvPr id="6" name="Slide Number Placeholder 5"/>
+            <a:lvl1pPr>
+              <a:defRPr/>
+            </a:lvl1pPr>
+          </a:lstStyle>
+          <a:p>
+            <a:pPr>
+              <a:defRPr/>
+            </a:pPr>
+            <a:endParaRPr lang="en-US"/>
+          </a:p>
+        </p:txBody>
+      </p:sp>
+      <p:sp>
+        <p:nvSpPr>
+          <p:cNvPr id="6" name="Slide Number Placeholder 21"/>
           <p:cNvSpPr>
             <a:spLocks noGrp="1"/>
           </p:cNvSpPr>
@@ -969,12 +1087,19 @@
         <p:txBody>
           <a:bodyPr/>
           <a:lstStyle>
-            <a:extLst/>
-          </a:lstStyle>
-          <a:p>
-            <a:fld id="{B6F15528-21DE-4FAA-801E-634DDDAF4B2B}" type="slidenum">
-              <a:rPr lang="en-US" smtClean="0"/>
-              <a:pPr/>
+            <a:lvl1pPr>
+              <a:defRPr/>
+            </a:lvl1pPr>
+          </a:lstStyle>
+          <a:p>
+            <a:pPr>
+              <a:defRPr/>
+            </a:pPr>
+            <a:fld id="{CC39B570-18C5-4CB6-BE75-1FB4CA8182CE}" type="slidenum">
+              <a:rPr lang="en-US"/>
+              <a:pPr>
+                <a:defRPr/>
+              </a:pPr>
               <a:t>‹#›</a:t>
             </a:fld>
             <a:endParaRPr lang="en-US"/>
@@ -1008,14 +1133,14 @@
       </p:grpSpPr>
       <p:sp>
         <p:nvSpPr>
-          <p:cNvPr id="7" name="Rectangle 6"/>
+          <p:cNvPr id="4" name="Rectangle 6"/>
           <p:cNvSpPr/>
           <p:nvPr/>
         </p:nvSpPr>
         <p:spPr>
           <a:xfrm>
-            <a:off x="2282890" y="-54"/>
-            <a:ext cx="6858000" cy="6858054"/>
+            <a:off x="2282825" y="0"/>
+            <a:ext cx="6858000" cy="6858000"/>
           </a:xfrm>
           <a:prstGeom prst="rect">
             <a:avLst/>
@@ -1049,218 +1174,29 @@
             <a:extLst/>
           </a:lstStyle>
           <a:p>
-            <a:pPr algn="ctr" eaLnBrk="1" latinLnBrk="0" hangingPunct="1"/>
-            <a:endParaRPr kumimoji="0" lang="en-US"/>
-          </a:p>
-        </p:txBody>
-      </p:sp>
-      <p:sp>
-        <p:nvSpPr>
-          <p:cNvPr id="2" name="Title 1"/>
-          <p:cNvSpPr>
-            <a:spLocks noGrp="1"/>
-          </p:cNvSpPr>
-          <p:nvPr>
-            <p:ph type="title"/>
-          </p:nvPr>
-        </p:nvSpPr>
-        <p:spPr>
-          <a:xfrm>
-            <a:off x="2578392" y="2600325"/>
-            <a:ext cx="6400800" cy="2286000"/>
-          </a:xfrm>
-        </p:spPr>
-        <p:txBody>
-          <a:bodyPr anchor="t"/>
-          <a:lstStyle>
-            <a:lvl1pPr algn="l">
-              <a:lnSpc>
-                <a:spcPts val="4500"/>
-              </a:lnSpc>
-              <a:buNone/>
-              <a:defRPr sz="4000" b="1" cap="all"/>
-            </a:lvl1pPr>
-            <a:extLst/>
-          </a:lstStyle>
-          <a:p>
-            <a:r>
-              <a:rPr kumimoji="0" lang="en-US" smtClean="0"/>
-              <a:t>Click to edit Master title style</a:t>
-            </a:r>
-            <a:endParaRPr kumimoji="0" lang="en-US"/>
-          </a:p>
-        </p:txBody>
-      </p:sp>
-      <p:sp>
-        <p:nvSpPr>
-          <p:cNvPr id="3" name="Text Placeholder 2"/>
-          <p:cNvSpPr>
-            <a:spLocks noGrp="1"/>
-          </p:cNvSpPr>
-          <p:nvPr>
-            <p:ph type="body" idx="1"/>
-          </p:nvPr>
-        </p:nvSpPr>
-        <p:spPr>
-          <a:xfrm>
-            <a:off x="2578392" y="1066800"/>
-            <a:ext cx="6400800" cy="1509712"/>
-          </a:xfrm>
-        </p:spPr>
-        <p:txBody>
-          <a:bodyPr anchor="b"/>
-          <a:lstStyle>
-            <a:lvl1pPr marL="18288" indent="0">
-              <a:lnSpc>
-                <a:spcPts val="2300"/>
-              </a:lnSpc>
+            <a:pPr algn="ctr" fontAlgn="auto">
               <a:spcBef>
                 <a:spcPts val="0"/>
               </a:spcBef>
-              <a:buNone/>
-              <a:defRPr sz="2000">
-                <a:solidFill>
-                  <a:schemeClr val="tx2">
-                    <a:shade val="30000"/>
-                    <a:satMod val="150000"/>
-                  </a:schemeClr>
-                </a:solidFill>
-              </a:defRPr>
-            </a:lvl1pPr>
-            <a:lvl2pPr>
-              <a:buNone/>
-              <a:defRPr sz="1800">
-                <a:solidFill>
-                  <a:schemeClr val="tx1">
-                    <a:tint val="75000"/>
-                  </a:schemeClr>
-                </a:solidFill>
-              </a:defRPr>
-            </a:lvl2pPr>
-            <a:lvl3pPr>
-              <a:buNone/>
-              <a:defRPr sz="1600">
-                <a:solidFill>
-                  <a:schemeClr val="tx1">
-                    <a:tint val="75000"/>
-                  </a:schemeClr>
-                </a:solidFill>
-              </a:defRPr>
-            </a:lvl3pPr>
-            <a:lvl4pPr>
-              <a:buNone/>
-              <a:defRPr sz="1400">
-                <a:solidFill>
-                  <a:schemeClr val="tx1">
-                    <a:tint val="75000"/>
-                  </a:schemeClr>
-                </a:solidFill>
-              </a:defRPr>
-            </a:lvl4pPr>
-            <a:lvl5pPr>
-              <a:buNone/>
-              <a:defRPr sz="1400">
-                <a:solidFill>
-                  <a:schemeClr val="tx1">
-                    <a:tint val="75000"/>
-                  </a:schemeClr>
-                </a:solidFill>
-              </a:defRPr>
-            </a:lvl5pPr>
-            <a:extLst/>
-          </a:lstStyle>
-          <a:p>
-            <a:pPr lvl="0" eaLnBrk="1" latinLnBrk="0" hangingPunct="1"/>
-            <a:r>
-              <a:rPr kumimoji="0" lang="en-US" smtClean="0"/>
-              <a:t>Click to edit Master text styles</a:t>
-            </a:r>
-          </a:p>
-        </p:txBody>
-      </p:sp>
-      <p:sp>
-        <p:nvSpPr>
-          <p:cNvPr id="4" name="Date Placeholder 3"/>
-          <p:cNvSpPr>
-            <a:spLocks noGrp="1"/>
-          </p:cNvSpPr>
-          <p:nvPr>
-            <p:ph type="dt" sz="half" idx="10"/>
-          </p:nvPr>
-        </p:nvSpPr>
-        <p:spPr/>
-        <p:txBody>
-          <a:bodyPr/>
-          <a:lstStyle>
-            <a:extLst/>
-          </a:lstStyle>
-          <a:p>
-            <a:fld id="{1D8BD707-D9CF-40AE-B4C6-C98DA3205C09}" type="datetimeFigureOut">
-              <a:rPr lang="en-US" smtClean="0"/>
-              <a:pPr/>
-              <a:t>10/29/2013</a:t>
-            </a:fld>
-            <a:endParaRPr lang="en-US"/>
-          </a:p>
-        </p:txBody>
-      </p:sp>
-      <p:sp>
-        <p:nvSpPr>
-          <p:cNvPr id="5" name="Footer Placeholder 4"/>
-          <p:cNvSpPr>
-            <a:spLocks noGrp="1"/>
-          </p:cNvSpPr>
-          <p:nvPr>
-            <p:ph type="ftr" sz="quarter" idx="11"/>
-          </p:nvPr>
-        </p:nvSpPr>
-        <p:spPr/>
-        <p:txBody>
-          <a:bodyPr/>
-          <a:lstStyle>
-            <a:extLst/>
-          </a:lstStyle>
-          <a:p>
-            <a:endParaRPr lang="en-US"/>
-          </a:p>
-        </p:txBody>
-      </p:sp>
-      <p:sp>
-        <p:nvSpPr>
-          <p:cNvPr id="6" name="Slide Number Placeholder 5"/>
-          <p:cNvSpPr>
-            <a:spLocks noGrp="1"/>
-          </p:cNvSpPr>
-          <p:nvPr>
-            <p:ph type="sldNum" sz="quarter" idx="12"/>
-          </p:nvPr>
-        </p:nvSpPr>
-        <p:spPr/>
-        <p:txBody>
-          <a:bodyPr/>
-          <a:lstStyle>
-            <a:extLst/>
-          </a:lstStyle>
-          <a:p>
-            <a:fld id="{B6F15528-21DE-4FAA-801E-634DDDAF4B2B}" type="slidenum">
-              <a:rPr lang="en-US" smtClean="0"/>
-              <a:pPr/>
-              <a:t>‹#›</a:t>
-            </a:fld>
-            <a:endParaRPr lang="en-US"/>
-          </a:p>
-        </p:txBody>
-      </p:sp>
-      <p:sp>
-        <p:nvSpPr>
-          <p:cNvPr id="10" name="Rectangle 9"/>
+              <a:spcAft>
+                <a:spcPts val="0"/>
+              </a:spcAft>
+              <a:defRPr/>
+            </a:pPr>
+            <a:endParaRPr lang="en-US"/>
+          </a:p>
+        </p:txBody>
+      </p:sp>
+      <p:sp>
+        <p:nvSpPr>
+          <p:cNvPr id="5" name="Rectangle 9"/>
           <p:cNvSpPr/>
           <p:nvPr/>
         </p:nvSpPr>
         <p:spPr bwMode="invGray">
           <a:xfrm>
             <a:off x="2286000" y="0"/>
-            <a:ext cx="76200" cy="6858054"/>
+            <a:ext cx="76200" cy="6858000"/>
           </a:xfrm>
           <a:prstGeom prst="rect">
             <a:avLst/>
@@ -1302,14 +1238,22 @@
             <a:extLst/>
           </a:lstStyle>
           <a:p>
-            <a:pPr algn="ctr" eaLnBrk="1" latinLnBrk="0" hangingPunct="1"/>
-            <a:endParaRPr kumimoji="0" lang="en-US"/>
-          </a:p>
-        </p:txBody>
-      </p:sp>
-      <p:sp>
-        <p:nvSpPr>
-          <p:cNvPr id="8" name="Oval 7"/>
+            <a:pPr algn="ctr" fontAlgn="auto">
+              <a:spcBef>
+                <a:spcPts val="0"/>
+              </a:spcBef>
+              <a:spcAft>
+                <a:spcPts val="0"/>
+              </a:spcAft>
+              <a:defRPr/>
+            </a:pPr>
+            <a:endParaRPr lang="en-US"/>
+          </a:p>
+        </p:txBody>
+      </p:sp>
+      <p:sp>
+        <p:nvSpPr>
+          <p:cNvPr id="6" name="Oval 7"/>
           <p:cNvSpPr/>
           <p:nvPr/>
         </p:nvSpPr>
@@ -1389,21 +1333,29 @@
             <a:extLst/>
           </a:lstStyle>
           <a:p>
-            <a:pPr algn="ctr" eaLnBrk="1" latinLnBrk="0" hangingPunct="1"/>
-            <a:endParaRPr kumimoji="0" lang="en-US"/>
-          </a:p>
-        </p:txBody>
-      </p:sp>
-      <p:sp>
-        <p:nvSpPr>
-          <p:cNvPr id="9" name="Oval 8"/>
+            <a:pPr algn="ctr" fontAlgn="auto">
+              <a:spcBef>
+                <a:spcPts val="0"/>
+              </a:spcBef>
+              <a:spcAft>
+                <a:spcPts val="0"/>
+              </a:spcAft>
+              <a:defRPr/>
+            </a:pPr>
+            <a:endParaRPr lang="en-US"/>
+          </a:p>
+        </p:txBody>
+      </p:sp>
+      <p:sp>
+        <p:nvSpPr>
+          <p:cNvPr id="7" name="Oval 8"/>
           <p:cNvSpPr/>
           <p:nvPr/>
         </p:nvSpPr>
         <p:spPr>
           <a:xfrm>
-            <a:off x="2408064" y="2745870"/>
-            <a:ext cx="64008" cy="64008"/>
+            <a:off x="2408238" y="2746375"/>
+            <a:ext cx="63500" cy="63500"/>
           </a:xfrm>
           <a:prstGeom prst="ellipse">
             <a:avLst/>
@@ -1440,8 +1392,235 @@
             <a:extLst/>
           </a:lstStyle>
           <a:p>
-            <a:pPr algn="ctr" eaLnBrk="1" latinLnBrk="0" hangingPunct="1"/>
-            <a:endParaRPr kumimoji="0" lang="en-US"/>
+            <a:pPr algn="ctr" fontAlgn="auto">
+              <a:spcBef>
+                <a:spcPts val="0"/>
+              </a:spcBef>
+              <a:spcAft>
+                <a:spcPts val="0"/>
+              </a:spcAft>
+              <a:defRPr/>
+            </a:pPr>
+            <a:endParaRPr lang="en-US"/>
+          </a:p>
+        </p:txBody>
+      </p:sp>
+      <p:sp>
+        <p:nvSpPr>
+          <p:cNvPr id="2" name="Title 1"/>
+          <p:cNvSpPr>
+            <a:spLocks noGrp="1"/>
+          </p:cNvSpPr>
+          <p:nvPr>
+            <p:ph type="title"/>
+          </p:nvPr>
+        </p:nvSpPr>
+        <p:spPr>
+          <a:xfrm>
+            <a:off x="2578392" y="2600325"/>
+            <a:ext cx="6400800" cy="2286000"/>
+          </a:xfrm>
+        </p:spPr>
+        <p:txBody>
+          <a:bodyPr anchor="t"/>
+          <a:lstStyle>
+            <a:lvl1pPr algn="l">
+              <a:lnSpc>
+                <a:spcPts val="4500"/>
+              </a:lnSpc>
+              <a:buNone/>
+              <a:defRPr sz="4000" b="1" cap="all"/>
+            </a:lvl1pPr>
+            <a:extLst/>
+          </a:lstStyle>
+          <a:p>
+            <a:r>
+              <a:rPr lang="en-US" smtClean="0"/>
+              <a:t>Click to edit Master title style</a:t>
+            </a:r>
+            <a:endParaRPr lang="en-US"/>
+          </a:p>
+        </p:txBody>
+      </p:sp>
+      <p:sp>
+        <p:nvSpPr>
+          <p:cNvPr id="3" name="Text Placeholder 2"/>
+          <p:cNvSpPr>
+            <a:spLocks noGrp="1"/>
+          </p:cNvSpPr>
+          <p:nvPr>
+            <p:ph type="body" idx="1"/>
+          </p:nvPr>
+        </p:nvSpPr>
+        <p:spPr>
+          <a:xfrm>
+            <a:off x="2578392" y="1066800"/>
+            <a:ext cx="6400800" cy="1509712"/>
+          </a:xfrm>
+        </p:spPr>
+        <p:txBody>
+          <a:bodyPr anchor="b"/>
+          <a:lstStyle>
+            <a:lvl1pPr marL="18288" indent="0">
+              <a:lnSpc>
+                <a:spcPts val="2300"/>
+              </a:lnSpc>
+              <a:spcBef>
+                <a:spcPts val="0"/>
+              </a:spcBef>
+              <a:buNone/>
+              <a:defRPr sz="2000">
+                <a:solidFill>
+                  <a:schemeClr val="tx2">
+                    <a:shade val="30000"/>
+                    <a:satMod val="150000"/>
+                  </a:schemeClr>
+                </a:solidFill>
+              </a:defRPr>
+            </a:lvl1pPr>
+            <a:lvl2pPr>
+              <a:buNone/>
+              <a:defRPr sz="1800">
+                <a:solidFill>
+                  <a:schemeClr val="tx1">
+                    <a:tint val="75000"/>
+                  </a:schemeClr>
+                </a:solidFill>
+              </a:defRPr>
+            </a:lvl2pPr>
+            <a:lvl3pPr>
+              <a:buNone/>
+              <a:defRPr sz="1600">
+                <a:solidFill>
+                  <a:schemeClr val="tx1">
+                    <a:tint val="75000"/>
+                  </a:schemeClr>
+                </a:solidFill>
+              </a:defRPr>
+            </a:lvl3pPr>
+            <a:lvl4pPr>
+              <a:buNone/>
+              <a:defRPr sz="1400">
+                <a:solidFill>
+                  <a:schemeClr val="tx1">
+                    <a:tint val="75000"/>
+                  </a:schemeClr>
+                </a:solidFill>
+              </a:defRPr>
+            </a:lvl4pPr>
+            <a:lvl5pPr>
+              <a:buNone/>
+              <a:defRPr sz="1400">
+                <a:solidFill>
+                  <a:schemeClr val="tx1">
+                    <a:tint val="75000"/>
+                  </a:schemeClr>
+                </a:solidFill>
+              </a:defRPr>
+            </a:lvl5pPr>
+            <a:extLst/>
+          </a:lstStyle>
+          <a:p>
+            <a:pPr lvl="0"/>
+            <a:r>
+              <a:rPr lang="en-US" smtClean="0"/>
+              <a:t>Click to edit Master text styles</a:t>
+            </a:r>
+          </a:p>
+        </p:txBody>
+      </p:sp>
+      <p:sp>
+        <p:nvSpPr>
+          <p:cNvPr id="8" name="Date Placeholder 3"/>
+          <p:cNvSpPr>
+            <a:spLocks noGrp="1"/>
+          </p:cNvSpPr>
+          <p:nvPr>
+            <p:ph type="dt" sz="half" idx="10"/>
+          </p:nvPr>
+        </p:nvSpPr>
+        <p:spPr/>
+        <p:txBody>
+          <a:bodyPr/>
+          <a:lstStyle>
+            <a:lvl1pPr>
+              <a:defRPr/>
+            </a:lvl1pPr>
+            <a:extLst/>
+          </a:lstStyle>
+          <a:p>
+            <a:pPr>
+              <a:defRPr/>
+            </a:pPr>
+            <a:fld id="{89A3E6AE-3F2A-4C76-89D7-AAC98A5978AD}" type="datetimeFigureOut">
+              <a:rPr lang="en-US"/>
+              <a:pPr>
+                <a:defRPr/>
+              </a:pPr>
+              <a:t>10/29/2013</a:t>
+            </a:fld>
+            <a:endParaRPr lang="en-US"/>
+          </a:p>
+        </p:txBody>
+      </p:sp>
+      <p:sp>
+        <p:nvSpPr>
+          <p:cNvPr id="9" name="Footer Placeholder 4"/>
+          <p:cNvSpPr>
+            <a:spLocks noGrp="1"/>
+          </p:cNvSpPr>
+          <p:nvPr>
+            <p:ph type="ftr" sz="quarter" idx="11"/>
+          </p:nvPr>
+        </p:nvSpPr>
+        <p:spPr/>
+        <p:txBody>
+          <a:bodyPr/>
+          <a:lstStyle>
+            <a:lvl1pPr>
+              <a:defRPr/>
+            </a:lvl1pPr>
+            <a:extLst/>
+          </a:lstStyle>
+          <a:p>
+            <a:pPr>
+              <a:defRPr/>
+            </a:pPr>
+            <a:endParaRPr lang="en-US"/>
+          </a:p>
+        </p:txBody>
+      </p:sp>
+      <p:sp>
+        <p:nvSpPr>
+          <p:cNvPr id="10" name="Slide Number Placeholder 5"/>
+          <p:cNvSpPr>
+            <a:spLocks noGrp="1"/>
+          </p:cNvSpPr>
+          <p:nvPr>
+            <p:ph type="sldNum" sz="quarter" idx="12"/>
+          </p:nvPr>
+        </p:nvSpPr>
+        <p:spPr/>
+        <p:txBody>
+          <a:bodyPr/>
+          <a:lstStyle>
+            <a:lvl1pPr>
+              <a:defRPr/>
+            </a:lvl1pPr>
+            <a:extLst/>
+          </a:lstStyle>
+          <a:p>
+            <a:pPr>
+              <a:defRPr/>
+            </a:pPr>
+            <a:fld id="{F85FF8D6-11BF-40F5-821C-F3EBEEAC5281}" type="slidenum">
+              <a:rPr lang="en-US"/>
+              <a:pPr>
+                <a:defRPr/>
+              </a:pPr>
+              <a:t>‹#›</a:t>
+            </a:fld>
+            <a:endParaRPr lang="en-US"/>
           </a:p>
         </p:txBody>
       </p:sp>
@@ -1493,10 +1672,10 @@
           </a:lstStyle>
           <a:p>
             <a:r>
-              <a:rPr kumimoji="0" lang="en-US" smtClean="0"/>
+              <a:rPr lang="en-US" smtClean="0"/>
               <a:t>Click to edit Master title style</a:t>
             </a:r>
-            <a:endParaRPr kumimoji="0" lang="en-US"/>
+            <a:endParaRPr lang="en-US"/>
           </a:p>
         </p:txBody>
       </p:sp>
@@ -1537,40 +1716,40 @@
             <a:extLst/>
           </a:lstStyle>
           <a:p>
-            <a:pPr lvl="0" eaLnBrk="1" latinLnBrk="0" hangingPunct="1"/>
+            <a:pPr lvl="0"/>
             <a:r>
               <a:rPr lang="en-US" smtClean="0"/>
               <a:t>Click to edit Master text styles</a:t>
             </a:r>
           </a:p>
           <a:p>
-            <a:pPr lvl="1" eaLnBrk="1" latinLnBrk="0" hangingPunct="1"/>
+            <a:pPr lvl="1"/>
             <a:r>
               <a:rPr lang="en-US" smtClean="0"/>
               <a:t>Second level</a:t>
             </a:r>
           </a:p>
           <a:p>
-            <a:pPr lvl="2" eaLnBrk="1" latinLnBrk="0" hangingPunct="1"/>
+            <a:pPr lvl="2"/>
             <a:r>
               <a:rPr lang="en-US" smtClean="0"/>
               <a:t>Third level</a:t>
             </a:r>
           </a:p>
           <a:p>
-            <a:pPr lvl="3" eaLnBrk="1" latinLnBrk="0" hangingPunct="1"/>
+            <a:pPr lvl="3"/>
             <a:r>
               <a:rPr lang="en-US" smtClean="0"/>
               <a:t>Fourth level</a:t>
             </a:r>
           </a:p>
           <a:p>
-            <a:pPr lvl="4" eaLnBrk="1" latinLnBrk="0" hangingPunct="1"/>
+            <a:pPr lvl="4"/>
             <a:r>
               <a:rPr lang="en-US" smtClean="0"/>
               <a:t>Fifth level</a:t>
             </a:r>
-            <a:endParaRPr kumimoji="0" lang="en-US"/>
+            <a:endParaRPr lang="en-US"/>
           </a:p>
         </p:txBody>
       </p:sp>
@@ -1611,46 +1790,46 @@
             <a:extLst/>
           </a:lstStyle>
           <a:p>
-            <a:pPr lvl="0" eaLnBrk="1" latinLnBrk="0" hangingPunct="1"/>
+            <a:pPr lvl="0"/>
             <a:r>
               <a:rPr lang="en-US" smtClean="0"/>
               <a:t>Click to edit Master text styles</a:t>
             </a:r>
           </a:p>
           <a:p>
-            <a:pPr lvl="1" eaLnBrk="1" latinLnBrk="0" hangingPunct="1"/>
+            <a:pPr lvl="1"/>
             <a:r>
               <a:rPr lang="en-US" smtClean="0"/>
               <a:t>Second level</a:t>
             </a:r>
           </a:p>
           <a:p>
-            <a:pPr lvl="2" eaLnBrk="1" latinLnBrk="0" hangingPunct="1"/>
+            <a:pPr lvl="2"/>
             <a:r>
               <a:rPr lang="en-US" smtClean="0"/>
               <a:t>Third level</a:t>
             </a:r>
           </a:p>
           <a:p>
-            <a:pPr lvl="3" eaLnBrk="1" latinLnBrk="0" hangingPunct="1"/>
+            <a:pPr lvl="3"/>
             <a:r>
               <a:rPr lang="en-US" smtClean="0"/>
               <a:t>Fourth level</a:t>
             </a:r>
           </a:p>
           <a:p>
-            <a:pPr lvl="4" eaLnBrk="1" latinLnBrk="0" hangingPunct="1"/>
+            <a:pPr lvl="4"/>
             <a:r>
               <a:rPr lang="en-US" smtClean="0"/>
               <a:t>Fifth level</a:t>
             </a:r>
-            <a:endParaRPr kumimoji="0" lang="en-US"/>
-          </a:p>
-        </p:txBody>
-      </p:sp>
-      <p:sp>
-        <p:nvSpPr>
-          <p:cNvPr id="5" name="Date Placeholder 4"/>
+            <a:endParaRPr lang="en-US"/>
+          </a:p>
+        </p:txBody>
+      </p:sp>
+      <p:sp>
+        <p:nvSpPr>
+          <p:cNvPr id="5" name="Date Placeholder 23"/>
           <p:cNvSpPr>
             <a:spLocks noGrp="1"/>
           </p:cNvSpPr>
@@ -1662,12 +1841,19 @@
         <p:txBody>
           <a:bodyPr/>
           <a:lstStyle>
-            <a:extLst/>
-          </a:lstStyle>
-          <a:p>
-            <a:fld id="{1D8BD707-D9CF-40AE-B4C6-C98DA3205C09}" type="datetimeFigureOut">
-              <a:rPr lang="en-US" smtClean="0"/>
-              <a:pPr/>
+            <a:lvl1pPr>
+              <a:defRPr/>
+            </a:lvl1pPr>
+          </a:lstStyle>
+          <a:p>
+            <a:pPr>
+              <a:defRPr/>
+            </a:pPr>
+            <a:fld id="{72366FE6-29E2-4822-80F1-35FFC5382CF1}" type="datetimeFigureOut">
+              <a:rPr lang="en-US"/>
+              <a:pPr>
+                <a:defRPr/>
+              </a:pPr>
               <a:t>10/29/2013</a:t>
             </a:fld>
             <a:endParaRPr lang="en-US"/>
@@ -1676,7 +1862,7 @@
       </p:sp>
       <p:sp>
         <p:nvSpPr>
-          <p:cNvPr id="6" name="Footer Placeholder 5"/>
+          <p:cNvPr id="6" name="Footer Placeholder 9"/>
           <p:cNvSpPr>
             <a:spLocks noGrp="1"/>
           </p:cNvSpPr>
@@ -1688,16 +1874,21 @@
         <p:txBody>
           <a:bodyPr/>
           <a:lstStyle>
-            <a:extLst/>
-          </a:lstStyle>
-          <a:p>
-            <a:endParaRPr lang="en-US"/>
-          </a:p>
-        </p:txBody>
-      </p:sp>
-      <p:sp>
-        <p:nvSpPr>
-          <p:cNvPr id="7" name="Slide Number Placeholder 6"/>
+            <a:lvl1pPr>
+              <a:defRPr/>
+            </a:lvl1pPr>
+          </a:lstStyle>
+          <a:p>
+            <a:pPr>
+              <a:defRPr/>
+            </a:pPr>
+            <a:endParaRPr lang="en-US"/>
+          </a:p>
+        </p:txBody>
+      </p:sp>
+      <p:sp>
+        <p:nvSpPr>
+          <p:cNvPr id="7" name="Slide Number Placeholder 21"/>
           <p:cNvSpPr>
             <a:spLocks noGrp="1"/>
           </p:cNvSpPr>
@@ -1709,12 +1900,19 @@
         <p:txBody>
           <a:bodyPr/>
           <a:lstStyle>
-            <a:extLst/>
-          </a:lstStyle>
-          <a:p>
-            <a:fld id="{B6F15528-21DE-4FAA-801E-634DDDAF4B2B}" type="slidenum">
-              <a:rPr lang="en-US" smtClean="0"/>
-              <a:pPr/>
+            <a:lvl1pPr>
+              <a:defRPr/>
+            </a:lvl1pPr>
+          </a:lstStyle>
+          <a:p>
+            <a:pPr>
+              <a:defRPr/>
+            </a:pPr>
+            <a:fld id="{4E030356-F892-40CA-8290-28E7FCC6C83E}" type="slidenum">
+              <a:rPr lang="en-US"/>
+              <a:pPr>
+                <a:defRPr/>
+              </a:pPr>
               <a:t>‹#›</a:t>
             </a:fld>
             <a:endParaRPr lang="en-US"/>
@@ -1763,7 +1961,7 @@
           </a:xfrm>
         </p:spPr>
         <p:txBody>
-          <a:bodyPr anchor="ctr"/>
+          <a:bodyPr/>
           <a:lstStyle>
             <a:lvl1pPr algn="ctr">
               <a:defRPr sz="4500" b="1" cap="none" baseline="0"/>
@@ -1772,10 +1970,10 @@
           </a:lstStyle>
           <a:p>
             <a:r>
-              <a:rPr kumimoji="0" lang="en-US" smtClean="0"/>
+              <a:rPr lang="en-US" smtClean="0"/>
               <a:t>Click to edit Master title style</a:t>
             </a:r>
-            <a:endParaRPr kumimoji="0" lang="en-US"/>
+            <a:endParaRPr lang="en-US"/>
           </a:p>
         </p:txBody>
       </p:sp>
@@ -1840,9 +2038,9 @@
             <a:extLst/>
           </a:lstStyle>
           <a:p>
-            <a:pPr lvl="0" eaLnBrk="1" latinLnBrk="0" hangingPunct="1"/>
-            <a:r>
-              <a:rPr kumimoji="0" lang="en-US" smtClean="0"/>
+            <a:pPr lvl="0"/>
+            <a:r>
+              <a:rPr lang="en-US" smtClean="0"/>
               <a:t>Click to edit Master text styles</a:t>
             </a:r>
           </a:p>
@@ -1909,9 +2107,9 @@
             <a:extLst/>
           </a:lstStyle>
           <a:p>
-            <a:pPr lvl="0" eaLnBrk="1" latinLnBrk="0" hangingPunct="1"/>
-            <a:r>
-              <a:rPr kumimoji="0" lang="en-US" smtClean="0"/>
+            <a:pPr lvl="0"/>
+            <a:r>
+              <a:rPr lang="en-US" smtClean="0"/>
               <a:t>Click to edit Master text styles</a:t>
             </a:r>
           </a:p>
@@ -1991,40 +2189,40 @@
             <a:extLst/>
           </a:lstStyle>
           <a:p>
-            <a:pPr lvl="0" eaLnBrk="1" latinLnBrk="0" hangingPunct="1"/>
+            <a:pPr lvl="0"/>
             <a:r>
               <a:rPr lang="en-US" smtClean="0"/>
               <a:t>Click to edit Master text styles</a:t>
             </a:r>
           </a:p>
           <a:p>
-            <a:pPr lvl="1" eaLnBrk="1" latinLnBrk="0" hangingPunct="1"/>
+            <a:pPr lvl="1"/>
             <a:r>
               <a:rPr lang="en-US" smtClean="0"/>
               <a:t>Second level</a:t>
             </a:r>
           </a:p>
           <a:p>
-            <a:pPr lvl="2" eaLnBrk="1" latinLnBrk="0" hangingPunct="1"/>
+            <a:pPr lvl="2"/>
             <a:r>
               <a:rPr lang="en-US" smtClean="0"/>
               <a:t>Third level</a:t>
             </a:r>
           </a:p>
           <a:p>
-            <a:pPr lvl="3" eaLnBrk="1" latinLnBrk="0" hangingPunct="1"/>
+            <a:pPr lvl="3"/>
             <a:r>
               <a:rPr lang="en-US" smtClean="0"/>
               <a:t>Fourth level</a:t>
             </a:r>
           </a:p>
           <a:p>
-            <a:pPr lvl="4" eaLnBrk="1" latinLnBrk="0" hangingPunct="1"/>
+            <a:pPr lvl="4"/>
             <a:r>
               <a:rPr lang="en-US" smtClean="0"/>
               <a:t>Fifth level</a:t>
             </a:r>
-            <a:endParaRPr kumimoji="0" lang="en-US"/>
+            <a:endParaRPr lang="en-US"/>
           </a:p>
         </p:txBody>
       </p:sp>
@@ -2102,40 +2300,40 @@
             <a:extLst/>
           </a:lstStyle>
           <a:p>
-            <a:pPr lvl="0" eaLnBrk="1" latinLnBrk="0" hangingPunct="1"/>
+            <a:pPr lvl="0"/>
             <a:r>
               <a:rPr lang="en-US" smtClean="0"/>
               <a:t>Click to edit Master text styles</a:t>
             </a:r>
           </a:p>
           <a:p>
-            <a:pPr lvl="1" eaLnBrk="1" latinLnBrk="0" hangingPunct="1"/>
+            <a:pPr lvl="1"/>
             <a:r>
               <a:rPr lang="en-US" smtClean="0"/>
               <a:t>Second level</a:t>
             </a:r>
           </a:p>
           <a:p>
-            <a:pPr lvl="2" eaLnBrk="1" latinLnBrk="0" hangingPunct="1"/>
+            <a:pPr lvl="2"/>
             <a:r>
               <a:rPr lang="en-US" smtClean="0"/>
               <a:t>Third level</a:t>
             </a:r>
           </a:p>
           <a:p>
-            <a:pPr lvl="3" eaLnBrk="1" latinLnBrk="0" hangingPunct="1"/>
+            <a:pPr lvl="3"/>
             <a:r>
               <a:rPr lang="en-US" smtClean="0"/>
               <a:t>Fourth level</a:t>
             </a:r>
           </a:p>
           <a:p>
-            <a:pPr lvl="4" eaLnBrk="1" latinLnBrk="0" hangingPunct="1"/>
+            <a:pPr lvl="4"/>
             <a:r>
               <a:rPr lang="en-US" smtClean="0"/>
               <a:t>Fifth level</a:t>
             </a:r>
-            <a:endParaRPr kumimoji="0" lang="en-US"/>
+            <a:endParaRPr lang="en-US"/>
           </a:p>
         </p:txBody>
       </p:sp>
@@ -2153,12 +2351,20 @@
         <p:txBody>
           <a:bodyPr/>
           <a:lstStyle>
-            <a:extLst/>
-          </a:lstStyle>
-          <a:p>
-            <a:fld id="{1D8BD707-D9CF-40AE-B4C6-C98DA3205C09}" type="datetimeFigureOut">
-              <a:rPr lang="en-US" smtClean="0"/>
-              <a:pPr/>
+            <a:lvl1pPr>
+              <a:defRPr/>
+            </a:lvl1pPr>
+            <a:extLst/>
+          </a:lstStyle>
+          <a:p>
+            <a:pPr>
+              <a:defRPr/>
+            </a:pPr>
+            <a:fld id="{32221E24-7467-440B-9BCB-1344D57B51A4}" type="datetimeFigureOut">
+              <a:rPr lang="en-US"/>
+              <a:pPr>
+                <a:defRPr/>
+              </a:pPr>
               <a:t>10/29/2013</a:t>
             </a:fld>
             <a:endParaRPr lang="en-US"/>
@@ -2179,9 +2385,15 @@
         <p:txBody>
           <a:bodyPr/>
           <a:lstStyle>
-            <a:extLst/>
-          </a:lstStyle>
-          <a:p>
+            <a:lvl1pPr>
+              <a:defRPr/>
+            </a:lvl1pPr>
+            <a:extLst/>
+          </a:lstStyle>
+          <a:p>
+            <a:pPr>
+              <a:defRPr/>
+            </a:pPr>
             <a:endParaRPr lang="en-US"/>
           </a:p>
         </p:txBody>
@@ -2200,12 +2412,20 @@
         <p:txBody>
           <a:bodyPr/>
           <a:lstStyle>
-            <a:extLst/>
-          </a:lstStyle>
-          <a:p>
-            <a:fld id="{B6F15528-21DE-4FAA-801E-634DDDAF4B2B}" type="slidenum">
-              <a:rPr lang="en-US" smtClean="0"/>
-              <a:pPr/>
+            <a:lvl1pPr>
+              <a:defRPr/>
+            </a:lvl1pPr>
+            <a:extLst/>
+          </a:lstStyle>
+          <a:p>
+            <a:pPr>
+              <a:defRPr/>
+            </a:pPr>
+            <a:fld id="{56F8BAC7-072C-49CE-ACA9-7530A1DFBECE}" type="slidenum">
+              <a:rPr lang="en-US"/>
+              <a:pPr>
+                <a:defRPr/>
+              </a:pPr>
               <a:t>‹#›</a:t>
             </a:fld>
             <a:endParaRPr lang="en-US"/>
@@ -2254,22 +2474,22 @@
           </a:xfrm>
         </p:spPr>
         <p:txBody>
-          <a:bodyPr anchor="ctr"/>
-          <a:lstStyle>
-            <a:extLst/>
-          </a:lstStyle>
-          <a:p>
-            <a:r>
-              <a:rPr kumimoji="0" lang="en-US" smtClean="0"/>
+          <a:bodyPr/>
+          <a:lstStyle>
+            <a:extLst/>
+          </a:lstStyle>
+          <a:p>
+            <a:r>
+              <a:rPr lang="en-US" smtClean="0"/>
               <a:t>Click to edit Master title style</a:t>
             </a:r>
-            <a:endParaRPr kumimoji="0" lang="en-US"/>
-          </a:p>
-        </p:txBody>
-      </p:sp>
-      <p:sp>
-        <p:nvSpPr>
-          <p:cNvPr id="3" name="Date Placeholder 2"/>
+            <a:endParaRPr lang="en-US"/>
+          </a:p>
+        </p:txBody>
+      </p:sp>
+      <p:sp>
+        <p:nvSpPr>
+          <p:cNvPr id="3" name="Date Placeholder 23"/>
           <p:cNvSpPr>
             <a:spLocks noGrp="1"/>
           </p:cNvSpPr>
@@ -2281,12 +2501,19 @@
         <p:txBody>
           <a:bodyPr/>
           <a:lstStyle>
-            <a:extLst/>
-          </a:lstStyle>
-          <a:p>
-            <a:fld id="{1D8BD707-D9CF-40AE-B4C6-C98DA3205C09}" type="datetimeFigureOut">
-              <a:rPr lang="en-US" smtClean="0"/>
-              <a:pPr/>
+            <a:lvl1pPr>
+              <a:defRPr/>
+            </a:lvl1pPr>
+          </a:lstStyle>
+          <a:p>
+            <a:pPr>
+              <a:defRPr/>
+            </a:pPr>
+            <a:fld id="{BF8A4577-4982-4EA4-AD2E-E86438C71666}" type="datetimeFigureOut">
+              <a:rPr lang="en-US"/>
+              <a:pPr>
+                <a:defRPr/>
+              </a:pPr>
               <a:t>10/29/2013</a:t>
             </a:fld>
             <a:endParaRPr lang="en-US"/>
@@ -2295,7 +2522,7 @@
       </p:sp>
       <p:sp>
         <p:nvSpPr>
-          <p:cNvPr id="4" name="Footer Placeholder 3"/>
+          <p:cNvPr id="4" name="Footer Placeholder 9"/>
           <p:cNvSpPr>
             <a:spLocks noGrp="1"/>
           </p:cNvSpPr>
@@ -2307,16 +2534,21 @@
         <p:txBody>
           <a:bodyPr/>
           <a:lstStyle>
-            <a:extLst/>
-          </a:lstStyle>
-          <a:p>
-            <a:endParaRPr lang="en-US"/>
-          </a:p>
-        </p:txBody>
-      </p:sp>
-      <p:sp>
-        <p:nvSpPr>
-          <p:cNvPr id="5" name="Slide Number Placeholder 4"/>
+            <a:lvl1pPr>
+              <a:defRPr/>
+            </a:lvl1pPr>
+          </a:lstStyle>
+          <a:p>
+            <a:pPr>
+              <a:defRPr/>
+            </a:pPr>
+            <a:endParaRPr lang="en-US"/>
+          </a:p>
+        </p:txBody>
+      </p:sp>
+      <p:sp>
+        <p:nvSpPr>
+          <p:cNvPr id="5" name="Slide Number Placeholder 21"/>
           <p:cNvSpPr>
             <a:spLocks noGrp="1"/>
           </p:cNvSpPr>
@@ -2328,12 +2560,19 @@
         <p:txBody>
           <a:bodyPr/>
           <a:lstStyle>
-            <a:extLst/>
-          </a:lstStyle>
-          <a:p>
-            <a:fld id="{B6F15528-21DE-4FAA-801E-634DDDAF4B2B}" type="slidenum">
-              <a:rPr lang="en-US" smtClean="0"/>
-              <a:pPr/>
+            <a:lvl1pPr>
+              <a:defRPr/>
+            </a:lvl1pPr>
+          </a:lstStyle>
+          <a:p>
+            <a:pPr>
+              <a:defRPr/>
+            </a:pPr>
+            <a:fld id="{3BE32D01-34DA-4DFC-BFFC-3AFAC719A96C}" type="slidenum">
+              <a:rPr lang="en-US"/>
+              <a:pPr>
+                <a:defRPr/>
+              </a:pPr>
               <a:t>‹#›</a:t>
             </a:fld>
             <a:endParaRPr lang="en-US"/>
@@ -2367,14 +2606,14 @@
       </p:grpSpPr>
       <p:sp>
         <p:nvSpPr>
-          <p:cNvPr id="5" name="Rectangle 4"/>
+          <p:cNvPr id="2" name="Rectangle 4"/>
           <p:cNvSpPr/>
           <p:nvPr/>
         </p:nvSpPr>
         <p:spPr>
           <a:xfrm>
-            <a:off x="1014984" y="0"/>
-            <a:ext cx="8129016" cy="6858000"/>
+            <a:off x="1014413" y="0"/>
+            <a:ext cx="8129587" cy="6858000"/>
           </a:xfrm>
           <a:prstGeom prst="rect">
             <a:avLst/>
@@ -2408,94 +2647,29 @@
             <a:extLst/>
           </a:lstStyle>
           <a:p>
-            <a:pPr algn="ctr" eaLnBrk="1" latinLnBrk="0" hangingPunct="1"/>
-            <a:endParaRPr kumimoji="0" lang="en-US"/>
-          </a:p>
-        </p:txBody>
-      </p:sp>
-      <p:sp>
-        <p:nvSpPr>
-          <p:cNvPr id="2" name="Date Placeholder 1"/>
-          <p:cNvSpPr>
-            <a:spLocks noGrp="1"/>
-          </p:cNvSpPr>
-          <p:nvPr>
-            <p:ph type="dt" sz="half" idx="10"/>
-          </p:nvPr>
-        </p:nvSpPr>
-        <p:spPr/>
-        <p:txBody>
-          <a:bodyPr/>
-          <a:lstStyle>
-            <a:extLst/>
-          </a:lstStyle>
-          <a:p>
-            <a:fld id="{1D8BD707-D9CF-40AE-B4C6-C98DA3205C09}" type="datetimeFigureOut">
-              <a:rPr lang="en-US" smtClean="0"/>
-              <a:pPr/>
-              <a:t>10/29/2013</a:t>
-            </a:fld>
-            <a:endParaRPr lang="en-US"/>
-          </a:p>
-        </p:txBody>
-      </p:sp>
-      <p:sp>
-        <p:nvSpPr>
-          <p:cNvPr id="3" name="Footer Placeholder 2"/>
-          <p:cNvSpPr>
-            <a:spLocks noGrp="1"/>
-          </p:cNvSpPr>
-          <p:nvPr>
-            <p:ph type="ftr" sz="quarter" idx="11"/>
-          </p:nvPr>
-        </p:nvSpPr>
-        <p:spPr/>
-        <p:txBody>
-          <a:bodyPr/>
-          <a:lstStyle>
-            <a:extLst/>
-          </a:lstStyle>
-          <a:p>
-            <a:endParaRPr lang="en-US"/>
-          </a:p>
-        </p:txBody>
-      </p:sp>
-      <p:sp>
-        <p:nvSpPr>
-          <p:cNvPr id="4" name="Slide Number Placeholder 3"/>
-          <p:cNvSpPr>
-            <a:spLocks noGrp="1"/>
-          </p:cNvSpPr>
-          <p:nvPr>
-            <p:ph type="sldNum" sz="quarter" idx="12"/>
-          </p:nvPr>
-        </p:nvSpPr>
-        <p:spPr/>
-        <p:txBody>
-          <a:bodyPr/>
-          <a:lstStyle>
-            <a:extLst/>
-          </a:lstStyle>
-          <a:p>
-            <a:fld id="{B6F15528-21DE-4FAA-801E-634DDDAF4B2B}" type="slidenum">
-              <a:rPr lang="en-US" smtClean="0"/>
-              <a:pPr/>
-              <a:t>‹#›</a:t>
-            </a:fld>
-            <a:endParaRPr lang="en-US"/>
-          </a:p>
-        </p:txBody>
-      </p:sp>
-      <p:sp>
-        <p:nvSpPr>
-          <p:cNvPr id="6" name="Rectangle 5"/>
+            <a:pPr algn="ctr" fontAlgn="auto">
+              <a:spcBef>
+                <a:spcPts val="0"/>
+              </a:spcBef>
+              <a:spcAft>
+                <a:spcPts val="0"/>
+              </a:spcAft>
+              <a:defRPr/>
+            </a:pPr>
+            <a:endParaRPr lang="en-US"/>
+          </a:p>
+        </p:txBody>
+      </p:sp>
+      <p:sp>
+        <p:nvSpPr>
+          <p:cNvPr id="3" name="Rectangle 5"/>
           <p:cNvSpPr/>
           <p:nvPr/>
         </p:nvSpPr>
         <p:spPr bwMode="invGray">
           <a:xfrm>
-            <a:off x="1014984" y="-54"/>
-            <a:ext cx="73152" cy="6858054"/>
+            <a:off x="1014413" y="0"/>
+            <a:ext cx="73025" cy="6858000"/>
           </a:xfrm>
           <a:prstGeom prst="rect">
             <a:avLst/>
@@ -2537,8 +2711,111 @@
             <a:extLst/>
           </a:lstStyle>
           <a:p>
-            <a:pPr algn="ctr" eaLnBrk="1" latinLnBrk="0" hangingPunct="1"/>
-            <a:endParaRPr kumimoji="0" lang="en-US"/>
+            <a:pPr algn="ctr" fontAlgn="auto">
+              <a:spcBef>
+                <a:spcPts val="0"/>
+              </a:spcBef>
+              <a:spcAft>
+                <a:spcPts val="0"/>
+              </a:spcAft>
+              <a:defRPr/>
+            </a:pPr>
+            <a:endParaRPr lang="en-US"/>
+          </a:p>
+        </p:txBody>
+      </p:sp>
+      <p:sp>
+        <p:nvSpPr>
+          <p:cNvPr id="4" name="Date Placeholder 1"/>
+          <p:cNvSpPr>
+            <a:spLocks noGrp="1"/>
+          </p:cNvSpPr>
+          <p:nvPr>
+            <p:ph type="dt" sz="half" idx="10"/>
+          </p:nvPr>
+        </p:nvSpPr>
+        <p:spPr/>
+        <p:txBody>
+          <a:bodyPr/>
+          <a:lstStyle>
+            <a:lvl1pPr>
+              <a:defRPr/>
+            </a:lvl1pPr>
+            <a:extLst/>
+          </a:lstStyle>
+          <a:p>
+            <a:pPr>
+              <a:defRPr/>
+            </a:pPr>
+            <a:fld id="{D1860AC2-00EF-459F-8EC2-45B44752D84E}" type="datetimeFigureOut">
+              <a:rPr lang="en-US"/>
+              <a:pPr>
+                <a:defRPr/>
+              </a:pPr>
+              <a:t>10/29/2013</a:t>
+            </a:fld>
+            <a:endParaRPr lang="en-US"/>
+          </a:p>
+        </p:txBody>
+      </p:sp>
+      <p:sp>
+        <p:nvSpPr>
+          <p:cNvPr id="5" name="Footer Placeholder 2"/>
+          <p:cNvSpPr>
+            <a:spLocks noGrp="1"/>
+          </p:cNvSpPr>
+          <p:nvPr>
+            <p:ph type="ftr" sz="quarter" idx="11"/>
+          </p:nvPr>
+        </p:nvSpPr>
+        <p:spPr/>
+        <p:txBody>
+          <a:bodyPr/>
+          <a:lstStyle>
+            <a:lvl1pPr>
+              <a:defRPr/>
+            </a:lvl1pPr>
+            <a:extLst/>
+          </a:lstStyle>
+          <a:p>
+            <a:pPr>
+              <a:defRPr/>
+            </a:pPr>
+            <a:endParaRPr lang="en-US"/>
+          </a:p>
+        </p:txBody>
+      </p:sp>
+      <p:sp>
+        <p:nvSpPr>
+          <p:cNvPr id="6" name="Slide Number Placeholder 3"/>
+          <p:cNvSpPr>
+            <a:spLocks noGrp="1"/>
+          </p:cNvSpPr>
+          <p:nvPr>
+            <p:ph type="sldNum" sz="quarter" idx="12"/>
+          </p:nvPr>
+        </p:nvSpPr>
+        <p:spPr/>
+        <p:txBody>
+          <a:bodyPr/>
+          <a:lstStyle>
+            <a:lvl1pPr>
+              <a:defRPr/>
+            </a:lvl1pPr>
+            <a:extLst/>
+          </a:lstStyle>
+          <a:p>
+            <a:pPr>
+              <a:defRPr/>
+            </a:pPr>
+            <a:fld id="{1B4F53E6-CE87-4A41-B954-A3C88CA00223}" type="slidenum">
+              <a:rPr lang="en-US"/>
+              <a:pPr>
+                <a:defRPr/>
+              </a:pPr>
+              <a:t>‹#›</a:t>
+            </a:fld>
+            <a:endParaRPr lang="en-US"/>
           </a:p>
         </p:txBody>
       </p:sp>
@@ -2600,10 +2877,10 @@
           </a:lstStyle>
           <a:p>
             <a:r>
-              <a:rPr kumimoji="0" lang="en-US" smtClean="0"/>
+              <a:rPr lang="en-US" smtClean="0"/>
               <a:t>Click to edit Master title style</a:t>
             </a:r>
-            <a:endParaRPr kumimoji="0" lang="en-US"/>
+            <a:endParaRPr lang="en-US"/>
           </a:p>
         </p:txBody>
       </p:sp>
@@ -2655,9 +2932,9 @@
             <a:extLst/>
           </a:lstStyle>
           <a:p>
-            <a:pPr lvl="0" eaLnBrk="1" latinLnBrk="0" hangingPunct="1"/>
-            <a:r>
-              <a:rPr kumimoji="0" lang="en-US" smtClean="0"/>
+            <a:pPr lvl="0"/>
+            <a:r>
+              <a:rPr lang="en-US" smtClean="0"/>
               <a:t>Click to edit Master text styles</a:t>
             </a:r>
           </a:p>
@@ -2700,40 +2977,40 @@
             <a:extLst/>
           </a:lstStyle>
           <a:p>
-            <a:pPr lvl="0" eaLnBrk="1" latinLnBrk="0" hangingPunct="1"/>
+            <a:pPr lvl="0"/>
             <a:r>
               <a:rPr lang="en-US" smtClean="0"/>
               <a:t>Click to edit Master text styles</a:t>
             </a:r>
           </a:p>
           <a:p>
-            <a:pPr lvl="1" eaLnBrk="1" latinLnBrk="0" hangingPunct="1"/>
+            <a:pPr lvl="1"/>
             <a:r>
               <a:rPr lang="en-US" smtClean="0"/>
               <a:t>Second level</a:t>
             </a:r>
           </a:p>
           <a:p>
-            <a:pPr lvl="2" eaLnBrk="1" latinLnBrk="0" hangingPunct="1"/>
+            <a:pPr lvl="2"/>
             <a:r>
               <a:rPr lang="en-US" smtClean="0"/>
               <a:t>Third level</a:t>
             </a:r>
           </a:p>
           <a:p>
-            <a:pPr lvl="3" eaLnBrk="1" latinLnBrk="0" hangingPunct="1"/>
+            <a:pPr lvl="3"/>
             <a:r>
               <a:rPr lang="en-US" smtClean="0"/>
               <a:t>Fourth level</a:t>
             </a:r>
           </a:p>
           <a:p>
-            <a:pPr lvl="4" eaLnBrk="1" latinLnBrk="0" hangingPunct="1"/>
+            <a:pPr lvl="4"/>
             <a:r>
               <a:rPr lang="en-US" smtClean="0"/>
               <a:t>Fifth level</a:t>
             </a:r>
-            <a:endParaRPr kumimoji="0" lang="en-US"/>
+            <a:endParaRPr lang="en-US"/>
           </a:p>
         </p:txBody>
       </p:sp>
@@ -2751,12 +3028,20 @@
         <p:txBody>
           <a:bodyPr/>
           <a:lstStyle>
-            <a:extLst/>
-          </a:lstStyle>
-          <a:p>
-            <a:fld id="{1D8BD707-D9CF-40AE-B4C6-C98DA3205C09}" type="datetimeFigureOut">
-              <a:rPr lang="en-US" smtClean="0"/>
-              <a:pPr/>
+            <a:lvl1pPr>
+              <a:defRPr/>
+            </a:lvl1pPr>
+            <a:extLst/>
+          </a:lstStyle>
+          <a:p>
+            <a:pPr>
+              <a:defRPr/>
+            </a:pPr>
+            <a:fld id="{67F42B3F-FA62-4FF5-8B31-6A7F8EC586E0}" type="datetimeFigureOut">
+              <a:rPr lang="en-US"/>
+              <a:pPr>
+                <a:defRPr/>
+              </a:pPr>
               <a:t>10/29/2013</a:t>
             </a:fld>
             <a:endParaRPr lang="en-US"/>
@@ -2777,9 +3062,15 @@
         <p:txBody>
           <a:bodyPr/>
           <a:lstStyle>
-            <a:extLst/>
-          </a:lstStyle>
-          <a:p>
+            <a:lvl1pPr>
+              <a:defRPr/>
+            </a:lvl1pPr>
+            <a:extLst/>
+          </a:lstStyle>
+          <a:p>
+            <a:pPr>
+              <a:defRPr/>
+            </a:pPr>
             <a:endParaRPr lang="en-US"/>
           </a:p>
         </p:txBody>
@@ -2798,12 +3089,20 @@
         <p:txBody>
           <a:bodyPr/>
           <a:lstStyle>
-            <a:extLst/>
-          </a:lstStyle>
-          <a:p>
-            <a:fld id="{B6F15528-21DE-4FAA-801E-634DDDAF4B2B}" type="slidenum">
-              <a:rPr lang="en-US" smtClean="0"/>
-              <a:pPr/>
+            <a:lvl1pPr>
+              <a:defRPr/>
+            </a:lvl1pPr>
+            <a:extLst/>
+          </a:lstStyle>
+          <a:p>
+            <a:pPr>
+              <a:defRPr/>
+            </a:pPr>
+            <a:fld id="{E88A7CBE-B410-461E-9640-2A2D181A4D74}" type="slidenum">
+              <a:rPr lang="en-US"/>
+              <a:pPr>
+                <a:defRPr/>
+              </a:pPr>
               <a:t>‹#›</a:t>
             </a:fld>
             <a:endParaRPr lang="en-US"/>
@@ -2837,118 +3136,7 @@
       </p:grpSpPr>
       <p:sp>
         <p:nvSpPr>
-          <p:cNvPr id="2" name="Title 1"/>
-          <p:cNvSpPr>
-            <a:spLocks noGrp="1"/>
-          </p:cNvSpPr>
-          <p:nvPr>
-            <p:ph type="title"/>
-          </p:nvPr>
-        </p:nvSpPr>
-        <p:spPr>
-          <a:xfrm>
-            <a:off x="5886896" y="1066800"/>
-            <a:ext cx="2743200" cy="1981200"/>
-          </a:xfrm>
-        </p:spPr>
-        <p:txBody>
-          <a:bodyPr anchor="b">
-            <a:noAutofit/>
-          </a:bodyPr>
-          <a:lstStyle>
-            <a:lvl1pPr algn="l">
-              <a:buNone/>
-              <a:defRPr sz="2100" b="1">
-                <a:effectLst/>
-              </a:defRPr>
-            </a:lvl1pPr>
-            <a:extLst/>
-          </a:lstStyle>
-          <a:p>
-            <a:r>
-              <a:rPr kumimoji="0" lang="en-US" smtClean="0"/>
-              <a:t>Click to edit Master title style</a:t>
-            </a:r>
-            <a:endParaRPr kumimoji="0" lang="en-US"/>
-          </a:p>
-        </p:txBody>
-      </p:sp>
-      <p:sp>
-        <p:nvSpPr>
-          <p:cNvPr id="5" name="Date Placeholder 4"/>
-          <p:cNvSpPr>
-            <a:spLocks noGrp="1"/>
-          </p:cNvSpPr>
-          <p:nvPr>
-            <p:ph type="dt" sz="half" idx="10"/>
-          </p:nvPr>
-        </p:nvSpPr>
-        <p:spPr/>
-        <p:txBody>
-          <a:bodyPr/>
-          <a:lstStyle>
-            <a:extLst/>
-          </a:lstStyle>
-          <a:p>
-            <a:fld id="{1D8BD707-D9CF-40AE-B4C6-C98DA3205C09}" type="datetimeFigureOut">
-              <a:rPr lang="en-US" smtClean="0"/>
-              <a:pPr/>
-              <a:t>10/29/2013</a:t>
-            </a:fld>
-            <a:endParaRPr lang="en-US"/>
-          </a:p>
-        </p:txBody>
-      </p:sp>
-      <p:sp>
-        <p:nvSpPr>
-          <p:cNvPr id="6" name="Footer Placeholder 5"/>
-          <p:cNvSpPr>
-            <a:spLocks noGrp="1"/>
-          </p:cNvSpPr>
-          <p:nvPr>
-            <p:ph type="ftr" sz="quarter" idx="11"/>
-          </p:nvPr>
-        </p:nvSpPr>
-        <p:spPr/>
-        <p:txBody>
-          <a:bodyPr/>
-          <a:lstStyle>
-            <a:extLst/>
-          </a:lstStyle>
-          <a:p>
-            <a:endParaRPr lang="en-US"/>
-          </a:p>
-        </p:txBody>
-      </p:sp>
-      <p:sp>
-        <p:nvSpPr>
-          <p:cNvPr id="7" name="Slide Number Placeholder 6"/>
-          <p:cNvSpPr>
-            <a:spLocks noGrp="1"/>
-          </p:cNvSpPr>
-          <p:nvPr>
-            <p:ph type="sldNum" sz="quarter" idx="12"/>
-          </p:nvPr>
-        </p:nvSpPr>
-        <p:spPr/>
-        <p:txBody>
-          <a:bodyPr/>
-          <a:lstStyle>
-            <a:extLst/>
-          </a:lstStyle>
-          <a:p>
-            <a:fld id="{B6F15528-21DE-4FAA-801E-634DDDAF4B2B}" type="slidenum">
-              <a:rPr lang="en-US" smtClean="0"/>
-              <a:pPr/>
-              <a:t>‹#›</a:t>
-            </a:fld>
-            <a:endParaRPr lang="en-US"/>
-          </a:p>
-        </p:txBody>
-      </p:sp>
-      <p:sp>
-        <p:nvSpPr>
-          <p:cNvPr id="8" name="Rectangle 7"/>
+          <p:cNvPr id="5" name="Rectangle 7"/>
           <p:cNvSpPr/>
           <p:nvPr/>
         </p:nvSpPr>
@@ -2990,96 +3178,47 @@
           </a:sp3d>
         </p:spPr>
         <p:txBody>
-          <a:bodyPr lIns="91440" tIns="274320" rtlCol="0" anchor="t">
+          <a:bodyPr tIns="274320">
             <a:normAutofit/>
           </a:bodyPr>
           <a:lstStyle>
             <a:extLst/>
           </a:lstStyle>
           <a:p>
-            <a:pPr marL="0" indent="-283464" algn="l" rtl="0" eaLnBrk="1" latinLnBrk="0" hangingPunct="1">
+            <a:pPr indent="-283464" fontAlgn="auto">
               <a:lnSpc>
                 <a:spcPts val="3000"/>
               </a:lnSpc>
               <a:spcBef>
                 <a:spcPts val="600"/>
               </a:spcBef>
+              <a:spcAft>
+                <a:spcPts val="0"/>
+              </a:spcAft>
               <a:buClr>
                 <a:schemeClr val="accent1"/>
               </a:buClr>
               <a:buSzPct val="80000"/>
               <a:buFont typeface="Wingdings 2"/>
               <a:buNone/>
-            </a:pPr>
-            <a:endParaRPr kumimoji="0" lang="en-US" sz="3200" kern="1200">
-              <a:solidFill>
-                <a:schemeClr val="tx1"/>
-              </a:solidFill>
+              <a:defRPr/>
+            </a:pPr>
+            <a:endParaRPr lang="en-US" sz="3200">
               <a:latin typeface="+mn-lt"/>
-              <a:ea typeface="+mn-ea"/>
-              <a:cs typeface="+mn-cs"/>
             </a:endParaRPr>
           </a:p>
         </p:txBody>
       </p:sp>
       <p:sp>
         <p:nvSpPr>
-          <p:cNvPr id="3" name="Picture Placeholder 2"/>
-          <p:cNvSpPr>
-            <a:spLocks noGrp="1"/>
-          </p:cNvSpPr>
-          <p:nvPr>
-            <p:ph type="pic" idx="1"/>
-          </p:nvPr>
-        </p:nvSpPr>
-        <p:spPr>
-          <a:xfrm>
-            <a:off x="838200" y="1143003"/>
-            <a:ext cx="4419600" cy="3514531"/>
-          </a:xfrm>
-          <a:prstGeom prst="roundRect">
-            <a:avLst>
-              <a:gd name="adj" fmla="val 783"/>
-            </a:avLst>
-          </a:prstGeom>
-          <a:solidFill>
-            <a:schemeClr val="bg2"/>
-          </a:solidFill>
-          <a:ln w="127000">
-            <a:noFill/>
-            <a:miter lim="800000"/>
-          </a:ln>
-          <a:effectLst/>
-        </p:spPr>
-        <p:txBody>
-          <a:bodyPr lIns="91440" tIns="274320" anchor="t"/>
-          <a:lstStyle>
-            <a:lvl1pPr indent="0">
-              <a:buNone/>
-              <a:defRPr sz="3200"/>
-            </a:lvl1pPr>
-            <a:extLst/>
-          </a:lstStyle>
-          <a:p>
-            <a:pPr marL="0" algn="l" eaLnBrk="1" latinLnBrk="0" hangingPunct="1"/>
-            <a:r>
-              <a:rPr kumimoji="0" lang="en-US" smtClean="0"/>
-              <a:t>Click icon to add picture</a:t>
-            </a:r>
-            <a:endParaRPr kumimoji="0" lang="en-US" dirty="0"/>
-          </a:p>
-        </p:txBody>
-      </p:sp>
-      <p:sp>
-        <p:nvSpPr>
-          <p:cNvPr id="9" name="Flowchart: Process 8"/>
+          <p:cNvPr id="6" name="Flowchart: Process 8"/>
           <p:cNvSpPr/>
           <p:nvPr/>
         </p:nvSpPr>
         <p:spPr>
           <a:xfrm rot="19468671">
-            <a:off x="396725" y="954341"/>
-            <a:ext cx="685800" cy="204310"/>
+            <a:off x="396875" y="954088"/>
+            <a:ext cx="685800" cy="204787"/>
           </a:xfrm>
           <a:prstGeom prst="flowChartProcess">
             <a:avLst/>
@@ -3127,21 +3266,29 @@
             <a:extLst/>
           </a:lstStyle>
           <a:p>
-            <a:pPr algn="ctr" eaLnBrk="1" latinLnBrk="0" hangingPunct="1"/>
-            <a:endParaRPr kumimoji="0" lang="en-US"/>
-          </a:p>
-        </p:txBody>
-      </p:sp>
-      <p:sp>
-        <p:nvSpPr>
-          <p:cNvPr id="10" name="Flowchart: Process 9"/>
+            <a:pPr algn="ctr" fontAlgn="auto">
+              <a:spcBef>
+                <a:spcPts val="0"/>
+              </a:spcBef>
+              <a:spcAft>
+                <a:spcPts val="0"/>
+              </a:spcAft>
+              <a:defRPr/>
+            </a:pPr>
+            <a:endParaRPr lang="en-US"/>
+          </a:p>
+        </p:txBody>
+      </p:sp>
+      <p:sp>
+        <p:nvSpPr>
+          <p:cNvPr id="7" name="Flowchart: Process 9"/>
           <p:cNvSpPr/>
           <p:nvPr/>
         </p:nvSpPr>
         <p:spPr>
           <a:xfrm rot="2103354" flipH="1">
-            <a:off x="5003667" y="936786"/>
-            <a:ext cx="649224" cy="204310"/>
+            <a:off x="5003800" y="936625"/>
+            <a:ext cx="649288" cy="204788"/>
           </a:xfrm>
           <a:prstGeom prst="flowChartProcess">
             <a:avLst/>
@@ -3187,8 +3334,104 @@
             <a:extLst/>
           </a:lstStyle>
           <a:p>
-            <a:pPr algn="ctr" eaLnBrk="1" latinLnBrk="0" hangingPunct="1"/>
-            <a:endParaRPr kumimoji="0" lang="en-US" dirty="0"/>
+            <a:pPr algn="ctr" fontAlgn="auto">
+              <a:spcBef>
+                <a:spcPts val="0"/>
+              </a:spcBef>
+              <a:spcAft>
+                <a:spcPts val="0"/>
+              </a:spcAft>
+              <a:defRPr/>
+            </a:pPr>
+            <a:endParaRPr lang="en-US" dirty="0"/>
+          </a:p>
+        </p:txBody>
+      </p:sp>
+      <p:sp>
+        <p:nvSpPr>
+          <p:cNvPr id="2" name="Title 1"/>
+          <p:cNvSpPr>
+            <a:spLocks noGrp="1"/>
+          </p:cNvSpPr>
+          <p:nvPr>
+            <p:ph type="title"/>
+          </p:nvPr>
+        </p:nvSpPr>
+        <p:spPr>
+          <a:xfrm>
+            <a:off x="5886896" y="1066800"/>
+            <a:ext cx="2743200" cy="1981200"/>
+          </a:xfrm>
+        </p:spPr>
+        <p:txBody>
+          <a:bodyPr anchor="b">
+            <a:noAutofit/>
+          </a:bodyPr>
+          <a:lstStyle>
+            <a:lvl1pPr algn="l">
+              <a:buNone/>
+              <a:defRPr sz="2100" b="1">
+                <a:effectLst/>
+              </a:defRPr>
+            </a:lvl1pPr>
+            <a:extLst/>
+          </a:lstStyle>
+          <a:p>
+            <a:r>
+              <a:rPr lang="en-US" smtClean="0"/>
+              <a:t>Click to edit Master title style</a:t>
+            </a:r>
+            <a:endParaRPr lang="en-US"/>
+          </a:p>
+        </p:txBody>
+      </p:sp>
+      <p:sp>
+        <p:nvSpPr>
+          <p:cNvPr id="3" name="Picture Placeholder 2"/>
+          <p:cNvSpPr>
+            <a:spLocks noGrp="1"/>
+          </p:cNvSpPr>
+          <p:nvPr>
+            <p:ph type="pic" idx="1"/>
+          </p:nvPr>
+        </p:nvSpPr>
+        <p:spPr>
+          <a:xfrm>
+            <a:off x="838200" y="1143003"/>
+            <a:ext cx="4419600" cy="3514531"/>
+          </a:xfrm>
+          <a:prstGeom prst="roundRect">
+            <a:avLst>
+              <a:gd name="adj" fmla="val 783"/>
+            </a:avLst>
+          </a:prstGeom>
+          <a:solidFill>
+            <a:schemeClr val="bg2"/>
+          </a:solidFill>
+          <a:ln w="127000">
+            <a:noFill/>
+            <a:miter lim="800000"/>
+          </a:ln>
+          <a:effectLst/>
+        </p:spPr>
+        <p:txBody>
+          <a:bodyPr tIns="274320">
+            <a:normAutofit/>
+          </a:bodyPr>
+          <a:lstStyle>
+            <a:lvl1pPr indent="0">
+              <a:buNone/>
+              <a:defRPr sz="3200"/>
+            </a:lvl1pPr>
+            <a:extLst/>
+          </a:lstStyle>
+          <a:p>
+            <a:pPr lvl="0"/>
+            <a:r>
+              <a:rPr lang="en-US" noProof="0" smtClean="0"/>
+              <a:t>Click icon to add picture</a:t>
+            </a:r>
+            <a:endParaRPr lang="en-US" noProof="0" dirty="0"/>
           </a:p>
         </p:txBody>
       </p:sp>
@@ -3240,11 +3483,106 @@
             <a:extLst/>
           </a:lstStyle>
           <a:p>
-            <a:pPr lvl="0" eaLnBrk="1" latinLnBrk="0" hangingPunct="1"/>
-            <a:r>
-              <a:rPr kumimoji="0" lang="en-US" smtClean="0"/>
+            <a:pPr lvl="0"/>
+            <a:r>
+              <a:rPr lang="en-US" smtClean="0"/>
               <a:t>Click to edit Master text styles</a:t>
             </a:r>
+          </a:p>
+        </p:txBody>
+      </p:sp>
+      <p:sp>
+        <p:nvSpPr>
+          <p:cNvPr id="8" name="Date Placeholder 4"/>
+          <p:cNvSpPr>
+            <a:spLocks noGrp="1"/>
+          </p:cNvSpPr>
+          <p:nvPr>
+            <p:ph type="dt" sz="half" idx="10"/>
+          </p:nvPr>
+        </p:nvSpPr>
+        <p:spPr/>
+        <p:txBody>
+          <a:bodyPr/>
+          <a:lstStyle>
+            <a:lvl1pPr>
+              <a:defRPr/>
+            </a:lvl1pPr>
+            <a:extLst/>
+          </a:lstStyle>
+          <a:p>
+            <a:pPr>
+              <a:defRPr/>
+            </a:pPr>
+            <a:fld id="{B4D8D2B0-F3D1-4469-AF77-1F3E443A4F0E}" type="datetimeFigureOut">
+              <a:rPr lang="en-US"/>
+              <a:pPr>
+                <a:defRPr/>
+              </a:pPr>
+              <a:t>10/29/2013</a:t>
+            </a:fld>
+            <a:endParaRPr lang="en-US"/>
+          </a:p>
+        </p:txBody>
+      </p:sp>
+      <p:sp>
+        <p:nvSpPr>
+          <p:cNvPr id="9" name="Footer Placeholder 5"/>
+          <p:cNvSpPr>
+            <a:spLocks noGrp="1"/>
+          </p:cNvSpPr>
+          <p:nvPr>
+            <p:ph type="ftr" sz="quarter" idx="11"/>
+          </p:nvPr>
+        </p:nvSpPr>
+        <p:spPr/>
+        <p:txBody>
+          <a:bodyPr/>
+          <a:lstStyle>
+            <a:lvl1pPr>
+              <a:defRPr/>
+            </a:lvl1pPr>
+            <a:extLst/>
+          </a:lstStyle>
+          <a:p>
+            <a:pPr>
+              <a:defRPr/>
+            </a:pPr>
+            <a:endParaRPr lang="en-US"/>
+          </a:p>
+        </p:txBody>
+      </p:sp>
+      <p:sp>
+        <p:nvSpPr>
+          <p:cNvPr id="10" name="Slide Number Placeholder 6"/>
+          <p:cNvSpPr>
+            <a:spLocks noGrp="1"/>
+          </p:cNvSpPr>
+          <p:nvPr>
+            <p:ph type="sldNum" sz="quarter" idx="12"/>
+          </p:nvPr>
+        </p:nvSpPr>
+        <p:spPr/>
+        <p:txBody>
+          <a:bodyPr/>
+          <a:lstStyle>
+            <a:lvl1pPr>
+              <a:defRPr/>
+            </a:lvl1pPr>
+            <a:extLst/>
+          </a:lstStyle>
+          <a:p>
+            <a:pPr>
+              <a:defRPr/>
+            </a:pPr>
+            <a:fld id="{E7016A82-D7AE-4D69-9DD5-F51A003CE874}" type="slidenum">
+              <a:rPr lang="en-US"/>
+              <a:pPr>
+                <a:defRPr/>
+              </a:pPr>
+              <a:t>‹#›</a:t>
+            </a:fld>
+            <a:endParaRPr lang="en-US"/>
           </a:p>
         </p:txBody>
       </p:sp>
@@ -3286,8 +3624,8 @@
         </p:nvSpPr>
         <p:spPr>
           <a:xfrm>
-            <a:off x="-815927" y="-815922"/>
-            <a:ext cx="1638887" cy="1638887"/>
+            <a:off x="-815975" y="-815975"/>
+            <a:ext cx="1638300" cy="1638300"/>
           </a:xfrm>
           <a:prstGeom prst="pie">
             <a:avLst>
@@ -3334,8 +3672,16 @@
             <a:extLst/>
           </a:lstStyle>
           <a:p>
-            <a:pPr algn="ctr" eaLnBrk="1" latinLnBrk="0" hangingPunct="1"/>
-            <a:endParaRPr kumimoji="0" lang="en-US"/>
+            <a:pPr algn="ctr" fontAlgn="auto">
+              <a:spcBef>
+                <a:spcPts val="0"/>
+              </a:spcBef>
+              <a:spcAft>
+                <a:spcPts val="0"/>
+              </a:spcAft>
+              <a:defRPr/>
+            </a:pPr>
+            <a:endParaRPr lang="en-US"/>
           </a:p>
         </p:txBody>
       </p:sp>
@@ -3347,8 +3693,8 @@
         </p:nvSpPr>
         <p:spPr>
           <a:xfrm>
-            <a:off x="168816" y="21102"/>
-            <a:ext cx="1702191" cy="1702191"/>
+            <a:off x="168275" y="20638"/>
+            <a:ext cx="1703388" cy="1703387"/>
           </a:xfrm>
           <a:prstGeom prst="ellipse">
             <a:avLst/>
@@ -3394,8 +3740,16 @@
             <a:extLst/>
           </a:lstStyle>
           <a:p>
-            <a:pPr algn="ctr" eaLnBrk="1" latinLnBrk="0" hangingPunct="1"/>
-            <a:endParaRPr kumimoji="0" lang="en-US"/>
+            <a:pPr algn="ctr" fontAlgn="auto">
+              <a:spcBef>
+                <a:spcPts val="0"/>
+              </a:spcBef>
+              <a:spcAft>
+                <a:spcPts val="0"/>
+              </a:spcAft>
+              <a:defRPr/>
+            </a:pPr>
+            <a:endParaRPr lang="en-US"/>
           </a:p>
         </p:txBody>
       </p:sp>
@@ -3486,8 +3840,16 @@
             <a:extLst/>
           </a:lstStyle>
           <a:p>
-            <a:pPr algn="ctr" eaLnBrk="1" latinLnBrk="0" hangingPunct="1"/>
-            <a:endParaRPr kumimoji="0" lang="en-US"/>
+            <a:pPr algn="ctr" fontAlgn="auto">
+              <a:spcBef>
+                <a:spcPts val="0"/>
+              </a:spcBef>
+              <a:spcAft>
+                <a:spcPts val="0"/>
+              </a:spcAft>
+              <a:defRPr/>
+            </a:pPr>
+            <a:endParaRPr lang="en-US"/>
           </a:p>
         </p:txBody>
       </p:sp>
@@ -3499,8 +3861,8 @@
         </p:nvSpPr>
         <p:spPr>
           <a:xfrm>
-            <a:off x="1012873" y="-54"/>
-            <a:ext cx="8131127" cy="6858054"/>
+            <a:off x="1012825" y="0"/>
+            <a:ext cx="8131175" cy="6858000"/>
           </a:xfrm>
           <a:prstGeom prst="rect">
             <a:avLst/>
@@ -3534,8 +3896,16 @@
             <a:extLst/>
           </a:lstStyle>
           <a:p>
-            <a:pPr algn="ctr" eaLnBrk="1" latinLnBrk="0" hangingPunct="1"/>
-            <a:endParaRPr kumimoji="0" lang="en-US"/>
+            <a:pPr algn="ctr" fontAlgn="auto">
+              <a:spcBef>
+                <a:spcPts val="0"/>
+              </a:spcBef>
+              <a:spcAft>
+                <a:spcPts val="0"/>
+              </a:spcAft>
+              <a:defRPr/>
+            </a:pPr>
+            <a:endParaRPr lang="en-US"/>
           </a:p>
         </p:txBody>
       </p:sp>
@@ -3551,8 +3921,8 @@
         </p:nvSpPr>
         <p:spPr>
           <a:xfrm>
-            <a:off x="1435608" y="274638"/>
-            <a:ext cx="7498080" cy="1143000"/>
+            <a:off x="1435100" y="274638"/>
+            <a:ext cx="7499350" cy="1143000"/>
           </a:xfrm>
           <a:prstGeom prst="rect">
             <a:avLst/>
@@ -3567,16 +3937,16 @@
           </a:lstStyle>
           <a:p>
             <a:r>
-              <a:rPr kumimoji="0" lang="en-US" smtClean="0"/>
+              <a:rPr lang="en-US" smtClean="0"/>
               <a:t>Click to edit Master title style</a:t>
             </a:r>
-            <a:endParaRPr kumimoji="0" lang="en-US"/>
-          </a:p>
-        </p:txBody>
-      </p:sp>
-      <p:sp>
-        <p:nvSpPr>
-          <p:cNvPr id="9" name="Text Placeholder 8"/>
+            <a:endParaRPr lang="en-US"/>
+          </a:p>
+        </p:txBody>
+      </p:sp>
+      <p:sp>
+        <p:nvSpPr>
+          <p:cNvPr id="1033" name="Text Placeholder 8"/>
           <p:cNvSpPr>
             <a:spLocks noGrp="1"/>
           </p:cNvSpPr>
@@ -3584,57 +3954,63 @@
             <p:ph type="body" idx="1"/>
           </p:nvPr>
         </p:nvSpPr>
-        <p:spPr>
+        <p:spPr bwMode="auto">
           <a:xfrm>
-            <a:off x="1435608" y="1447800"/>
-            <a:ext cx="7498080" cy="4800600"/>
+            <a:off x="1435100" y="1447800"/>
+            <a:ext cx="7499350" cy="4800600"/>
           </a:xfrm>
           <a:prstGeom prst="rect">
             <a:avLst/>
           </a:prstGeom>
+          <a:noFill/>
+          <a:ln w="9525">
+            <a:noFill/>
+            <a:miter lim="800000"/>
+            <a:headEnd/>
+            <a:tailEnd/>
+          </a:ln>
         </p:spPr>
         <p:txBody>
-          <a:bodyPr>
-            <a:normAutofit/>
+          <a:bodyPr vert="horz" wrap="square" lIns="91440" tIns="45720" rIns="91440" bIns="45720" numCol="1" anchor="t" anchorCtr="0" compatLnSpc="1">
+            <a:prstTxWarp prst="textNoShape">
+              <a:avLst/>
+            </a:prstTxWarp>
           </a:bodyPr>
-          <a:lstStyle>
-            <a:extLst/>
-          </a:lstStyle>
-          <a:p>
-            <a:pPr lvl="0" eaLnBrk="1" latinLnBrk="0" hangingPunct="1"/>
-            <a:r>
-              <a:rPr kumimoji="0" lang="en-US" smtClean="0"/>
+          <a:lstStyle/>
+          <a:p>
+            <a:pPr lvl="0"/>
+            <a:r>
+              <a:rPr lang="en-US" smtClean="0"/>
               <a:t>Click to edit Master text styles</a:t>
             </a:r>
           </a:p>
           <a:p>
-            <a:pPr lvl="1" eaLnBrk="1" latinLnBrk="0" hangingPunct="1"/>
-            <a:r>
-              <a:rPr kumimoji="0" lang="en-US" smtClean="0"/>
+            <a:pPr lvl="1"/>
+            <a:r>
+              <a:rPr lang="en-US" smtClean="0"/>
               <a:t>Second level</a:t>
             </a:r>
           </a:p>
           <a:p>
-            <a:pPr lvl="2" eaLnBrk="1" latinLnBrk="0" hangingPunct="1"/>
-            <a:r>
-              <a:rPr kumimoji="0" lang="en-US" smtClean="0"/>
+            <a:pPr lvl="2"/>
+            <a:r>
+              <a:rPr lang="en-US" smtClean="0"/>
               <a:t>Third level</a:t>
             </a:r>
           </a:p>
           <a:p>
-            <a:pPr lvl="3" eaLnBrk="1" latinLnBrk="0" hangingPunct="1"/>
-            <a:r>
-              <a:rPr kumimoji="0" lang="en-US" smtClean="0"/>
+            <a:pPr lvl="3"/>
+            <a:r>
+              <a:rPr lang="en-US" smtClean="0"/>
               <a:t>Fourth level</a:t>
             </a:r>
           </a:p>
           <a:p>
-            <a:pPr lvl="4" eaLnBrk="1" latinLnBrk="0" hangingPunct="1"/>
-            <a:r>
-              <a:rPr kumimoji="0" lang="en-US" smtClean="0"/>
+            <a:pPr lvl="4"/>
+            <a:r>
+              <a:rPr lang="en-US" smtClean="0"/>
               <a:t>Fifth level</a:t>
             </a:r>
-            <a:endParaRPr kumimoji="0" lang="en-US"/>
           </a:p>
         </p:txBody>
       </p:sp>
@@ -3660,22 +4036,34 @@
         <p:txBody>
           <a:bodyPr anchor="b"/>
           <a:lstStyle>
-            <a:lvl1pPr algn="r" eaLnBrk="1" latinLnBrk="0" hangingPunct="1">
-              <a:defRPr kumimoji="0" sz="1200">
+            <a:lvl1pPr algn="r" eaLnBrk="1" fontAlgn="auto" latinLnBrk="0" hangingPunct="1">
+              <a:spcBef>
+                <a:spcPts val="0"/>
+              </a:spcBef>
+              <a:spcAft>
+                <a:spcPts val="0"/>
+              </a:spcAft>
+              <a:defRPr kumimoji="0" sz="1200" smtClean="0">
                 <a:solidFill>
                   <a:schemeClr val="bg2">
                     <a:shade val="50000"/>
                     <a:satMod val="200000"/>
                   </a:schemeClr>
                 </a:solidFill>
+                <a:latin typeface="+mn-lt"/>
               </a:defRPr>
             </a:lvl1pPr>
             <a:extLst/>
           </a:lstStyle>
           <a:p>
-            <a:fld id="{1D8BD707-D9CF-40AE-B4C6-C98DA3205C09}" type="datetimeFigureOut">
-              <a:rPr lang="en-US" smtClean="0"/>
-              <a:pPr/>
+            <a:pPr>
+              <a:defRPr/>
+            </a:pPr>
+            <a:fld id="{8F28760E-DB69-4E6F-A314-224393ED3AFB}" type="datetimeFigureOut">
+              <a:rPr lang="en-US"/>
+              <a:pPr>
+                <a:defRPr/>
+              </a:pPr>
               <a:t>10/29/2013</a:t>
             </a:fld>
             <a:endParaRPr lang="en-US"/>
@@ -3704,7 +4092,13 @@
         <p:txBody>
           <a:bodyPr anchor="b"/>
           <a:lstStyle>
-            <a:lvl1pPr eaLnBrk="1" latinLnBrk="0" hangingPunct="1">
+            <a:lvl1pPr eaLnBrk="1" fontAlgn="auto" latinLnBrk="0" hangingPunct="1">
+              <a:spcBef>
+                <a:spcPts val="0"/>
+              </a:spcBef>
+              <a:spcAft>
+                <a:spcPts val="0"/>
+              </a:spcAft>
               <a:defRPr kumimoji="0" sz="1200">
                 <a:solidFill>
                   <a:schemeClr val="bg2">
@@ -3713,11 +4107,15 @@
                   </a:schemeClr>
                 </a:solidFill>
                 <a:effectLst/>
+                <a:latin typeface="+mn-lt"/>
               </a:defRPr>
             </a:lvl1pPr>
             <a:extLst/>
           </a:lstStyle>
           <a:p>
+            <a:pPr>
+              <a:defRPr/>
+            </a:pPr>
             <a:endParaRPr lang="en-US"/>
           </a:p>
         </p:txBody>
@@ -3734,7 +4132,7 @@
         </p:nvSpPr>
         <p:spPr>
           <a:xfrm>
-            <a:off x="8613648" y="6305550"/>
+            <a:off x="8613775" y="6305550"/>
             <a:ext cx="457200" cy="476250"/>
           </a:xfrm>
           <a:prstGeom prst="rect">
@@ -3744,8 +4142,14 @@
         <p:txBody>
           <a:bodyPr anchor="b"/>
           <a:lstStyle>
-            <a:lvl1pPr algn="ctr" eaLnBrk="1" latinLnBrk="0" hangingPunct="1">
-              <a:defRPr kumimoji="0" sz="1200">
+            <a:lvl1pPr algn="ctr" eaLnBrk="1" fontAlgn="auto" latinLnBrk="0" hangingPunct="1">
+              <a:spcBef>
+                <a:spcPts val="0"/>
+              </a:spcBef>
+              <a:spcAft>
+                <a:spcPts val="0"/>
+              </a:spcAft>
+              <a:defRPr kumimoji="0" sz="1200" smtClean="0">
                 <a:solidFill>
                   <a:schemeClr val="bg2">
                     <a:shade val="50000"/>
@@ -3753,14 +4157,20 @@
                   </a:schemeClr>
                 </a:solidFill>
                 <a:effectLst/>
+                <a:latin typeface="+mn-lt"/>
               </a:defRPr>
             </a:lvl1pPr>
             <a:extLst/>
           </a:lstStyle>
           <a:p>
-            <a:fld id="{B6F15528-21DE-4FAA-801E-634DDDAF4B2B}" type="slidenum">
-              <a:rPr lang="en-US" smtClean="0"/>
-              <a:pPr/>
+            <a:pPr>
+              <a:defRPr/>
+            </a:pPr>
+            <a:fld id="{5DE2B418-CB9B-4FA2-A07D-A12FF089B5A0}" type="slidenum">
+              <a:rPr lang="en-US"/>
+              <a:pPr>
+                <a:defRPr/>
+              </a:pPr>
               <a:t>‹#›</a:t>
             </a:fld>
             <a:endParaRPr lang="en-US"/>
@@ -3775,8 +4185,8 @@
         </p:nvSpPr>
         <p:spPr bwMode="invGray">
           <a:xfrm>
-            <a:off x="1014984" y="-54"/>
-            <a:ext cx="73152" cy="6858054"/>
+            <a:off x="1014413" y="0"/>
+            <a:ext cx="73025" cy="6858000"/>
           </a:xfrm>
           <a:prstGeom prst="rect">
             <a:avLst/>
@@ -3818,8 +4228,16 @@
             <a:extLst/>
           </a:lstStyle>
           <a:p>
-            <a:pPr algn="ctr" eaLnBrk="1" latinLnBrk="0" hangingPunct="1"/>
-            <a:endParaRPr kumimoji="0" lang="en-US"/>
+            <a:pPr algn="ctr" fontAlgn="auto">
+              <a:spcBef>
+                <a:spcPts val="0"/>
+              </a:spcBef>
+              <a:spcAft>
+                <a:spcPts val="0"/>
+              </a:spcAft>
+              <a:defRPr/>
+            </a:pPr>
+            <a:endParaRPr lang="en-US"/>
           </a:p>
         </p:txBody>
       </p:sp>
@@ -3827,30 +4245,30 @@
   </p:cSld>
   <p:clrMap bg1="lt1" tx1="dk1" bg2="lt2" tx2="dk2" accent1="accent1" accent2="accent2" accent3="accent3" accent4="accent4" accent5="accent5" accent6="accent6" hlink="hlink" folHlink="folHlink"/>
   <p:sldLayoutIdLst>
-    <p:sldLayoutId id="2147483673" r:id="rId1"/>
-    <p:sldLayoutId id="2147483674" r:id="rId2"/>
-    <p:sldLayoutId id="2147483675" r:id="rId3"/>
-    <p:sldLayoutId id="2147483676" r:id="rId4"/>
-    <p:sldLayoutId id="2147483677" r:id="rId5"/>
-    <p:sldLayoutId id="2147483678" r:id="rId6"/>
-    <p:sldLayoutId id="2147483679" r:id="rId7"/>
-    <p:sldLayoutId id="2147483680" r:id="rId8"/>
-    <p:sldLayoutId id="2147483681" r:id="rId9"/>
+    <p:sldLayoutId id="2147483684" r:id="rId1"/>
+    <p:sldLayoutId id="2147483679" r:id="rId2"/>
+    <p:sldLayoutId id="2147483685" r:id="rId3"/>
+    <p:sldLayoutId id="2147483680" r:id="rId4"/>
+    <p:sldLayoutId id="2147483686" r:id="rId5"/>
+    <p:sldLayoutId id="2147483681" r:id="rId6"/>
+    <p:sldLayoutId id="2147483687" r:id="rId7"/>
+    <p:sldLayoutId id="2147483688" r:id="rId8"/>
+    <p:sldLayoutId id="2147483689" r:id="rId9"/>
     <p:sldLayoutId id="2147483682" r:id="rId10"/>
     <p:sldLayoutId id="2147483683" r:id="rId11"/>
   </p:sldLayoutIdLst>
   <p:txStyles>
     <p:titleStyle>
-      <a:lvl1pPr algn="l" rtl="0" eaLnBrk="1" latinLnBrk="0" hangingPunct="1">
+      <a:lvl1pPr algn="l" rtl="0" fontAlgn="base">
         <a:spcBef>
           <a:spcPct val="0"/>
         </a:spcBef>
-        <a:buNone/>
-        <a:defRPr kumimoji="0" sz="4300" kern="1200">
+        <a:spcAft>
+          <a:spcPct val="0"/>
+        </a:spcAft>
+        <a:defRPr sz="4300" kern="1200">
           <a:solidFill>
-            <a:schemeClr val="tx2">
-              <a:satMod val="130000"/>
-            </a:schemeClr>
+            <a:srgbClr val="572314"/>
           </a:solidFill>
           <a:effectLst>
             <a:outerShdw blurRad="50000" dist="30000" dir="5400000" algn="tl" rotWithShape="0">
@@ -3864,23 +4282,135 @@
           <a:cs typeface="+mj-cs"/>
         </a:defRPr>
       </a:lvl1pPr>
+      <a:lvl2pPr algn="l" rtl="0" fontAlgn="base">
+        <a:spcBef>
+          <a:spcPct val="0"/>
+        </a:spcBef>
+        <a:spcAft>
+          <a:spcPct val="0"/>
+        </a:spcAft>
+        <a:defRPr sz="4300">
+          <a:solidFill>
+            <a:srgbClr val="572314"/>
+          </a:solidFill>
+          <a:latin typeface="Gill Sans MT" pitchFamily="34" charset="0"/>
+        </a:defRPr>
+      </a:lvl2pPr>
+      <a:lvl3pPr algn="l" rtl="0" fontAlgn="base">
+        <a:spcBef>
+          <a:spcPct val="0"/>
+        </a:spcBef>
+        <a:spcAft>
+          <a:spcPct val="0"/>
+        </a:spcAft>
+        <a:defRPr sz="4300">
+          <a:solidFill>
+            <a:srgbClr val="572314"/>
+          </a:solidFill>
+          <a:latin typeface="Gill Sans MT" pitchFamily="34" charset="0"/>
+        </a:defRPr>
+      </a:lvl3pPr>
+      <a:lvl4pPr algn="l" rtl="0" fontAlgn="base">
+        <a:spcBef>
+          <a:spcPct val="0"/>
+        </a:spcBef>
+        <a:spcAft>
+          <a:spcPct val="0"/>
+        </a:spcAft>
+        <a:defRPr sz="4300">
+          <a:solidFill>
+            <a:srgbClr val="572314"/>
+          </a:solidFill>
+          <a:latin typeface="Gill Sans MT" pitchFamily="34" charset="0"/>
+        </a:defRPr>
+      </a:lvl4pPr>
+      <a:lvl5pPr algn="l" rtl="0" fontAlgn="base">
+        <a:spcBef>
+          <a:spcPct val="0"/>
+        </a:spcBef>
+        <a:spcAft>
+          <a:spcPct val="0"/>
+        </a:spcAft>
+        <a:defRPr sz="4300">
+          <a:solidFill>
+            <a:srgbClr val="572314"/>
+          </a:solidFill>
+          <a:latin typeface="Gill Sans MT" pitchFamily="34" charset="0"/>
+        </a:defRPr>
+      </a:lvl5pPr>
+      <a:lvl6pPr marL="457200" algn="l" rtl="0" fontAlgn="base">
+        <a:spcBef>
+          <a:spcPct val="0"/>
+        </a:spcBef>
+        <a:spcAft>
+          <a:spcPct val="0"/>
+        </a:spcAft>
+        <a:defRPr sz="4300">
+          <a:solidFill>
+            <a:srgbClr val="572314"/>
+          </a:solidFill>
+          <a:latin typeface="Gill Sans MT" pitchFamily="34" charset="0"/>
+        </a:defRPr>
+      </a:lvl6pPr>
+      <a:lvl7pPr marL="914400" algn="l" rtl="0" fontAlgn="base">
+        <a:spcBef>
+          <a:spcPct val="0"/>
+        </a:spcBef>
+        <a:spcAft>
+          <a:spcPct val="0"/>
+        </a:spcAft>
+        <a:defRPr sz="4300">
+          <a:solidFill>
+            <a:srgbClr val="572314"/>
+          </a:solidFill>
+          <a:latin typeface="Gill Sans MT" pitchFamily="34" charset="0"/>
+        </a:defRPr>
+      </a:lvl7pPr>
+      <a:lvl8pPr marL="1371600" algn="l" rtl="0" fontAlgn="base">
+        <a:spcBef>
+          <a:spcPct val="0"/>
+        </a:spcBef>
+        <a:spcAft>
+          <a:spcPct val="0"/>
+        </a:spcAft>
+        <a:defRPr sz="4300">
+          <a:solidFill>
+            <a:srgbClr val="572314"/>
+          </a:solidFill>
+          <a:latin typeface="Gill Sans MT" pitchFamily="34" charset="0"/>
+        </a:defRPr>
+      </a:lvl8pPr>
+      <a:lvl9pPr marL="1828800" algn="l" rtl="0" fontAlgn="base">
+        <a:spcBef>
+          <a:spcPct val="0"/>
+        </a:spcBef>
+        <a:spcAft>
+          <a:spcPct val="0"/>
+        </a:spcAft>
+        <a:defRPr sz="4300">
+          <a:solidFill>
+            <a:srgbClr val="572314"/>
+          </a:solidFill>
+          <a:latin typeface="Gill Sans MT" pitchFamily="34" charset="0"/>
+        </a:defRPr>
+      </a:lvl9pPr>
       <a:extLst/>
     </p:titleStyle>
     <p:bodyStyle>
-      <a:lvl1pPr marL="365760" indent="-283464" algn="l" rtl="0" eaLnBrk="1" latinLnBrk="0" hangingPunct="1">
-        <a:lnSpc>
-          <a:spcPct val="100000"/>
-        </a:lnSpc>
+      <a:lvl1pPr marL="365125" indent="-282575" algn="l" rtl="0" fontAlgn="base">
         <a:spcBef>
           <a:spcPts val="600"/>
         </a:spcBef>
+        <a:spcAft>
+          <a:spcPct val="0"/>
+        </a:spcAft>
         <a:buClr>
           <a:schemeClr val="accent1"/>
         </a:buClr>
         <a:buSzPct val="80000"/>
-        <a:buFont typeface="Wingdings 2"/>
+        <a:buFont typeface="Wingdings 2" pitchFamily="18" charset="2"/>
         <a:buChar char=""/>
-        <a:defRPr kumimoji="0" sz="3200" kern="1200">
+        <a:defRPr sz="3200" kern="1200">
           <a:solidFill>
             <a:schemeClr val="tx1"/>
           </a:solidFill>
@@ -3889,19 +4419,19 @@
           <a:cs typeface="+mn-cs"/>
         </a:defRPr>
       </a:lvl1pPr>
-      <a:lvl2pPr marL="640080" indent="-237744" algn="l" rtl="0" eaLnBrk="1" latinLnBrk="0" hangingPunct="1">
-        <a:lnSpc>
-          <a:spcPct val="100000"/>
-        </a:lnSpc>
+      <a:lvl2pPr marL="639763" indent="-236538" algn="l" rtl="0" fontAlgn="base">
         <a:spcBef>
           <a:spcPts val="550"/>
         </a:spcBef>
+        <a:spcAft>
+          <a:spcPct val="0"/>
+        </a:spcAft>
         <a:buClr>
           <a:schemeClr val="accent1"/>
         </a:buClr>
-        <a:buFont typeface="Verdana"/>
+        <a:buFont typeface="Verdana" pitchFamily="34" charset="0"/>
         <a:buChar char="◦"/>
-        <a:defRPr kumimoji="0" sz="2800" kern="1200">
+        <a:defRPr sz="2800" kern="1200">
           <a:solidFill>
             <a:schemeClr val="tx1"/>
           </a:solidFill>
@@ -3910,19 +4440,19 @@
           <a:cs typeface="+mn-cs"/>
         </a:defRPr>
       </a:lvl2pPr>
-      <a:lvl3pPr marL="886968" indent="-228600" algn="l" rtl="0" eaLnBrk="1" latinLnBrk="0" hangingPunct="1">
-        <a:lnSpc>
-          <a:spcPct val="100000"/>
-        </a:lnSpc>
+      <a:lvl3pPr marL="885825" indent="-228600" algn="l" rtl="0" fontAlgn="base">
         <a:spcBef>
           <a:spcPct val="20000"/>
         </a:spcBef>
+        <a:spcAft>
+          <a:spcPct val="0"/>
+        </a:spcAft>
         <a:buClr>
           <a:schemeClr val="accent2"/>
         </a:buClr>
-        <a:buFont typeface="Wingdings 2"/>
+        <a:buFont typeface="Wingdings 2" pitchFamily="18" charset="2"/>
         <a:buChar char=""/>
-        <a:defRPr kumimoji="0" sz="2400" kern="1200">
+        <a:defRPr sz="2400" kern="1200">
           <a:solidFill>
             <a:schemeClr val="tx1"/>
           </a:solidFill>
@@ -3931,19 +4461,19 @@
           <a:cs typeface="+mn-cs"/>
         </a:defRPr>
       </a:lvl3pPr>
-      <a:lvl4pPr marL="1097280" indent="-173736" algn="l" rtl="0" eaLnBrk="1" latinLnBrk="0" hangingPunct="1">
-        <a:lnSpc>
-          <a:spcPct val="100000"/>
-        </a:lnSpc>
+      <a:lvl4pPr marL="1096963" indent="-173038" algn="l" rtl="0" fontAlgn="base">
         <a:spcBef>
           <a:spcPct val="20000"/>
         </a:spcBef>
+        <a:spcAft>
+          <a:spcPct val="0"/>
+        </a:spcAft>
         <a:buClr>
-          <a:schemeClr val="accent3"/>
+          <a:srgbClr val="C32D2E"/>
         </a:buClr>
-        <a:buFont typeface="Wingdings 2"/>
+        <a:buFont typeface="Wingdings 2" pitchFamily="18" charset="2"/>
         <a:buChar char=""/>
-        <a:defRPr kumimoji="0" sz="2000" kern="1200">
+        <a:defRPr sz="2000" kern="1200">
           <a:solidFill>
             <a:schemeClr val="tx1"/>
           </a:solidFill>
@@ -3952,19 +4482,19 @@
           <a:cs typeface="+mn-cs"/>
         </a:defRPr>
       </a:lvl4pPr>
-      <a:lvl5pPr marL="1298448" indent="-182880" algn="l" rtl="0" eaLnBrk="1" latinLnBrk="0" hangingPunct="1">
-        <a:lnSpc>
-          <a:spcPct val="100000"/>
-        </a:lnSpc>
+      <a:lvl5pPr marL="1296988" indent="-182563" algn="l" rtl="0" fontAlgn="base">
         <a:spcBef>
           <a:spcPct val="20000"/>
         </a:spcBef>
+        <a:spcAft>
+          <a:spcPct val="0"/>
+        </a:spcAft>
         <a:buClr>
-          <a:schemeClr val="accent4"/>
+          <a:srgbClr val="84AA33"/>
         </a:buClr>
-        <a:buFont typeface="Wingdings 2"/>
+        <a:buFont typeface="Wingdings 2" pitchFamily="18" charset="2"/>
         <a:buChar char=""/>
-        <a:defRPr kumimoji="0" sz="2000" kern="1200">
+        <a:defRPr sz="2000" kern="1200">
           <a:solidFill>
             <a:schemeClr val="tx1"/>
           </a:solidFill>
@@ -4183,16 +4713,39 @@
             <p:ph type="ctrTitle"/>
           </p:nvPr>
         </p:nvSpPr>
-        <p:spPr/>
+        <p:spPr>
+          <a:xfrm>
+            <a:off x="1431925" y="360363"/>
+            <a:ext cx="7407275" cy="1471612"/>
+          </a:xfrm>
+        </p:spPr>
         <p:txBody>
           <a:bodyPr/>
           <a:lstStyle/>
           <a:p>
-            <a:r>
-              <a:rPr lang="en-US" dirty="0" smtClean="0"/>
+            <a:pPr fontAlgn="auto">
+              <a:spcAft>
+                <a:spcPts val="0"/>
+              </a:spcAft>
+              <a:defRPr/>
+            </a:pPr>
+            <a:r>
+              <a:rPr lang="en-US" dirty="0" smtClean="0">
+                <a:solidFill>
+                  <a:schemeClr val="tx2">
+                    <a:satMod val="130000"/>
+                  </a:schemeClr>
+                </a:solidFill>
+              </a:rPr>
               <a:t>VMCS with a new Perspective</a:t>
             </a:r>
-            <a:endParaRPr lang="en-US" dirty="0"/>
+            <a:endParaRPr lang="en-US" dirty="0">
+              <a:solidFill>
+                <a:schemeClr val="tx2">
+                  <a:satMod val="130000"/>
+                </a:schemeClr>
+              </a:solidFill>
+            </a:endParaRPr>
           </a:p>
         </p:txBody>
       </p:sp>
@@ -4206,20 +4759,51 @@
             <p:ph type="subTitle" idx="1"/>
           </p:nvPr>
         </p:nvSpPr>
-        <p:spPr/>
-        <p:txBody>
-          <a:bodyPr/>
+        <p:spPr>
+          <a:xfrm>
+            <a:off x="1431925" y="1849438"/>
+            <a:ext cx="7407275" cy="1752600"/>
+          </a:xfrm>
+        </p:spPr>
+        <p:txBody>
+          <a:bodyPr>
+            <a:normAutofit/>
+          </a:bodyPr>
           <a:lstStyle/>
           <a:p>
+            <a:pPr fontAlgn="auto">
+              <a:spcAft>
+                <a:spcPts val="0"/>
+              </a:spcAft>
+              <a:buFont typeface="Wingdings 2"/>
+              <a:buNone/>
+              <a:defRPr/>
+            </a:pPr>
             <a:r>
               <a:rPr lang="en-US" dirty="0" smtClean="0"/>
               <a:t>SE-OODP Continuous Assessment</a:t>
             </a:r>
           </a:p>
           <a:p>
+            <a:pPr fontAlgn="auto">
+              <a:spcAft>
+                <a:spcPts val="0"/>
+              </a:spcAft>
+              <a:buFont typeface="Wingdings 2"/>
+              <a:buNone/>
+              <a:defRPr/>
+            </a:pPr>
             <a:endParaRPr lang="en-US" dirty="0" smtClean="0"/>
           </a:p>
           <a:p>
+            <a:pPr fontAlgn="auto">
+              <a:spcAft>
+                <a:spcPts val="0"/>
+              </a:spcAft>
+              <a:buFont typeface="Wingdings 2"/>
+              <a:buNone/>
+              <a:defRPr/>
+            </a:pPr>
             <a:r>
               <a:rPr lang="en-US" dirty="0" smtClean="0"/>
               <a:t>Part-Time Team 3</a:t>
@@ -4267,17 +4851,35 @@
           <a:bodyPr/>
           <a:lstStyle/>
           <a:p>
-            <a:r>
-              <a:rPr lang="en-US" dirty="0" smtClean="0"/>
+            <a:pPr fontAlgn="auto">
+              <a:spcAft>
+                <a:spcPts val="0"/>
+              </a:spcAft>
+              <a:defRPr/>
+            </a:pPr>
+            <a:r>
+              <a:rPr lang="en-US" dirty="0" smtClean="0">
+                <a:solidFill>
+                  <a:schemeClr val="tx2">
+                    <a:satMod val="130000"/>
+                  </a:schemeClr>
+                </a:solidFill>
+              </a:rPr>
               <a:t>Design Problem</a:t>
             </a:r>
-            <a:endParaRPr lang="en-US" dirty="0"/>
-          </a:p>
-        </p:txBody>
-      </p:sp>
-      <p:sp>
-        <p:nvSpPr>
-          <p:cNvPr id="3" name="Content Placeholder 2"/>
+            <a:endParaRPr lang="en-US" dirty="0">
+              <a:solidFill>
+                <a:schemeClr val="tx2">
+                  <a:satMod val="130000"/>
+                </a:schemeClr>
+              </a:solidFill>
+            </a:endParaRPr>
+          </a:p>
+        </p:txBody>
+      </p:sp>
+      <p:sp>
+        <p:nvSpPr>
+          <p:cNvPr id="14338" name="Content Placeholder 2"/>
           <p:cNvSpPr>
             <a:spLocks noGrp="1"/>
           </p:cNvSpPr>
@@ -4291,26 +4893,9 @@
           <a:lstStyle/>
           <a:p>
             <a:r>
-              <a:rPr lang="en-US" dirty="0" smtClean="0"/>
-              <a:t>The </a:t>
-            </a:r>
-            <a:r>
-              <a:rPr lang="en-US" dirty="0" smtClean="0"/>
-              <a:t>current design mixes the controller operations at different stages of transaction. If a new transaction state is to be introduced, or the order of existing states to be altered (insert coins first, then select drink brand, versus select drink brand first, then insert coins), all transaction related methods in the </a:t>
-            </a:r>
-            <a:r>
-              <a:rPr lang="en-US" dirty="0" err="1" smtClean="0"/>
-              <a:t>TransactionController</a:t>
-            </a:r>
-            <a:r>
-              <a:rPr lang="en-US" dirty="0" smtClean="0"/>
-              <a:t> has to be modified, thus violating the Open Close Principle</a:t>
-            </a:r>
-            <a:r>
-              <a:rPr lang="en-US" dirty="0" smtClean="0"/>
-              <a:t>.</a:t>
-            </a:r>
-            <a:endParaRPr lang="en-US" dirty="0" smtClean="0"/>
+              <a:rPr lang="en-US" sz="2400" smtClean="0"/>
+              <a:t>The current design mixes the controller operations at different stages of transaction. If a new transaction state is to be introduced, or the order of existing states to be altered (insert coins first, then select drink brand, versus select drink brand first, then insert coins), all transaction related methods in the TransactionController has to be modified, thus violating the Open Close Principle.</a:t>
+            </a:r>
           </a:p>
         </p:txBody>
       </p:sp>
@@ -4354,17 +4939,35 @@
           <a:bodyPr/>
           <a:lstStyle/>
           <a:p>
-            <a:r>
-              <a:rPr lang="en-US" dirty="0" smtClean="0"/>
+            <a:pPr fontAlgn="auto">
+              <a:spcAft>
+                <a:spcPts val="0"/>
+              </a:spcAft>
+              <a:defRPr/>
+            </a:pPr>
+            <a:r>
+              <a:rPr lang="en-US" dirty="0" smtClean="0">
+                <a:solidFill>
+                  <a:schemeClr val="tx2">
+                    <a:satMod val="130000"/>
+                  </a:schemeClr>
+                </a:solidFill>
+              </a:rPr>
               <a:t>Candidate Patterns</a:t>
             </a:r>
-            <a:endParaRPr lang="en-US" dirty="0"/>
-          </a:p>
-        </p:txBody>
-      </p:sp>
-      <p:sp>
-        <p:nvSpPr>
-          <p:cNvPr id="3" name="Content Placeholder 2"/>
+            <a:endParaRPr lang="en-US" dirty="0">
+              <a:solidFill>
+                <a:schemeClr val="tx2">
+                  <a:satMod val="130000"/>
+                </a:schemeClr>
+              </a:solidFill>
+            </a:endParaRPr>
+          </a:p>
+        </p:txBody>
+      </p:sp>
+      <p:sp>
+        <p:nvSpPr>
+          <p:cNvPr id="15362" name="Content Placeholder 2"/>
           <p:cNvSpPr>
             <a:spLocks noGrp="1"/>
           </p:cNvSpPr>
@@ -4377,69 +4980,57 @@
           <a:bodyPr/>
           <a:lstStyle/>
           <a:p>
-            <a:pPr lvl="0"/>
-            <a:r>
-              <a:rPr lang="en-US" b="1" dirty="0" smtClean="0"/>
-              <a:t>State </a:t>
-            </a:r>
-            <a:r>
-              <a:rPr lang="en-US" b="1" dirty="0" smtClean="0"/>
-              <a:t>Pattern</a:t>
-            </a:r>
-            <a:endParaRPr lang="en-US" dirty="0" smtClean="0"/>
+            <a:r>
+              <a:rPr lang="en-US" sz="2400" b="1" smtClean="0"/>
+              <a:t>State Pattern</a:t>
+            </a:r>
+            <a:endParaRPr lang="en-US" sz="2400" smtClean="0"/>
           </a:p>
           <a:p>
             <a:pPr>
+              <a:buFont typeface="Wingdings 2" pitchFamily="18" charset="2"/>
               <a:buNone/>
             </a:pPr>
             <a:r>
-              <a:rPr lang="en-US" dirty="0" smtClean="0"/>
-              <a:t>	Allow </a:t>
-            </a:r>
-            <a:r>
-              <a:rPr lang="en-US" dirty="0" smtClean="0"/>
-              <a:t>an object to alter its behavior when its internal state changes. The object will appear to change its class.</a:t>
-            </a:r>
-          </a:p>
-          <a:p>
-            <a:endParaRPr lang="en-US" dirty="0" smtClean="0"/>
-          </a:p>
-          <a:p>
-            <a:pPr lvl="0"/>
-            <a:r>
-              <a:rPr lang="en-US" b="1" dirty="0" smtClean="0"/>
+              <a:rPr lang="en-US" sz="2400" smtClean="0"/>
+              <a:t>	Allow an object to alter its behavior when its internal state changes. The object will appear to change its class.</a:t>
+            </a:r>
+          </a:p>
+          <a:p>
+            <a:endParaRPr lang="en-US" sz="2400" smtClean="0"/>
+          </a:p>
+          <a:p>
+            <a:r>
+              <a:rPr lang="en-US" sz="2400" b="1" smtClean="0"/>
               <a:t>Strategy Pattern</a:t>
             </a:r>
-            <a:endParaRPr lang="en-US" dirty="0" smtClean="0"/>
+            <a:endParaRPr lang="en-US" sz="2400" smtClean="0"/>
           </a:p>
           <a:p>
             <a:pPr>
+              <a:buFont typeface="Wingdings 2" pitchFamily="18" charset="2"/>
               <a:buNone/>
             </a:pPr>
             <a:r>
-              <a:rPr lang="en-US" dirty="0" smtClean="0"/>
-              <a:t>	Define </a:t>
-            </a:r>
-            <a:r>
-              <a:rPr lang="en-US" dirty="0" smtClean="0"/>
-              <a:t>a family of algorithms, encapsulate each one, and make them interchangeable. Strategy lets the algorithm vary independently from clients that use it.</a:t>
-            </a:r>
-          </a:p>
-          <a:p>
-            <a:endParaRPr lang="en-US" dirty="0"/>
+              <a:rPr lang="en-US" sz="2400" smtClean="0"/>
+              <a:t>	Define a family of algorithms, encapsulate each one, and make them interchangeable. Strategy lets the algorithm vary independently from clients that use it.</a:t>
+            </a:r>
+          </a:p>
+          <a:p>
+            <a:endParaRPr lang="en-US" sz="2400" smtClean="0"/>
           </a:p>
         </p:txBody>
       </p:sp>
       <p:pic>
         <p:nvPicPr>
-          <p:cNvPr id="4099" name="Picture 3" descr="C:\Users\Gaogao\Desktop\Tick.png"/>
+          <p:cNvPr id="15363" name="Picture 3" descr="C:\Users\Gaogao\Desktop\Tick.png"/>
           <p:cNvPicPr>
             <a:picLocks noChangeAspect="1" noChangeArrowheads="1"/>
           </p:cNvPicPr>
           <p:nvPr/>
         </p:nvPicPr>
         <p:blipFill>
-          <a:blip r:embed="rId2" cstate="print"/>
+          <a:blip r:embed="rId2"/>
           <a:srcRect/>
           <a:stretch>
             <a:fillRect/>
@@ -4454,18 +5045,24 @@
             <a:avLst/>
           </a:prstGeom>
           <a:noFill/>
+          <a:ln w="9525">
+            <a:noFill/>
+            <a:miter lim="800000"/>
+            <a:headEnd/>
+            <a:tailEnd/>
+          </a:ln>
         </p:spPr>
       </p:pic>
       <p:pic>
         <p:nvPicPr>
-          <p:cNvPr id="4100" name="Picture 4" descr="C:\Users\Gaogao\Desktop\cross.png"/>
+          <p:cNvPr id="15364" name="Picture 4" descr="C:\Users\Gaogao\Desktop\cross.png"/>
           <p:cNvPicPr>
             <a:picLocks noChangeAspect="1" noChangeArrowheads="1"/>
           </p:cNvPicPr>
           <p:nvPr/>
         </p:nvPicPr>
         <p:blipFill>
-          <a:blip r:embed="rId3" cstate="print"/>
+          <a:blip r:embed="rId3"/>
           <a:srcRect/>
           <a:stretch>
             <a:fillRect/>
@@ -4480,6 +5077,12 @@
             <a:avLst/>
           </a:prstGeom>
           <a:noFill/>
+          <a:ln w="9525">
+            <a:noFill/>
+            <a:miter lim="800000"/>
+            <a:headEnd/>
+            <a:tailEnd/>
+          </a:ln>
         </p:spPr>
       </p:pic>
     </p:spTree>
@@ -4522,17 +5125,35 @@
           <a:bodyPr/>
           <a:lstStyle/>
           <a:p>
-            <a:r>
-              <a:rPr lang="en-US" dirty="0" smtClean="0"/>
+            <a:pPr fontAlgn="auto">
+              <a:spcAft>
+                <a:spcPts val="0"/>
+              </a:spcAft>
+              <a:defRPr/>
+            </a:pPr>
+            <a:r>
+              <a:rPr lang="en-US" dirty="0" smtClean="0">
+                <a:solidFill>
+                  <a:schemeClr val="tx2">
+                    <a:satMod val="130000"/>
+                  </a:schemeClr>
+                </a:solidFill>
+              </a:rPr>
               <a:t>Motivation</a:t>
             </a:r>
-            <a:endParaRPr lang="en-US" dirty="0"/>
-          </a:p>
-        </p:txBody>
-      </p:sp>
-      <p:sp>
-        <p:nvSpPr>
-          <p:cNvPr id="3" name="Content Placeholder 2"/>
+            <a:endParaRPr lang="en-US" dirty="0">
+              <a:solidFill>
+                <a:schemeClr val="tx2">
+                  <a:satMod val="130000"/>
+                </a:schemeClr>
+              </a:solidFill>
+            </a:endParaRPr>
+          </a:p>
+        </p:txBody>
+      </p:sp>
+      <p:sp>
+        <p:nvSpPr>
+          <p:cNvPr id="16386" name="Content Placeholder 2"/>
           <p:cNvSpPr>
             <a:spLocks noGrp="1"/>
           </p:cNvSpPr>
@@ -4546,21 +5167,21 @@
           <a:lstStyle/>
           <a:p>
             <a:r>
-              <a:rPr lang="en-US" dirty="0" smtClean="0"/>
+              <a:rPr lang="en-US" sz="2400" smtClean="0"/>
               <a:t>Strategy is a bind-once pattern, whereas State is more dynamic.</a:t>
             </a:r>
           </a:p>
           <a:p>
-            <a:endParaRPr lang="en-US" dirty="0" smtClean="0"/>
-          </a:p>
-          <a:p>
-            <a:r>
-              <a:rPr lang="en-US" dirty="0" smtClean="0"/>
+            <a:endParaRPr lang="en-US" sz="2400" smtClean="0"/>
+          </a:p>
+          <a:p>
+            <a:r>
+              <a:rPr lang="en-US" sz="2400" smtClean="0"/>
               <a:t>The implementation of the State pattern builds on the Strategy pattern. The difference between State and Strategy is in the intent. With Strategy, the choice of algorithm is fairly stable. With State, a change in the state of the “context” object causes it to select from its “palette” of Strategy objects.</a:t>
             </a:r>
           </a:p>
           <a:p>
-            <a:endParaRPr lang="en-US" dirty="0"/>
+            <a:endParaRPr lang="en-US" sz="2400" smtClean="0"/>
           </a:p>
         </p:txBody>
       </p:sp>
@@ -4604,17 +5225,35 @@
           <a:bodyPr/>
           <a:lstStyle/>
           <a:p>
-            <a:r>
-              <a:rPr lang="en-US" dirty="0" smtClean="0"/>
+            <a:pPr fontAlgn="auto">
+              <a:spcAft>
+                <a:spcPts val="0"/>
+              </a:spcAft>
+              <a:defRPr/>
+            </a:pPr>
+            <a:r>
+              <a:rPr lang="en-US" dirty="0" smtClean="0">
+                <a:solidFill>
+                  <a:schemeClr val="tx2">
+                    <a:satMod val="130000"/>
+                  </a:schemeClr>
+                </a:solidFill>
+              </a:rPr>
               <a:t>Structure</a:t>
             </a:r>
-            <a:endParaRPr lang="en-US" dirty="0"/>
-          </a:p>
-        </p:txBody>
-      </p:sp>
-      <p:sp>
-        <p:nvSpPr>
-          <p:cNvPr id="3" name="Content Placeholder 2"/>
+            <a:endParaRPr lang="en-US" dirty="0">
+              <a:solidFill>
+                <a:schemeClr val="tx2">
+                  <a:satMod val="130000"/>
+                </a:schemeClr>
+              </a:solidFill>
+            </a:endParaRPr>
+          </a:p>
+        </p:txBody>
+      </p:sp>
+      <p:sp>
+        <p:nvSpPr>
+          <p:cNvPr id="17410" name="Content Placeholder 2"/>
           <p:cNvSpPr>
             <a:spLocks noGrp="1"/>
           </p:cNvSpPr>
@@ -4627,13 +5266,13 @@
           <a:bodyPr/>
           <a:lstStyle/>
           <a:p>
-            <a:endParaRPr lang="en-US"/>
+            <a:endParaRPr lang="en-US" smtClean="0"/>
           </a:p>
         </p:txBody>
       </p:sp>
       <p:pic>
         <p:nvPicPr>
-          <p:cNvPr id="1026" name="Picture 2" descr="C:\Users\Gaogao\Desktop\OODP\WMCS\docs\State\State.jpg"/>
+          <p:cNvPr id="17411" name="Picture 2" descr="C:\Users\Gaogao\Desktop\OODP\WMCS\docs\State\State.jpg"/>
           <p:cNvPicPr>
             <a:picLocks noChangeAspect="1" noChangeArrowheads="1"/>
           </p:cNvPicPr>
@@ -4648,13 +5287,19 @@
         </p:blipFill>
         <p:spPr bwMode="auto">
           <a:xfrm>
-            <a:off x="1122915" y="1676400"/>
-            <a:ext cx="7868685" cy="4038600"/>
+            <a:off x="1122363" y="1676400"/>
+            <a:ext cx="7869237" cy="4038600"/>
           </a:xfrm>
           <a:prstGeom prst="rect">
             <a:avLst/>
           </a:prstGeom>
           <a:noFill/>
+          <a:ln w="9525">
+            <a:noFill/>
+            <a:miter lim="800000"/>
+            <a:headEnd/>
+            <a:tailEnd/>
+          </a:ln>
         </p:spPr>
       </p:pic>
     </p:spTree>
@@ -4697,17 +5342,35 @@
           <a:bodyPr/>
           <a:lstStyle/>
           <a:p>
-            <a:r>
-              <a:rPr lang="en-US" dirty="0" smtClean="0"/>
+            <a:pPr fontAlgn="auto">
+              <a:spcAft>
+                <a:spcPts val="0"/>
+              </a:spcAft>
+              <a:defRPr/>
+            </a:pPr>
+            <a:r>
+              <a:rPr lang="en-US" dirty="0" smtClean="0">
+                <a:solidFill>
+                  <a:schemeClr val="tx2">
+                    <a:satMod val="130000"/>
+                  </a:schemeClr>
+                </a:solidFill>
+              </a:rPr>
               <a:t>State Transition</a:t>
             </a:r>
-            <a:endParaRPr lang="en-US" dirty="0"/>
-          </a:p>
-        </p:txBody>
-      </p:sp>
-      <p:sp>
-        <p:nvSpPr>
-          <p:cNvPr id="3" name="Content Placeholder 2"/>
+            <a:endParaRPr lang="en-US" dirty="0">
+              <a:solidFill>
+                <a:schemeClr val="tx2">
+                  <a:satMod val="130000"/>
+                </a:schemeClr>
+              </a:solidFill>
+            </a:endParaRPr>
+          </a:p>
+        </p:txBody>
+      </p:sp>
+      <p:sp>
+        <p:nvSpPr>
+          <p:cNvPr id="18434" name="Content Placeholder 2"/>
           <p:cNvSpPr>
             <a:spLocks noGrp="1"/>
           </p:cNvSpPr>
@@ -4720,13 +5383,13 @@
           <a:bodyPr/>
           <a:lstStyle/>
           <a:p>
-            <a:endParaRPr lang="en-US"/>
+            <a:endParaRPr lang="en-US" smtClean="0"/>
           </a:p>
         </p:txBody>
       </p:sp>
       <p:pic>
         <p:nvPicPr>
-          <p:cNvPr id="3074" name="Picture 2" descr="C:\Users\Gaogao\Desktop\OODP\WMCS\docs\State\StateChart.jpg"/>
+          <p:cNvPr id="18435" name="Picture 2" descr="C:\Users\Gaogao\Desktop\OODP\WMCS\docs\State\StateChart.jpg"/>
           <p:cNvPicPr>
             <a:picLocks noChangeAspect="1" noChangeArrowheads="1"/>
           </p:cNvPicPr>
@@ -4741,13 +5404,19 @@
         </p:blipFill>
         <p:spPr bwMode="auto">
           <a:xfrm>
-            <a:off x="1219200" y="1524942"/>
-            <a:ext cx="7596187" cy="4571058"/>
+            <a:off x="1219200" y="1525588"/>
+            <a:ext cx="7596188" cy="4570412"/>
           </a:xfrm>
           <a:prstGeom prst="rect">
             <a:avLst/>
           </a:prstGeom>
           <a:noFill/>
+          <a:ln w="9525">
+            <a:noFill/>
+            <a:miter lim="800000"/>
+            <a:headEnd/>
+            <a:tailEnd/>
+          </a:ln>
         </p:spPr>
       </p:pic>
     </p:spTree>
@@ -4790,17 +5459,35 @@
           <a:bodyPr/>
           <a:lstStyle/>
           <a:p>
-            <a:r>
-              <a:rPr lang="en-US" dirty="0" smtClean="0"/>
+            <a:pPr fontAlgn="auto">
+              <a:spcAft>
+                <a:spcPts val="0"/>
+              </a:spcAft>
+              <a:defRPr/>
+            </a:pPr>
+            <a:r>
+              <a:rPr lang="en-US" dirty="0" smtClean="0">
+                <a:solidFill>
+                  <a:schemeClr val="tx2">
+                    <a:satMod val="130000"/>
+                  </a:schemeClr>
+                </a:solidFill>
+              </a:rPr>
               <a:t>Collaborations</a:t>
             </a:r>
-            <a:endParaRPr lang="en-US" dirty="0"/>
-          </a:p>
-        </p:txBody>
-      </p:sp>
-      <p:sp>
-        <p:nvSpPr>
-          <p:cNvPr id="3" name="Content Placeholder 2"/>
+            <a:endParaRPr lang="en-US" dirty="0">
+              <a:solidFill>
+                <a:schemeClr val="tx2">
+                  <a:satMod val="130000"/>
+                </a:schemeClr>
+              </a:solidFill>
+            </a:endParaRPr>
+          </a:p>
+        </p:txBody>
+      </p:sp>
+      <p:sp>
+        <p:nvSpPr>
+          <p:cNvPr id="19458" name="Content Placeholder 2"/>
           <p:cNvSpPr>
             <a:spLocks noGrp="1"/>
           </p:cNvSpPr>
@@ -4813,13 +5500,13 @@
           <a:bodyPr/>
           <a:lstStyle/>
           <a:p>
-            <a:endParaRPr lang="en-US"/>
+            <a:endParaRPr lang="en-US" smtClean="0"/>
           </a:p>
         </p:txBody>
       </p:sp>
       <p:pic>
         <p:nvPicPr>
-          <p:cNvPr id="2050" name="Picture 2" descr="C:\Users\Gaogao\Desktop\OODP\WMCS\docs\State\StateSeq.jpg"/>
+          <p:cNvPr id="19459" name="Picture 2" descr="C:\Users\Gaogao\Desktop\OODP\WMCS\docs\State\StateSeq.jpg"/>
           <p:cNvPicPr>
             <a:picLocks noChangeAspect="1" noChangeArrowheads="1"/>
           </p:cNvPicPr>
@@ -4834,13 +5521,19 @@
         </p:blipFill>
         <p:spPr bwMode="auto">
           <a:xfrm>
-            <a:off x="457200" y="1693655"/>
-            <a:ext cx="8553450" cy="4173745"/>
+            <a:off x="457200" y="1693863"/>
+            <a:ext cx="8553450" cy="4173537"/>
           </a:xfrm>
           <a:prstGeom prst="rect">
             <a:avLst/>
           </a:prstGeom>
           <a:noFill/>
+          <a:ln w="9525">
+            <a:noFill/>
+            <a:miter lim="800000"/>
+            <a:headEnd/>
+            <a:tailEnd/>
+          </a:ln>
         </p:spPr>
       </p:pic>
     </p:spTree>
@@ -4883,29 +5576,141 @@
           <a:bodyPr/>
           <a:lstStyle/>
           <a:p>
-            <a:r>
-              <a:rPr lang="en-US" dirty="0" smtClean="0"/>
+            <a:pPr fontAlgn="auto">
+              <a:spcAft>
+                <a:spcPts val="0"/>
+              </a:spcAft>
+              <a:defRPr/>
+            </a:pPr>
+            <a:r>
+              <a:rPr lang="en-US" dirty="0" smtClean="0">
+                <a:solidFill>
+                  <a:schemeClr val="tx2">
+                    <a:satMod val="130000"/>
+                  </a:schemeClr>
+                </a:solidFill>
+              </a:rPr>
               <a:t>Implementation Decisions</a:t>
             </a:r>
-            <a:endParaRPr lang="en-US" dirty="0"/>
-          </a:p>
-        </p:txBody>
-      </p:sp>
-      <p:sp>
-        <p:nvSpPr>
-          <p:cNvPr id="3" name="Content Placeholder 2"/>
-          <p:cNvSpPr>
-            <a:spLocks noGrp="1"/>
-          </p:cNvSpPr>
-          <p:nvPr>
-            <p:ph idx="1"/>
-          </p:nvPr>
-        </p:nvSpPr>
-        <p:spPr/>
-        <p:txBody>
-          <a:bodyPr/>
+            <a:endParaRPr lang="en-US" dirty="0">
+              <a:solidFill>
+                <a:schemeClr val="tx2">
+                  <a:satMod val="130000"/>
+                </a:schemeClr>
+              </a:solidFill>
+            </a:endParaRPr>
+          </a:p>
+        </p:txBody>
+      </p:sp>
+      <p:sp>
+        <p:nvSpPr>
+          <p:cNvPr id="20498" name="Text Box 18"/>
+          <p:cNvSpPr txBox="1">
+            <a:spLocks noChangeArrowheads="1"/>
+          </p:cNvSpPr>
+          <p:nvPr/>
+        </p:nvSpPr>
+        <p:spPr bwMode="auto">
+          <a:xfrm>
+            <a:off x="1524000" y="1600200"/>
+            <a:ext cx="7162800" cy="5310188"/>
+          </a:xfrm>
+          <a:prstGeom prst="rect">
+            <a:avLst/>
+          </a:prstGeom>
+          <a:noFill/>
+          <a:ln w="9525">
+            <a:noFill/>
+            <a:miter lim="800000"/>
+            <a:headEnd/>
+            <a:tailEnd/>
+          </a:ln>
+          <a:effectLst/>
+        </p:spPr>
+        <p:txBody>
+          <a:bodyPr>
+            <a:spAutoFit/>
+          </a:bodyPr>
           <a:lstStyle/>
           <a:p>
+            <a:pPr marL="342900" indent="-342900">
+              <a:buFontTx/>
+              <a:buAutoNum type="arabicPeriod"/>
+            </a:pPr>
+            <a:r>
+              <a:rPr lang="en-US"/>
+              <a:t>Who defines the state transitions?</a:t>
+            </a:r>
+          </a:p>
+          <a:p>
+            <a:pPr marL="342900" indent="-342900"/>
+            <a:r>
+              <a:rPr lang="en-US"/>
+              <a:t>	:Context defines. In our current implementation, which is TransactionController defines. Because for VMCS, the state transition is fixed.</a:t>
+            </a:r>
+          </a:p>
+          <a:p>
+            <a:pPr marL="342900" indent="-342900">
+              <a:buFontTx/>
+              <a:buAutoNum type="arabicPeriod"/>
+            </a:pPr>
+            <a:endParaRPr lang="en-US"/>
+          </a:p>
+          <a:p>
+            <a:pPr marL="342900" indent="-342900"/>
+            <a:r>
+              <a:rPr lang="en-US"/>
+              <a:t>2.	A table-based alternative?</a:t>
+            </a:r>
+          </a:p>
+          <a:p>
+            <a:pPr marL="342900" indent="-342900"/>
+            <a:r>
+              <a:rPr lang="en-US"/>
+              <a:t>	:For our implementation, table based state diagram is not needed since the state change is not so complex.</a:t>
+            </a:r>
+          </a:p>
+          <a:p>
+            <a:pPr marL="342900" indent="-342900"/>
+            <a:endParaRPr lang="en-US"/>
+          </a:p>
+          <a:p>
+            <a:pPr marL="342900" indent="-342900"/>
+            <a:r>
+              <a:rPr lang="en-US"/>
+              <a:t>3.	Creating and destroying State objects?</a:t>
+            </a:r>
+          </a:p>
+          <a:p>
+            <a:pPr marL="342900" indent="-342900"/>
+            <a:r>
+              <a:rPr lang="en-US"/>
+              <a:t>	:Although create State objects only when they’re needed and destroy thereafter is preferred, we use the second way by creating them ahead of time until garbage collector destroy them. Since in Java, we cannot delete the objects on our own.</a:t>
+            </a:r>
+          </a:p>
+          <a:p>
+            <a:pPr marL="342900" indent="-342900"/>
+            <a:endParaRPr lang="en-US"/>
+          </a:p>
+          <a:p>
+            <a:pPr marL="342900" indent="-342900">
+              <a:buFontTx/>
+              <a:buAutoNum type="arabicPeriod" startAt="4"/>
+            </a:pPr>
+            <a:r>
+              <a:rPr lang="en-US"/>
+              <a:t>Using dynamic inheritance?</a:t>
+            </a:r>
+          </a:p>
+          <a:p>
+            <a:pPr marL="342900" indent="-342900"/>
+            <a:r>
+              <a:rPr lang="en-US"/>
+              <a:t>	:We’re not using it since Java doesn’t specifically support this behavior.</a:t>
+            </a:r>
+          </a:p>
+          <a:p>
+            <a:pPr marL="342900" indent="-342900"/>
             <a:endParaRPr lang="en-US"/>
           </a:p>
         </p:txBody>

</xml_diff>

<commit_message>
update in state pattern
</commit_message>
<xml_diff>
--- a/WMCS/docs/OODP_CA_PT03.pptx
+++ b/WMCS/docs/OODP_CA_PT03.pptx
@@ -5070,7 +5070,7 @@
         </p:blipFill>
         <p:spPr bwMode="auto">
           <a:xfrm>
-            <a:off x="3860800" y="3784600"/>
+            <a:off x="3632200" y="3200400"/>
             <a:ext cx="330200" cy="330200"/>
           </a:xfrm>
           <a:prstGeom prst="rect">
@@ -5167,21 +5167,21 @@
           <a:lstStyle/>
           <a:p>
             <a:r>
-              <a:rPr lang="en-US" sz="2400" smtClean="0"/>
+              <a:rPr lang="en-US" sz="2400" dirty="0" smtClean="0"/>
               <a:t>Strategy is a bind-once pattern, whereas State is more dynamic.</a:t>
             </a:r>
           </a:p>
           <a:p>
-            <a:endParaRPr lang="en-US" sz="2400" smtClean="0"/>
-          </a:p>
-          <a:p>
-            <a:r>
-              <a:rPr lang="en-US" sz="2400" smtClean="0"/>
+            <a:endParaRPr lang="en-US" sz="2400" dirty="0" smtClean="0"/>
+          </a:p>
+          <a:p>
+            <a:r>
+              <a:rPr lang="en-US" sz="2400" dirty="0" smtClean="0"/>
               <a:t>The implementation of the State pattern builds on the Strategy pattern. The difference between State and Strategy is in the intent. With Strategy, the choice of algorithm is fairly stable. With State, a change in the state of the “context” object causes it to select from its “palette” of Strategy objects.</a:t>
             </a:r>
           </a:p>
           <a:p>
-            <a:endParaRPr lang="en-US" sz="2400" smtClean="0"/>
+            <a:endParaRPr lang="en-US" sz="2400" dirty="0" smtClean="0"/>
           </a:p>
         </p:txBody>
       </p:sp>
@@ -5613,7 +5613,7 @@
         <p:spPr bwMode="auto">
           <a:xfrm>
             <a:off x="1524000" y="1600200"/>
-            <a:ext cx="7162800" cy="5310188"/>
+            <a:ext cx="7162800" cy="5078313"/>
           </a:xfrm>
           <a:prstGeom prst="rect">
             <a:avLst/>
@@ -5638,59 +5638,101 @@
               <a:buAutoNum type="arabicPeriod"/>
             </a:pPr>
             <a:r>
-              <a:rPr lang="en-US"/>
+              <a:rPr lang="en-US" dirty="0"/>
               <a:t>Who defines the state transitions?</a:t>
             </a:r>
           </a:p>
           <a:p>
             <a:pPr marL="342900" indent="-342900"/>
             <a:r>
-              <a:rPr lang="en-US"/>
-              <a:t>	:Context defines. In our current implementation, which is TransactionController defines. Because for VMCS, the state transition is fixed.</a:t>
-            </a:r>
+              <a:rPr lang="en-US" dirty="0"/>
+              <a:t>	</a:t>
+            </a:r>
+            <a:r>
+              <a:rPr lang="en-US" dirty="0" smtClean="0"/>
+              <a:t>The State subclasses themselves define the transition, which is more flexible and appropriate as compared to defining transition criteria in the Context. An interface to set the context’s current state is provided.</a:t>
+            </a:r>
+            <a:endParaRPr lang="en-US" dirty="0"/>
           </a:p>
           <a:p>
             <a:pPr marL="342900" indent="-342900">
               <a:buFontTx/>
               <a:buAutoNum type="arabicPeriod"/>
             </a:pPr>
-            <a:endParaRPr lang="en-US"/>
+            <a:endParaRPr lang="en-US" dirty="0"/>
           </a:p>
           <a:p>
             <a:pPr marL="342900" indent="-342900"/>
             <a:r>
-              <a:rPr lang="en-US"/>
+              <a:rPr lang="en-US" dirty="0"/>
               <a:t>2.	A table-based alternative?</a:t>
             </a:r>
           </a:p>
           <a:p>
             <a:pPr marL="342900" indent="-342900"/>
             <a:r>
-              <a:rPr lang="en-US"/>
-              <a:t>	:For our implementation, table based state diagram is not needed since the state change is not so complex.</a:t>
+              <a:rPr lang="en-US" dirty="0"/>
+              <a:t>	</a:t>
+            </a:r>
+            <a:r>
+              <a:rPr lang="en-US" dirty="0" smtClean="0"/>
+              <a:t>For </a:t>
+            </a:r>
+            <a:r>
+              <a:rPr lang="en-US" dirty="0"/>
+              <a:t>our implementation, table based state diagram is not needed since the state change is not so complex.</a:t>
             </a:r>
           </a:p>
           <a:p>
             <a:pPr marL="342900" indent="-342900"/>
-            <a:endParaRPr lang="en-US"/>
+            <a:endParaRPr lang="en-US" dirty="0"/>
           </a:p>
           <a:p>
             <a:pPr marL="342900" indent="-342900"/>
             <a:r>
-              <a:rPr lang="en-US"/>
+              <a:rPr lang="en-US" dirty="0"/>
               <a:t>3.	Creating and destroying State objects?</a:t>
             </a:r>
           </a:p>
           <a:p>
             <a:pPr marL="342900" indent="-342900"/>
             <a:r>
-              <a:rPr lang="en-US"/>
-              <a:t>	:Although create State objects only when they’re needed and destroy thereafter is preferred, we use the second way by creating them ahead of time until garbage collector destroy them. Since in Java, we cannot delete the objects on our own.</a:t>
-            </a:r>
+              <a:rPr lang="en-US" dirty="0"/>
+              <a:t>	</a:t>
+            </a:r>
+            <a:r>
+              <a:rPr lang="en-US" dirty="0" smtClean="0"/>
+              <a:t>W</a:t>
+            </a:r>
+            <a:r>
+              <a:rPr lang="en-US" dirty="0" smtClean="0"/>
+              <a:t>e </a:t>
+            </a:r>
+            <a:r>
+              <a:rPr lang="en-US" dirty="0"/>
+              <a:t>use the second way by creating </a:t>
+            </a:r>
+            <a:r>
+              <a:rPr lang="en-US" dirty="0" smtClean="0"/>
+              <a:t>the States ahead </a:t>
+            </a:r>
+            <a:r>
+              <a:rPr lang="en-US" dirty="0"/>
+              <a:t>of time until garbage collector destroy </a:t>
+            </a:r>
+            <a:r>
+              <a:rPr lang="en-US" dirty="0" smtClean="0"/>
+              <a:t>them</a:t>
+            </a:r>
+            <a:r>
+              <a:rPr lang="en-US" dirty="0" smtClean="0"/>
+              <a:t>, as the state change occurs rapidly.</a:t>
+            </a:r>
+            <a:endParaRPr lang="en-US" dirty="0"/>
           </a:p>
           <a:p>
             <a:pPr marL="342900" indent="-342900"/>
-            <a:endParaRPr lang="en-US"/>
+            <a:endParaRPr lang="en-US" dirty="0"/>
           </a:p>
           <a:p>
             <a:pPr marL="342900" indent="-342900">
@@ -5698,20 +5740,29 @@
               <a:buAutoNum type="arabicPeriod" startAt="4"/>
             </a:pPr>
             <a:r>
-              <a:rPr lang="en-US"/>
+              <a:rPr lang="en-US" dirty="0"/>
               <a:t>Using dynamic inheritance?</a:t>
             </a:r>
           </a:p>
           <a:p>
             <a:pPr marL="342900" indent="-342900"/>
             <a:r>
-              <a:rPr lang="en-US"/>
-              <a:t>	:We’re not using it since Java doesn’t specifically support this behavior.</a:t>
-            </a:r>
-          </a:p>
-          <a:p>
-            <a:pPr marL="342900" indent="-342900"/>
-            <a:endParaRPr lang="en-US"/>
+              <a:rPr lang="en-US" dirty="0"/>
+              <a:t>	</a:t>
+            </a:r>
+            <a:r>
+              <a:rPr lang="en-US" dirty="0" smtClean="0"/>
+              <a:t>We’re </a:t>
+            </a:r>
+            <a:r>
+              <a:rPr lang="en-US" dirty="0"/>
+              <a:t>not using it since Java doesn’t specifically support this behavior</a:t>
+            </a:r>
+            <a:r>
+              <a:rPr lang="en-US" dirty="0" smtClean="0"/>
+              <a:t>.</a:t>
+            </a:r>
+            <a:endParaRPr lang="en-US" dirty="0"/>
           </a:p>
         </p:txBody>
       </p:sp>

</xml_diff>

<commit_message>
squeeze sequence diagram to make it look better
</commit_message>
<xml_diff>
--- a/WMCS/docs/OODP_CA_PT03.pptx
+++ b/WMCS/docs/OODP_CA_PT03.pptx
@@ -436,7 +436,7 @@
             <a:pPr>
               <a:defRPr/>
             </a:pPr>
-            <a:fld id="{368459C0-B70C-4CE7-8872-1D61938A9635}" type="datetimeFigureOut">
+            <a:fld id="{ECF59653-CC8F-46A0-81A8-3DE93BDE3BD7}" type="datetimeFigureOut">
               <a:rPr lang="en-US"/>
               <a:pPr>
                 <a:defRPr/>
@@ -497,7 +497,7 @@
             <a:pPr>
               <a:defRPr/>
             </a:pPr>
-            <a:fld id="{2FC5D985-B5F0-4D86-B0DC-515D507495C5}" type="slidenum">
+            <a:fld id="{8AB2D983-BD86-4EB8-87E2-A05C199E1F34}" type="slidenum">
               <a:rPr lang="en-US"/>
               <a:pPr>
                 <a:defRPr/>
@@ -634,7 +634,7 @@
             <a:pPr>
               <a:defRPr/>
             </a:pPr>
-            <a:fld id="{B6F5FAE6-BD10-4492-B505-E94B3AACB234}" type="datetimeFigureOut">
+            <a:fld id="{B881D4AF-DB82-47B1-B2E0-7F384AB8ECCA}" type="datetimeFigureOut">
               <a:rPr lang="en-US"/>
               <a:pPr>
                 <a:defRPr/>
@@ -693,7 +693,7 @@
             <a:pPr>
               <a:defRPr/>
             </a:pPr>
-            <a:fld id="{FE006429-978F-4DA8-907E-A6DD0E0FE0A3}" type="slidenum">
+            <a:fld id="{14FB9476-577F-463B-964A-82BAB3AC07F0}" type="slidenum">
               <a:rPr lang="en-US"/>
               <a:pPr>
                 <a:defRPr/>
@@ -840,7 +840,7 @@
             <a:pPr>
               <a:defRPr/>
             </a:pPr>
-            <a:fld id="{A677ACBB-EEDB-4985-A763-10BA26C55A70}" type="datetimeFigureOut">
+            <a:fld id="{09D2A25E-FB59-495A-92B8-635BC82498E4}" type="datetimeFigureOut">
               <a:rPr lang="en-US"/>
               <a:pPr>
                 <a:defRPr/>
@@ -899,7 +899,7 @@
             <a:pPr>
               <a:defRPr/>
             </a:pPr>
-            <a:fld id="{7E192E4D-2BDB-4235-BC09-95330EAEBB70}" type="slidenum">
+            <a:fld id="{85281C46-2700-40FF-A6F6-738BEBF69610}" type="slidenum">
               <a:rPr lang="en-US"/>
               <a:pPr>
                 <a:defRPr/>
@@ -1036,7 +1036,7 @@
             <a:pPr>
               <a:defRPr/>
             </a:pPr>
-            <a:fld id="{7B8F4166-54A5-42CD-A27F-E8D646E1A1FD}" type="datetimeFigureOut">
+            <a:fld id="{B24322EC-7FF8-4348-92F6-CEAD5B8EBFA1}" type="datetimeFigureOut">
               <a:rPr lang="en-US"/>
               <a:pPr>
                 <a:defRPr/>
@@ -1095,7 +1095,7 @@
             <a:pPr>
               <a:defRPr/>
             </a:pPr>
-            <a:fld id="{CC39B570-18C5-4CB6-BE75-1FB4CA8182CE}" type="slidenum">
+            <a:fld id="{077FCC8E-81D6-4F75-8B91-88D8543C79DB}" type="slidenum">
               <a:rPr lang="en-US"/>
               <a:pPr>
                 <a:defRPr/>
@@ -1552,7 +1552,7 @@
             <a:pPr>
               <a:defRPr/>
             </a:pPr>
-            <a:fld id="{89A3E6AE-3F2A-4C76-89D7-AAC98A5978AD}" type="datetimeFigureOut">
+            <a:fld id="{627260B5-D826-4F1A-8AF3-5519F861FA85}" type="datetimeFigureOut">
               <a:rPr lang="en-US"/>
               <a:pPr>
                 <a:defRPr/>
@@ -1613,7 +1613,7 @@
             <a:pPr>
               <a:defRPr/>
             </a:pPr>
-            <a:fld id="{F85FF8D6-11BF-40F5-821C-F3EBEEAC5281}" type="slidenum">
+            <a:fld id="{6D16EF36-C3CE-4387-90EB-BCA952354FAE}" type="slidenum">
               <a:rPr lang="en-US"/>
               <a:pPr>
                 <a:defRPr/>
@@ -1849,7 +1849,7 @@
             <a:pPr>
               <a:defRPr/>
             </a:pPr>
-            <a:fld id="{72366FE6-29E2-4822-80F1-35FFC5382CF1}" type="datetimeFigureOut">
+            <a:fld id="{8929A2AE-2C33-4C08-B056-006F4925ACAD}" type="datetimeFigureOut">
               <a:rPr lang="en-US"/>
               <a:pPr>
                 <a:defRPr/>
@@ -1908,7 +1908,7 @@
             <a:pPr>
               <a:defRPr/>
             </a:pPr>
-            <a:fld id="{4E030356-F892-40CA-8290-28E7FCC6C83E}" type="slidenum">
+            <a:fld id="{8064C40A-D8A0-4524-83AA-C93EA19009FD}" type="slidenum">
               <a:rPr lang="en-US"/>
               <a:pPr>
                 <a:defRPr/>
@@ -2360,7 +2360,7 @@
             <a:pPr>
               <a:defRPr/>
             </a:pPr>
-            <a:fld id="{32221E24-7467-440B-9BCB-1344D57B51A4}" type="datetimeFigureOut">
+            <a:fld id="{02DA540B-1089-4F13-B902-4472EA502204}" type="datetimeFigureOut">
               <a:rPr lang="en-US"/>
               <a:pPr>
                 <a:defRPr/>
@@ -2421,7 +2421,7 @@
             <a:pPr>
               <a:defRPr/>
             </a:pPr>
-            <a:fld id="{56F8BAC7-072C-49CE-ACA9-7530A1DFBECE}" type="slidenum">
+            <a:fld id="{57AAEC92-A06F-4043-B37C-9D439BA0A9B1}" type="slidenum">
               <a:rPr lang="en-US"/>
               <a:pPr>
                 <a:defRPr/>
@@ -2509,7 +2509,7 @@
             <a:pPr>
               <a:defRPr/>
             </a:pPr>
-            <a:fld id="{BF8A4577-4982-4EA4-AD2E-E86438C71666}" type="datetimeFigureOut">
+            <a:fld id="{1ADAD952-0B8E-41B6-9FE5-D4B6472A233A}" type="datetimeFigureOut">
               <a:rPr lang="en-US"/>
               <a:pPr>
                 <a:defRPr/>
@@ -2568,7 +2568,7 @@
             <a:pPr>
               <a:defRPr/>
             </a:pPr>
-            <a:fld id="{3BE32D01-34DA-4DFC-BFFC-3AFAC719A96C}" type="slidenum">
+            <a:fld id="{EAAEB367-A180-4A8E-BFE1-781762897224}" type="slidenum">
               <a:rPr lang="en-US"/>
               <a:pPr>
                 <a:defRPr/>
@@ -2747,7 +2747,7 @@
             <a:pPr>
               <a:defRPr/>
             </a:pPr>
-            <a:fld id="{D1860AC2-00EF-459F-8EC2-45B44752D84E}" type="datetimeFigureOut">
+            <a:fld id="{CCF6C60F-411C-4EFB-B957-22805EE9CB24}" type="datetimeFigureOut">
               <a:rPr lang="en-US"/>
               <a:pPr>
                 <a:defRPr/>
@@ -2808,7 +2808,7 @@
             <a:pPr>
               <a:defRPr/>
             </a:pPr>
-            <a:fld id="{1B4F53E6-CE87-4A41-B954-A3C88CA00223}" type="slidenum">
+            <a:fld id="{AA9D20F1-601B-425C-B077-4A54B3E9BB0E}" type="slidenum">
               <a:rPr lang="en-US"/>
               <a:pPr>
                 <a:defRPr/>
@@ -3037,7 +3037,7 @@
             <a:pPr>
               <a:defRPr/>
             </a:pPr>
-            <a:fld id="{67F42B3F-FA62-4FF5-8B31-6A7F8EC586E0}" type="datetimeFigureOut">
+            <a:fld id="{EB1FED65-FE60-4DC1-9FD7-4B771976AF4C}" type="datetimeFigureOut">
               <a:rPr lang="en-US"/>
               <a:pPr>
                 <a:defRPr/>
@@ -3098,7 +3098,7 @@
             <a:pPr>
               <a:defRPr/>
             </a:pPr>
-            <a:fld id="{E88A7CBE-B410-461E-9640-2A2D181A4D74}" type="slidenum">
+            <a:fld id="{7B70F1DA-D83C-428A-83A1-137F347FDC3A}" type="slidenum">
               <a:rPr lang="en-US"/>
               <a:pPr>
                 <a:defRPr/>
@@ -3514,7 +3514,7 @@
             <a:pPr>
               <a:defRPr/>
             </a:pPr>
-            <a:fld id="{B4D8D2B0-F3D1-4469-AF77-1F3E443A4F0E}" type="datetimeFigureOut">
+            <a:fld id="{B4F9C0F3-6C88-42C0-BADF-BFDC925DDE0A}" type="datetimeFigureOut">
               <a:rPr lang="en-US"/>
               <a:pPr>
                 <a:defRPr/>
@@ -3575,7 +3575,7 @@
             <a:pPr>
               <a:defRPr/>
             </a:pPr>
-            <a:fld id="{E7016A82-D7AE-4D69-9DD5-F51A003CE874}" type="slidenum">
+            <a:fld id="{638558DD-02A8-4130-BA68-CC0D5D9CAA2F}" type="slidenum">
               <a:rPr lang="en-US"/>
               <a:pPr>
                 <a:defRPr/>
@@ -4043,7 +4043,7 @@
               <a:spcAft>
                 <a:spcPts val="0"/>
               </a:spcAft>
-              <a:defRPr kumimoji="0" sz="1200" smtClean="0">
+              <a:defRPr kumimoji="0" sz="1200">
                 <a:solidFill>
                   <a:schemeClr val="bg2">
                     <a:shade val="50000"/>
@@ -4059,7 +4059,7 @@
             <a:pPr>
               <a:defRPr/>
             </a:pPr>
-            <a:fld id="{8F28760E-DB69-4E6F-A314-224393ED3AFB}" type="datetimeFigureOut">
+            <a:fld id="{A9DC69CB-69F6-442D-A031-6FFA03F3D5A6}" type="datetimeFigureOut">
               <a:rPr lang="en-US"/>
               <a:pPr>
                 <a:defRPr/>
@@ -4149,7 +4149,7 @@
               <a:spcAft>
                 <a:spcPts val="0"/>
               </a:spcAft>
-              <a:defRPr kumimoji="0" sz="1200" smtClean="0">
+              <a:defRPr kumimoji="0" sz="1200">
                 <a:solidFill>
                   <a:schemeClr val="bg2">
                     <a:shade val="50000"/>
@@ -4166,7 +4166,7 @@
             <a:pPr>
               <a:defRPr/>
             </a:pPr>
-            <a:fld id="{5DE2B418-CB9B-4FA2-A07D-A12FF089B5A0}" type="slidenum">
+            <a:fld id="{FAD403BA-CCD6-42AA-8956-00D83877FF88}" type="slidenum">
               <a:rPr lang="en-US"/>
               <a:pPr>
                 <a:defRPr/>
@@ -4259,7 +4259,7 @@
   </p:sldLayoutIdLst>
   <p:txStyles>
     <p:titleStyle>
-      <a:lvl1pPr algn="l" rtl="0" fontAlgn="base">
+      <a:lvl1pPr algn="l" rtl="0" eaLnBrk="0" fontAlgn="base" hangingPunct="0">
         <a:spcBef>
           <a:spcPct val="0"/>
         </a:spcBef>
@@ -4282,7 +4282,7 @@
           <a:cs typeface="+mj-cs"/>
         </a:defRPr>
       </a:lvl1pPr>
-      <a:lvl2pPr algn="l" rtl="0" fontAlgn="base">
+      <a:lvl2pPr algn="l" rtl="0" eaLnBrk="0" fontAlgn="base" hangingPunct="0">
         <a:spcBef>
           <a:spcPct val="0"/>
         </a:spcBef>
@@ -4296,7 +4296,7 @@
           <a:latin typeface="Gill Sans MT" pitchFamily="34" charset="0"/>
         </a:defRPr>
       </a:lvl2pPr>
-      <a:lvl3pPr algn="l" rtl="0" fontAlgn="base">
+      <a:lvl3pPr algn="l" rtl="0" eaLnBrk="0" fontAlgn="base" hangingPunct="0">
         <a:spcBef>
           <a:spcPct val="0"/>
         </a:spcBef>
@@ -4310,7 +4310,7 @@
           <a:latin typeface="Gill Sans MT" pitchFamily="34" charset="0"/>
         </a:defRPr>
       </a:lvl3pPr>
-      <a:lvl4pPr algn="l" rtl="0" fontAlgn="base">
+      <a:lvl4pPr algn="l" rtl="0" eaLnBrk="0" fontAlgn="base" hangingPunct="0">
         <a:spcBef>
           <a:spcPct val="0"/>
         </a:spcBef>
@@ -4324,7 +4324,7 @@
           <a:latin typeface="Gill Sans MT" pitchFamily="34" charset="0"/>
         </a:defRPr>
       </a:lvl4pPr>
-      <a:lvl5pPr algn="l" rtl="0" fontAlgn="base">
+      <a:lvl5pPr algn="l" rtl="0" eaLnBrk="0" fontAlgn="base" hangingPunct="0">
         <a:spcBef>
           <a:spcPct val="0"/>
         </a:spcBef>
@@ -4397,7 +4397,7 @@
       <a:extLst/>
     </p:titleStyle>
     <p:bodyStyle>
-      <a:lvl1pPr marL="365125" indent="-282575" algn="l" rtl="0" fontAlgn="base">
+      <a:lvl1pPr marL="365125" indent="-282575" algn="l" rtl="0" eaLnBrk="0" fontAlgn="base" hangingPunct="0">
         <a:spcBef>
           <a:spcPts val="600"/>
         </a:spcBef>
@@ -4419,7 +4419,7 @@
           <a:cs typeface="+mn-cs"/>
         </a:defRPr>
       </a:lvl1pPr>
-      <a:lvl2pPr marL="639763" indent="-236538" algn="l" rtl="0" fontAlgn="base">
+      <a:lvl2pPr marL="639763" indent="-236538" algn="l" rtl="0" eaLnBrk="0" fontAlgn="base" hangingPunct="0">
         <a:spcBef>
           <a:spcPts val="550"/>
         </a:spcBef>
@@ -4440,7 +4440,7 @@
           <a:cs typeface="+mn-cs"/>
         </a:defRPr>
       </a:lvl2pPr>
-      <a:lvl3pPr marL="885825" indent="-228600" algn="l" rtl="0" fontAlgn="base">
+      <a:lvl3pPr marL="885825" indent="-228600" algn="l" rtl="0" eaLnBrk="0" fontAlgn="base" hangingPunct="0">
         <a:spcBef>
           <a:spcPct val="20000"/>
         </a:spcBef>
@@ -4461,7 +4461,7 @@
           <a:cs typeface="+mn-cs"/>
         </a:defRPr>
       </a:lvl3pPr>
-      <a:lvl4pPr marL="1096963" indent="-173038" algn="l" rtl="0" fontAlgn="base">
+      <a:lvl4pPr marL="1096963" indent="-173038" algn="l" rtl="0" eaLnBrk="0" fontAlgn="base" hangingPunct="0">
         <a:spcBef>
           <a:spcPct val="20000"/>
         </a:spcBef>
@@ -4482,7 +4482,7 @@
           <a:cs typeface="+mn-cs"/>
         </a:defRPr>
       </a:lvl4pPr>
-      <a:lvl5pPr marL="1296988" indent="-182563" algn="l" rtl="0" fontAlgn="base">
+      <a:lvl5pPr marL="1296988" indent="-182563" algn="l" rtl="0" eaLnBrk="0" fontAlgn="base" hangingPunct="0">
         <a:spcBef>
           <a:spcPct val="20000"/>
         </a:spcBef>
@@ -4723,7 +4723,7 @@
           <a:bodyPr/>
           <a:lstStyle/>
           <a:p>
-            <a:pPr fontAlgn="auto">
+            <a:pPr eaLnBrk="1" fontAlgn="auto" hangingPunct="1">
               <a:spcAft>
                 <a:spcPts val="0"/>
               </a:spcAft>
@@ -4771,7 +4771,7 @@
           </a:bodyPr>
           <a:lstStyle/>
           <a:p>
-            <a:pPr fontAlgn="auto">
+            <a:pPr eaLnBrk="1" fontAlgn="auto" hangingPunct="1">
               <a:spcAft>
                 <a:spcPts val="0"/>
               </a:spcAft>
@@ -4785,7 +4785,7 @@
             </a:r>
           </a:p>
           <a:p>
-            <a:pPr fontAlgn="auto">
+            <a:pPr eaLnBrk="1" fontAlgn="auto" hangingPunct="1">
               <a:spcAft>
                 <a:spcPts val="0"/>
               </a:spcAft>
@@ -4796,7 +4796,7 @@
             <a:endParaRPr lang="en-US" dirty="0" smtClean="0"/>
           </a:p>
           <a:p>
-            <a:pPr fontAlgn="auto">
+            <a:pPr eaLnBrk="1" fontAlgn="auto" hangingPunct="1">
               <a:spcAft>
                 <a:spcPts val="0"/>
               </a:spcAft>
@@ -4851,7 +4851,7 @@
           <a:bodyPr/>
           <a:lstStyle/>
           <a:p>
-            <a:pPr fontAlgn="auto">
+            <a:pPr eaLnBrk="1" fontAlgn="auto" hangingPunct="1">
               <a:spcAft>
                 <a:spcPts val="0"/>
               </a:spcAft>
@@ -4892,6 +4892,7 @@
           <a:bodyPr/>
           <a:lstStyle/>
           <a:p>
+            <a:pPr eaLnBrk="1" hangingPunct="1"/>
             <a:r>
               <a:rPr lang="en-US" sz="2400" smtClean="0"/>
               <a:t>The current design mixes the controller operations at different stages of transaction. If a new transaction state is to be introduced, or the order of existing states to be altered (insert coins first, then select drink brand, versus select drink brand first, then insert coins), all transaction related methods in the TransactionController has to be modified, thus violating the Open Close Principle.</a:t>
@@ -4939,7 +4940,7 @@
           <a:bodyPr/>
           <a:lstStyle/>
           <a:p>
-            <a:pPr fontAlgn="auto">
+            <a:pPr eaLnBrk="1" fontAlgn="auto" hangingPunct="1">
               <a:spcAft>
                 <a:spcPts val="0"/>
               </a:spcAft>
@@ -4980,6 +4981,7 @@
           <a:bodyPr/>
           <a:lstStyle/>
           <a:p>
+            <a:pPr eaLnBrk="1" hangingPunct="1"/>
             <a:r>
               <a:rPr lang="en-US" sz="2400" b="1" smtClean="0"/>
               <a:t>State Pattern</a:t>
@@ -4987,7 +4989,7 @@
             <a:endParaRPr lang="en-US" sz="2400" smtClean="0"/>
           </a:p>
           <a:p>
-            <a:pPr>
+            <a:pPr eaLnBrk="1" hangingPunct="1">
               <a:buFont typeface="Wingdings 2" pitchFamily="18" charset="2"/>
               <a:buNone/>
             </a:pPr>
@@ -4997,9 +4999,11 @@
             </a:r>
           </a:p>
           <a:p>
+            <a:pPr eaLnBrk="1" hangingPunct="1"/>
             <a:endParaRPr lang="en-US" sz="2400" smtClean="0"/>
           </a:p>
           <a:p>
+            <a:pPr eaLnBrk="1" hangingPunct="1"/>
             <a:r>
               <a:rPr lang="en-US" sz="2400" b="1" smtClean="0"/>
               <a:t>Strategy Pattern</a:t>
@@ -5007,7 +5011,7 @@
             <a:endParaRPr lang="en-US" sz="2400" smtClean="0"/>
           </a:p>
           <a:p>
-            <a:pPr>
+            <a:pPr eaLnBrk="1" hangingPunct="1">
               <a:buFont typeface="Wingdings 2" pitchFamily="18" charset="2"/>
               <a:buNone/>
             </a:pPr>
@@ -5017,6 +5021,7 @@
             </a:r>
           </a:p>
           <a:p>
+            <a:pPr eaLnBrk="1" hangingPunct="1"/>
             <a:endParaRPr lang="en-US" sz="2400" smtClean="0"/>
           </a:p>
         </p:txBody>
@@ -5125,7 +5130,7 @@
           <a:bodyPr/>
           <a:lstStyle/>
           <a:p>
-            <a:pPr fontAlgn="auto">
+            <a:pPr eaLnBrk="1" fontAlgn="auto" hangingPunct="1">
               <a:spcAft>
                 <a:spcPts val="0"/>
               </a:spcAft>
@@ -5166,22 +5171,26 @@
           <a:bodyPr/>
           <a:lstStyle/>
           <a:p>
-            <a:r>
-              <a:rPr lang="en-US" sz="2400" dirty="0" smtClean="0"/>
+            <a:pPr eaLnBrk="1" hangingPunct="1"/>
+            <a:r>
+              <a:rPr lang="en-US" sz="2400" smtClean="0"/>
               <a:t>Strategy is a bind-once pattern, whereas State is more dynamic.</a:t>
             </a:r>
           </a:p>
           <a:p>
-            <a:endParaRPr lang="en-US" sz="2400" dirty="0" smtClean="0"/>
-          </a:p>
-          <a:p>
-            <a:r>
-              <a:rPr lang="en-US" sz="2400" dirty="0" smtClean="0"/>
+            <a:pPr eaLnBrk="1" hangingPunct="1"/>
+            <a:endParaRPr lang="en-US" sz="2400" smtClean="0"/>
+          </a:p>
+          <a:p>
+            <a:pPr eaLnBrk="1" hangingPunct="1"/>
+            <a:r>
+              <a:rPr lang="en-US" sz="2400" smtClean="0"/>
               <a:t>The implementation of the State pattern builds on the Strategy pattern. The difference between State and Strategy is in the intent. With Strategy, the choice of algorithm is fairly stable. With State, a change in the state of the “context” object causes it to select from its “palette” of Strategy objects.</a:t>
             </a:r>
           </a:p>
           <a:p>
-            <a:endParaRPr lang="en-US" sz="2400" dirty="0" smtClean="0"/>
+            <a:pPr eaLnBrk="1" hangingPunct="1"/>
+            <a:endParaRPr lang="en-US" sz="2400" smtClean="0"/>
           </a:p>
         </p:txBody>
       </p:sp>
@@ -5225,7 +5234,7 @@
           <a:bodyPr/>
           <a:lstStyle/>
           <a:p>
-            <a:pPr fontAlgn="auto">
+            <a:pPr eaLnBrk="1" fontAlgn="auto" hangingPunct="1">
               <a:spcAft>
                 <a:spcPts val="0"/>
               </a:spcAft>
@@ -5266,6 +5275,7 @@
           <a:bodyPr/>
           <a:lstStyle/>
           <a:p>
+            <a:pPr eaLnBrk="1" hangingPunct="1"/>
             <a:endParaRPr lang="en-US" smtClean="0"/>
           </a:p>
         </p:txBody>
@@ -5342,7 +5352,7 @@
           <a:bodyPr/>
           <a:lstStyle/>
           <a:p>
-            <a:pPr fontAlgn="auto">
+            <a:pPr eaLnBrk="1" fontAlgn="auto" hangingPunct="1">
               <a:spcAft>
                 <a:spcPts val="0"/>
               </a:spcAft>
@@ -5383,6 +5393,7 @@
           <a:bodyPr/>
           <a:lstStyle/>
           <a:p>
+            <a:pPr eaLnBrk="1" hangingPunct="1"/>
             <a:endParaRPr lang="en-US" smtClean="0"/>
           </a:p>
         </p:txBody>
@@ -5459,7 +5470,7 @@
           <a:bodyPr/>
           <a:lstStyle/>
           <a:p>
-            <a:pPr fontAlgn="auto">
+            <a:pPr eaLnBrk="1" fontAlgn="auto" hangingPunct="1">
               <a:spcAft>
                 <a:spcPts val="0"/>
               </a:spcAft>
@@ -5500,6 +5511,7 @@
           <a:bodyPr/>
           <a:lstStyle/>
           <a:p>
+            <a:pPr eaLnBrk="1" hangingPunct="1"/>
             <a:endParaRPr lang="en-US" smtClean="0"/>
           </a:p>
         </p:txBody>
@@ -5521,8 +5533,8 @@
         </p:blipFill>
         <p:spPr bwMode="auto">
           <a:xfrm>
-            <a:off x="457200" y="1693863"/>
-            <a:ext cx="8553450" cy="4173537"/>
+            <a:off x="0" y="1447800"/>
+            <a:ext cx="9010650" cy="4800600"/>
           </a:xfrm>
           <a:prstGeom prst="rect">
             <a:avLst/>
@@ -5576,7 +5588,7 @@
           <a:bodyPr/>
           <a:lstStyle/>
           <a:p>
-            <a:pPr fontAlgn="auto">
+            <a:pPr eaLnBrk="1" fontAlgn="auto" hangingPunct="1">
               <a:spcAft>
                 <a:spcPts val="0"/>
               </a:spcAft>
@@ -5604,7 +5616,7 @@
       </p:sp>
       <p:sp>
         <p:nvSpPr>
-          <p:cNvPr id="20498" name="Text Box 18"/>
+          <p:cNvPr id="20482" name="Text Box 18"/>
           <p:cNvSpPr txBox="1">
             <a:spLocks noChangeArrowheads="1"/>
           </p:cNvSpPr>
@@ -5613,7 +5625,7 @@
         <p:spPr bwMode="auto">
           <a:xfrm>
             <a:off x="1524000" y="1600200"/>
-            <a:ext cx="7162800" cy="5078313"/>
+            <a:ext cx="7162800" cy="5078413"/>
           </a:xfrm>
           <a:prstGeom prst="rect">
             <a:avLst/>
@@ -5625,7 +5637,6 @@
             <a:headEnd/>
             <a:tailEnd/>
           </a:ln>
-          <a:effectLst/>
         </p:spPr>
         <p:txBody>
           <a:bodyPr>
@@ -5638,101 +5649,59 @@
               <a:buAutoNum type="arabicPeriod"/>
             </a:pPr>
             <a:r>
-              <a:rPr lang="en-US" dirty="0"/>
+              <a:rPr lang="en-US"/>
               <a:t>Who defines the state transitions?</a:t>
             </a:r>
           </a:p>
           <a:p>
             <a:pPr marL="342900" indent="-342900"/>
             <a:r>
-              <a:rPr lang="en-US" dirty="0"/>
-              <a:t>	</a:t>
-            </a:r>
-            <a:r>
-              <a:rPr lang="en-US" dirty="0" smtClean="0"/>
-              <a:t>The State subclasses themselves define the transition, which is more flexible and appropriate as compared to defining transition criteria in the Context. An interface to set the context’s current state is provided.</a:t>
-            </a:r>
-            <a:endParaRPr lang="en-US" dirty="0"/>
+              <a:rPr lang="en-US"/>
+              <a:t>	The State subclasses themselves define the transition, which is more flexible and appropriate as compared to defining transition criteria in the Context. An interface to set the context’s current state is provided.</a:t>
+            </a:r>
           </a:p>
           <a:p>
             <a:pPr marL="342900" indent="-342900">
               <a:buFontTx/>
               <a:buAutoNum type="arabicPeriod"/>
             </a:pPr>
-            <a:endParaRPr lang="en-US" dirty="0"/>
+            <a:endParaRPr lang="en-US"/>
           </a:p>
           <a:p>
             <a:pPr marL="342900" indent="-342900"/>
             <a:r>
-              <a:rPr lang="en-US" dirty="0"/>
+              <a:rPr lang="en-US"/>
               <a:t>2.	A table-based alternative?</a:t>
             </a:r>
           </a:p>
           <a:p>
             <a:pPr marL="342900" indent="-342900"/>
             <a:r>
-              <a:rPr lang="en-US" dirty="0"/>
-              <a:t>	</a:t>
-            </a:r>
-            <a:r>
-              <a:rPr lang="en-US" dirty="0" smtClean="0"/>
-              <a:t>For </a:t>
-            </a:r>
-            <a:r>
-              <a:rPr lang="en-US" dirty="0"/>
-              <a:t>our implementation, table based state diagram is not needed since the state change is not so complex.</a:t>
+              <a:rPr lang="en-US"/>
+              <a:t>	For our implementation, table based state diagram is not needed since the state change is not so complex.</a:t>
             </a:r>
           </a:p>
           <a:p>
             <a:pPr marL="342900" indent="-342900"/>
-            <a:endParaRPr lang="en-US" dirty="0"/>
+            <a:endParaRPr lang="en-US"/>
           </a:p>
           <a:p>
             <a:pPr marL="342900" indent="-342900"/>
             <a:r>
-              <a:rPr lang="en-US" dirty="0"/>
+              <a:rPr lang="en-US"/>
               <a:t>3.	Creating and destroying State objects?</a:t>
             </a:r>
           </a:p>
           <a:p>
             <a:pPr marL="342900" indent="-342900"/>
             <a:r>
-              <a:rPr lang="en-US" dirty="0"/>
-              <a:t>	</a:t>
-            </a:r>
-            <a:r>
-              <a:rPr lang="en-US" dirty="0" smtClean="0"/>
-              <a:t>W</a:t>
-            </a:r>
-            <a:r>
-              <a:rPr lang="en-US" dirty="0" smtClean="0"/>
-              <a:t>e </a:t>
-            </a:r>
-            <a:r>
-              <a:rPr lang="en-US" dirty="0"/>
-              <a:t>use the second way by creating </a:t>
-            </a:r>
-            <a:r>
-              <a:rPr lang="en-US" dirty="0" smtClean="0"/>
-              <a:t>the States ahead </a:t>
-            </a:r>
-            <a:r>
-              <a:rPr lang="en-US" dirty="0"/>
-              <a:t>of time until garbage collector destroy </a:t>
-            </a:r>
-            <a:r>
-              <a:rPr lang="en-US" dirty="0" smtClean="0"/>
-              <a:t>them</a:t>
-            </a:r>
-            <a:r>
-              <a:rPr lang="en-US" dirty="0" smtClean="0"/>
-              <a:t>, as the state change occurs rapidly.</a:t>
-            </a:r>
-            <a:endParaRPr lang="en-US" dirty="0"/>
+              <a:rPr lang="en-US"/>
+              <a:t>	We use the second way by creating the States ahead of time until garbage collector destroy them, as the state change occurs rapidly.</a:t>
+            </a:r>
           </a:p>
           <a:p>
             <a:pPr marL="342900" indent="-342900"/>
-            <a:endParaRPr lang="en-US" dirty="0"/>
+            <a:endParaRPr lang="en-US"/>
           </a:p>
           <a:p>
             <a:pPr marL="342900" indent="-342900">
@@ -5740,29 +5709,16 @@
               <a:buAutoNum type="arabicPeriod" startAt="4"/>
             </a:pPr>
             <a:r>
-              <a:rPr lang="en-US" dirty="0"/>
+              <a:rPr lang="en-US"/>
               <a:t>Using dynamic inheritance?</a:t>
             </a:r>
           </a:p>
           <a:p>
             <a:pPr marL="342900" indent="-342900"/>
             <a:r>
-              <a:rPr lang="en-US" dirty="0"/>
-              <a:t>	</a:t>
-            </a:r>
-            <a:r>
-              <a:rPr lang="en-US" dirty="0" smtClean="0"/>
-              <a:t>We’re </a:t>
-            </a:r>
-            <a:r>
-              <a:rPr lang="en-US" dirty="0"/>
-              <a:t>not using it since Java doesn’t specifically support this behavior</a:t>
-            </a:r>
-            <a:r>
-              <a:rPr lang="en-US" dirty="0" smtClean="0"/>
-              <a:t>.</a:t>
-            </a:r>
-            <a:endParaRPr lang="en-US" dirty="0"/>
+              <a:rPr lang="en-US"/>
+              <a:t>	We’re not using it since Java doesn’t specifically support this behavior.</a:t>
+            </a:r>
           </a:p>
         </p:txBody>
       </p:sp>

</xml_diff>